<commit_message>
Updated Ruby Examples to use common data folder
</commit_message>
<xml_diff>
--- a/Data/demo.pptx
+++ b/Data/demo.pptx
@@ -1,7 +1,6 @@
 
 <file path=ppt/presentation.xml><?xml version="1.0" encoding="utf-8"?>
-<!--Generated by Aspose.Slides for .NET 15.7.0.0-->
-<p:presentation xmlns:r="http://schemas.openxmlformats.org/officeDocument/2006/relationships" xmlns:a="http://schemas.openxmlformats.org/drawingml/2006/main" xmlns:p="http://schemas.openxmlformats.org/presentationml/2006/main" saveSubsetFonts="1">
+<p:presentation xmlns:a="http://schemas.openxmlformats.org/drawingml/2006/main" xmlns:r="http://schemas.openxmlformats.org/officeDocument/2006/relationships" xmlns:p="http://schemas.openxmlformats.org/presentationml/2006/main" saveSubsetFonts="1">
   <p:sldMasterIdLst>
     <p:sldMasterId id="2147483649" r:id="rId1"/>
   </p:sldMasterIdLst>
@@ -10,9 +9,6 @@
   </p:sldIdLst>
   <p:sldSz cx="9144000" cy="6858000" type="screen4x3"/>
   <p:notesSz cx="6858000" cy="9144000"/>
-  <p:custDataLst>
-    <p:tags r:id="rId3"/>
-  </p:custDataLst>
   <p:defaultTextStyle>
     <a:defPPr>
       <a:defRPr lang="en-US"/>
@@ -28,7 +24,7 @@
         <a:solidFill>
           <a:schemeClr val="tx1"/>
         </a:solidFill>
-        <a:latin typeface="Arial"/>
+        <a:latin typeface="Arial" charset="0"/>
         <a:ea typeface="+mn-ea"/>
         <a:cs typeface="+mn-cs"/>
       </a:defRPr>
@@ -44,7 +40,7 @@
         <a:solidFill>
           <a:schemeClr val="tx1"/>
         </a:solidFill>
-        <a:latin typeface="Arial"/>
+        <a:latin typeface="Arial" charset="0"/>
         <a:ea typeface="+mn-ea"/>
         <a:cs typeface="+mn-cs"/>
       </a:defRPr>
@@ -60,7 +56,7 @@
         <a:solidFill>
           <a:schemeClr val="tx1"/>
         </a:solidFill>
-        <a:latin typeface="Arial"/>
+        <a:latin typeface="Arial" charset="0"/>
         <a:ea typeface="+mn-ea"/>
         <a:cs typeface="+mn-cs"/>
       </a:defRPr>
@@ -76,7 +72,7 @@
         <a:solidFill>
           <a:schemeClr val="tx1"/>
         </a:solidFill>
-        <a:latin typeface="Arial"/>
+        <a:latin typeface="Arial" charset="0"/>
         <a:ea typeface="+mn-ea"/>
         <a:cs typeface="+mn-cs"/>
       </a:defRPr>
@@ -92,7 +88,7 @@
         <a:solidFill>
           <a:schemeClr val="tx1"/>
         </a:solidFill>
-        <a:latin typeface="Arial"/>
+        <a:latin typeface="Arial" charset="0"/>
         <a:ea typeface="+mn-ea"/>
         <a:cs typeface="+mn-cs"/>
       </a:defRPr>
@@ -102,7 +98,7 @@
         <a:solidFill>
           <a:schemeClr val="tx1"/>
         </a:solidFill>
-        <a:latin typeface="Arial"/>
+        <a:latin typeface="Arial" charset="0"/>
         <a:ea typeface="+mn-ea"/>
         <a:cs typeface="+mn-cs"/>
       </a:defRPr>
@@ -112,7 +108,7 @@
         <a:solidFill>
           <a:schemeClr val="tx1"/>
         </a:solidFill>
-        <a:latin typeface="Arial"/>
+        <a:latin typeface="Arial" charset="0"/>
         <a:ea typeface="+mn-ea"/>
         <a:cs typeface="+mn-cs"/>
       </a:defRPr>
@@ -122,7 +118,7 @@
         <a:solidFill>
           <a:schemeClr val="tx1"/>
         </a:solidFill>
-        <a:latin typeface="Arial"/>
+        <a:latin typeface="Arial" charset="0"/>
         <a:ea typeface="+mn-ea"/>
         <a:cs typeface="+mn-cs"/>
       </a:defRPr>
@@ -132,7 +128,7 @@
         <a:solidFill>
           <a:schemeClr val="tx1"/>
         </a:solidFill>
-        <a:latin typeface="Arial"/>
+        <a:latin typeface="Arial" charset="0"/>
         <a:ea typeface="+mn-ea"/>
         <a:cs typeface="+mn-cs"/>
       </a:defRPr>
@@ -142,7 +138,7 @@
 </file>
 
 <file path=ppt/slideLayouts/slideLayout1.xml><?xml version="1.0" encoding="utf-8"?>
-<p:sldLayout xmlns:a="http://schemas.openxmlformats.org/drawingml/2006/main" xmlns:r="http://schemas.openxmlformats.org/officeDocument/2006/relationships" xmlns:p14="http://schemas.microsoft.com/office/powerpoint/2010/main" xmlns:p15="http://schemas.microsoft.com/office/powerpoint/2012/main" xmlns:p="http://schemas.openxmlformats.org/presentationml/2006/main" showMasterSp="0" type="title" preserve="1">
+<p:sldLayout xmlns:a="http://schemas.openxmlformats.org/drawingml/2006/main" xmlns:r="http://schemas.openxmlformats.org/officeDocument/2006/relationships" xmlns:p="http://schemas.openxmlformats.org/presentationml/2006/main" showMasterSp="0" type="title" preserve="1">
   <p:cSld name="Title Slide">
     <p:spTree>
       <p:nvGrpSpPr>
@@ -154,15 +150,19 @@
         <a:xfrm>
           <a:off x="0" y="0"/>
           <a:ext cx="0" cy="0"/>
+          <a:chOff x="0" y="0"/>
+          <a:chExt cx="0" cy="0"/>
         </a:xfrm>
       </p:grpSpPr>
       <p:grpSp>
         <p:nvGrpSpPr>
           <p:cNvPr id="16386" name="Group 2"/>
-          <p:cNvGrpSpPr/>
+          <p:cNvGrpSpPr>
+            <a:grpSpLocks/>
+          </p:cNvGrpSpPr>
           <p:nvPr/>
         </p:nvGrpSpPr>
-        <p:grpSpPr>
+        <p:grpSpPr bwMode="auto">
           <a:xfrm>
             <a:off x="3175" y="4267200"/>
             <a:ext cx="9140825" cy="2590800"/>
@@ -173,7 +173,9 @@
         <p:sp>
           <p:nvSpPr>
             <p:cNvPr id="16387" name="Freeform 3"/>
-            <p:cNvSpPr/>
+            <p:cNvSpPr>
+              <a:spLocks/>
+            </p:cNvSpPr>
             <p:nvPr/>
           </p:nvSpPr>
           <p:spPr bwMode="hidden">
@@ -182,6 +184,9 @@
               <a:ext cx="5758" cy="1632"/>
             </a:xfrm>
             <a:custGeom>
+              <a:avLst/>
+              <a:gdLst/>
+              <a:ahLst/>
               <a:cxnLst>
                 <a:cxn ang="0">
                   <a:pos x="5740" y="4316"/>
@@ -237,11 +242,12 @@
                 </a:gs>
               </a:gsLst>
               <a:lin ang="5400000" scaled="1"/>
-              <a:tileRect/>
             </a:gradFill>
             <a:ln w="9525">
               <a:noFill/>
               <a:round/>
+              <a:headEnd/>
+              <a:tailEnd/>
             </a:ln>
           </p:spPr>
           <p:txBody>
@@ -255,10 +261,12 @@
         <p:grpSp>
           <p:nvGrpSpPr>
             <p:cNvPr id="16388" name="Group 4"/>
-            <p:cNvGrpSpPr/>
+            <p:cNvGrpSpPr>
+              <a:grpSpLocks/>
+            </p:cNvGrpSpPr>
             <p:nvPr userDrawn="1"/>
           </p:nvGrpSpPr>
-          <p:grpSpPr>
+          <p:grpSpPr bwMode="auto">
             <a:xfrm>
               <a:off x="3528" y="3715"/>
               <a:ext cx="792" cy="521"/>
@@ -298,12 +306,14 @@
                 <a:path path="shape">
                   <a:fillToRect l="50000" t="50000" r="50000" b="50000"/>
                 </a:path>
-                <a:tileRect/>
               </a:gradFill>
               <a:ln w="9525">
                 <a:noFill/>
                 <a:round/>
+                <a:headEnd/>
+                <a:tailEnd/>
               </a:ln>
+              <a:effectLst/>
             </p:spPr>
             <p:txBody>
               <a:bodyPr/>
@@ -343,12 +353,14 @@
                   </a:gs>
                 </a:gsLst>
                 <a:lin ang="5400000" scaled="1"/>
-                <a:tileRect/>
               </a:gradFill>
               <a:ln w="9525">
                 <a:noFill/>
                 <a:round/>
+                <a:headEnd/>
+                <a:tailEnd/>
               </a:ln>
+              <a:effectLst/>
             </p:spPr>
             <p:txBody>
               <a:bodyPr/>
@@ -388,12 +400,14 @@
                   </a:gs>
                 </a:gsLst>
                 <a:lin ang="5400000" scaled="1"/>
-                <a:tileRect/>
               </a:gradFill>
               <a:ln w="9525">
                 <a:noFill/>
                 <a:round/>
+                <a:headEnd/>
+                <a:tailEnd/>
               </a:ln>
+              <a:effectLst/>
             </p:spPr>
             <p:txBody>
               <a:bodyPr/>
@@ -433,12 +447,14 @@
                   </a:gs>
                 </a:gsLst>
                 <a:lin ang="5400000" scaled="1"/>
-                <a:tileRect/>
               </a:gradFill>
               <a:ln w="9525">
                 <a:noFill/>
                 <a:round/>
+                <a:headEnd/>
+                <a:tailEnd/>
               </a:ln>
+              <a:effectLst/>
             </p:spPr>
             <p:txBody>
               <a:bodyPr/>
@@ -478,12 +494,14 @@
                   </a:gs>
                 </a:gsLst>
                 <a:lin ang="5400000" scaled="1"/>
-                <a:tileRect/>
               </a:gradFill>
               <a:ln w="9525">
                 <a:noFill/>
                 <a:round/>
+                <a:headEnd/>
+                <a:tailEnd/>
               </a:ln>
+              <a:effectLst/>
             </p:spPr>
             <p:txBody>
               <a:bodyPr/>
@@ -496,7 +514,9 @@
           <p:sp>
             <p:nvSpPr>
               <p:cNvPr id="16394" name="Freeform 10"/>
-              <p:cNvSpPr/>
+              <p:cNvSpPr>
+                <a:spLocks/>
+              </p:cNvSpPr>
               <p:nvPr/>
             </p:nvSpPr>
             <p:spPr bwMode="hidden">
@@ -505,6 +525,9 @@
                 <a:ext cx="383" cy="161"/>
               </a:xfrm>
               <a:custGeom>
+                <a:avLst/>
+                <a:gdLst/>
+                <a:ahLst/>
                 <a:cxnLst>
                   <a:cxn ang="0">
                     <a:pos x="376" y="12"/>
@@ -642,11 +665,12 @@
                   </a:gs>
                 </a:gsLst>
                 <a:lin ang="5400000" scaled="1"/>
-                <a:tileRect/>
               </a:gradFill>
               <a:ln w="9525">
                 <a:noFill/>
                 <a:round/>
+                <a:headEnd/>
+                <a:tailEnd/>
               </a:ln>
             </p:spPr>
             <p:txBody>
@@ -660,7 +684,9 @@
           <p:sp>
             <p:nvSpPr>
               <p:cNvPr id="16395" name="Freeform 11"/>
-              <p:cNvSpPr/>
+              <p:cNvSpPr>
+                <a:spLocks/>
+              </p:cNvSpPr>
               <p:nvPr/>
             </p:nvSpPr>
             <p:spPr bwMode="hidden">
@@ -669,6 +695,9 @@
                 <a:ext cx="444" cy="66"/>
               </a:xfrm>
               <a:custGeom>
+                <a:avLst/>
+                <a:gdLst/>
+                <a:ahLst/>
                 <a:cxnLst>
                   <a:cxn ang="0">
                     <a:pos x="257" y="54"/>
@@ -721,7 +750,7 @@
                 </a:cxnLst>
                 <a:rect l="0" t="0" r="r" b="b"/>
                 <a:pathLst>
-                  <a:path w="442" h="66">
+                  <a:path w="443" h="66">
                     <a:moveTo>
                       <a:pt x="257" y="54"/>
                     </a:moveTo>
@@ -788,11 +817,12 @@
                   </a:gs>
                 </a:gsLst>
                 <a:lin ang="18900000" scaled="1"/>
-                <a:tileRect/>
               </a:gradFill>
               <a:ln w="9525">
                 <a:noFill/>
                 <a:round/>
+                <a:headEnd/>
+                <a:tailEnd/>
               </a:ln>
             </p:spPr>
             <p:txBody>
@@ -806,7 +836,9 @@
           <p:sp>
             <p:nvSpPr>
               <p:cNvPr id="16396" name="Freeform 12"/>
-              <p:cNvSpPr/>
+              <p:cNvSpPr>
+                <a:spLocks/>
+              </p:cNvSpPr>
               <p:nvPr/>
             </p:nvSpPr>
             <p:spPr bwMode="hidden">
@@ -815,6 +847,9 @@
                 <a:ext cx="89" cy="216"/>
               </a:xfrm>
               <a:custGeom>
+                <a:avLst/>
+                <a:gdLst/>
+                <a:ahLst/>
                 <a:cxnLst>
                   <a:cxn ang="0">
                     <a:pos x="12" y="66"/>
@@ -934,11 +969,12 @@
                   </a:gs>
                 </a:gsLst>
                 <a:lin ang="5400000" scaled="1"/>
-                <a:tileRect/>
               </a:gradFill>
               <a:ln w="9525">
                 <a:noFill/>
                 <a:round/>
+                <a:headEnd/>
+                <a:tailEnd/>
               </a:ln>
             </p:spPr>
             <p:txBody>
@@ -952,7 +988,9 @@
           <p:sp>
             <p:nvSpPr>
               <p:cNvPr id="16397" name="Freeform 13"/>
-              <p:cNvSpPr/>
+              <p:cNvSpPr>
+                <a:spLocks/>
+              </p:cNvSpPr>
               <p:nvPr/>
             </p:nvSpPr>
             <p:spPr bwMode="hidden">
@@ -961,6 +999,9 @@
                 <a:ext cx="750" cy="461"/>
               </a:xfrm>
               <a:custGeom>
+                <a:avLst/>
+                <a:gdLst/>
+                <a:ahLst/>
                 <a:cxnLst>
                   <a:cxn ang="0">
                     <a:pos x="382" y="443"/>
@@ -1322,11 +1363,12 @@
                 <a:path path="rect">
                   <a:fillToRect l="50000" t="50000" r="50000" b="50000"/>
                 </a:path>
-                <a:tileRect/>
               </a:gradFill>
               <a:ln w="9525">
                 <a:noFill/>
                 <a:round/>
+                <a:headEnd/>
+                <a:tailEnd/>
               </a:ln>
             </p:spPr>
             <p:txBody>
@@ -1340,7 +1382,9 @@
           <p:sp>
             <p:nvSpPr>
               <p:cNvPr id="16398" name="Freeform 14"/>
-              <p:cNvSpPr/>
+              <p:cNvSpPr>
+                <a:spLocks/>
+              </p:cNvSpPr>
               <p:nvPr/>
             </p:nvSpPr>
             <p:spPr bwMode="hidden">
@@ -1349,6 +1393,9 @@
                 <a:ext cx="96" cy="30"/>
               </a:xfrm>
               <a:custGeom>
+                <a:avLst/>
+                <a:gdLst/>
+                <a:ahLst/>
                 <a:cxnLst>
                   <a:cxn ang="0">
                     <a:pos x="0" y="0"/>
@@ -1426,11 +1473,12 @@
                   </a:gs>
                 </a:gsLst>
                 <a:lin ang="0" scaled="1"/>
-                <a:tileRect/>
               </a:gradFill>
               <a:ln w="9525">
                 <a:noFill/>
                 <a:round/>
+                <a:headEnd/>
+                <a:tailEnd/>
               </a:ln>
             </p:spPr>
             <p:txBody>
@@ -1471,12 +1519,14 @@
                   </a:gs>
                 </a:gsLst>
                 <a:lin ang="5400000" scaled="1"/>
-                <a:tileRect/>
               </a:gradFill>
               <a:ln w="9525">
                 <a:noFill/>
                 <a:round/>
+                <a:headEnd/>
+                <a:tailEnd/>
               </a:ln>
+              <a:effectLst/>
             </p:spPr>
             <p:txBody>
               <a:bodyPr/>
@@ -1490,10 +1540,12 @@
         <p:grpSp>
           <p:nvGrpSpPr>
             <p:cNvPr id="16400" name="Group 16"/>
-            <p:cNvGrpSpPr/>
+            <p:cNvGrpSpPr>
+              <a:grpSpLocks/>
+            </p:cNvGrpSpPr>
             <p:nvPr userDrawn="1"/>
           </p:nvGrpSpPr>
-          <p:grpSpPr>
+          <p:grpSpPr bwMode="auto">
             <a:xfrm>
               <a:off x="1776" y="3631"/>
               <a:ext cx="1626" cy="683"/>
@@ -1531,12 +1583,14 @@
                   </a:gs>
                 </a:gsLst>
                 <a:lin ang="2700000" scaled="1"/>
-                <a:tileRect/>
               </a:gradFill>
               <a:ln w="9525">
                 <a:noFill/>
                 <a:round/>
+                <a:headEnd/>
+                <a:tailEnd/>
               </a:ln>
+              <a:effectLst/>
             </p:spPr>
             <p:txBody>
               <a:bodyPr/>
@@ -1576,12 +1630,14 @@
                   </a:gs>
                 </a:gsLst>
                 <a:lin ang="2700000" scaled="1"/>
-                <a:tileRect/>
               </a:gradFill>
               <a:ln w="9525">
                 <a:noFill/>
                 <a:round/>
+                <a:headEnd/>
+                <a:tailEnd/>
               </a:ln>
+              <a:effectLst/>
             </p:spPr>
             <p:txBody>
               <a:bodyPr/>
@@ -1621,12 +1677,14 @@
                   </a:gs>
                 </a:gsLst>
                 <a:lin ang="2700000" scaled="1"/>
-                <a:tileRect/>
               </a:gradFill>
               <a:ln w="9525">
                 <a:noFill/>
                 <a:round/>
+                <a:headEnd/>
+                <a:tailEnd/>
               </a:ln>
+              <a:effectLst/>
             </p:spPr>
             <p:txBody>
               <a:bodyPr/>
@@ -1666,12 +1724,14 @@
                   </a:gs>
                 </a:gsLst>
                 <a:lin ang="5400000" scaled="1"/>
-                <a:tileRect/>
               </a:gradFill>
               <a:ln w="9525">
                 <a:noFill/>
                 <a:round/>
+                <a:headEnd/>
+                <a:tailEnd/>
               </a:ln>
+              <a:effectLst/>
             </p:spPr>
             <p:txBody>
               <a:bodyPr/>
@@ -1711,12 +1771,14 @@
                   </a:gs>
                 </a:gsLst>
                 <a:lin ang="5400000" scaled="1"/>
-                <a:tileRect/>
               </a:gradFill>
               <a:ln w="9525">
                 <a:noFill/>
                 <a:round/>
+                <a:headEnd/>
+                <a:tailEnd/>
               </a:ln>
+              <a:effectLst/>
             </p:spPr>
             <p:txBody>
               <a:bodyPr/>
@@ -1756,12 +1818,14 @@
                   </a:gs>
                 </a:gsLst>
                 <a:lin ang="5400000" scaled="1"/>
-                <a:tileRect/>
               </a:gradFill>
               <a:ln w="9525">
                 <a:noFill/>
                 <a:round/>
+                <a:headEnd/>
+                <a:tailEnd/>
               </a:ln>
+              <a:effectLst/>
             </p:spPr>
             <p:txBody>
               <a:bodyPr/>
@@ -1801,12 +1865,14 @@
                   </a:gs>
                 </a:gsLst>
                 <a:lin ang="2700000" scaled="1"/>
-                <a:tileRect/>
               </a:gradFill>
               <a:ln w="9525">
                 <a:noFill/>
                 <a:round/>
+                <a:headEnd/>
+                <a:tailEnd/>
               </a:ln>
+              <a:effectLst/>
             </p:spPr>
             <p:txBody>
               <a:bodyPr/>
@@ -1846,12 +1912,14 @@
                   </a:gs>
                 </a:gsLst>
                 <a:lin ang="0" scaled="1"/>
-                <a:tileRect/>
               </a:gradFill>
               <a:ln w="9525">
                 <a:noFill/>
                 <a:round/>
+                <a:headEnd/>
+                <a:tailEnd/>
               </a:ln>
+              <a:effectLst/>
             </p:spPr>
             <p:txBody>
               <a:bodyPr/>
@@ -1864,7 +1932,9 @@
           <p:sp>
             <p:nvSpPr>
               <p:cNvPr id="16409" name="Freeform 25"/>
-              <p:cNvSpPr/>
+              <p:cNvSpPr>
+                <a:spLocks/>
+              </p:cNvSpPr>
               <p:nvPr/>
             </p:nvSpPr>
             <p:spPr bwMode="hidden">
@@ -1873,6 +1943,9 @@
                 <a:ext cx="449" cy="186"/>
               </a:xfrm>
               <a:custGeom>
+                <a:avLst/>
+                <a:gdLst/>
+                <a:ahLst/>
                 <a:cxnLst>
                   <a:cxn ang="0">
                     <a:pos x="6" y="6"/>
@@ -2034,11 +2107,12 @@
                   </a:gs>
                 </a:gsLst>
                 <a:lin ang="5400000" scaled="1"/>
-                <a:tileRect/>
               </a:gradFill>
               <a:ln w="9525">
                 <a:noFill/>
                 <a:round/>
+                <a:headEnd/>
+                <a:tailEnd/>
               </a:ln>
             </p:spPr>
             <p:txBody>
@@ -2052,7 +2126,9 @@
           <p:sp>
             <p:nvSpPr>
               <p:cNvPr id="16410" name="Freeform 26"/>
-              <p:cNvSpPr/>
+              <p:cNvSpPr>
+                <a:spLocks/>
+              </p:cNvSpPr>
               <p:nvPr/>
             </p:nvSpPr>
             <p:spPr bwMode="hidden">
@@ -2061,6 +2137,9 @@
                 <a:ext cx="892" cy="462"/>
               </a:xfrm>
               <a:custGeom>
+                <a:avLst/>
+                <a:gdLst/>
+                <a:ahLst/>
                 <a:cxnLst>
                   <a:cxn ang="0">
                     <a:pos x="23" y="276"/>
@@ -2396,11 +2475,12 @@
                   </a:gs>
                 </a:gsLst>
                 <a:lin ang="2700000" scaled="1"/>
-                <a:tileRect/>
               </a:gradFill>
               <a:ln w="9525">
                 <a:noFill/>
                 <a:round/>
+                <a:headEnd/>
+                <a:tailEnd/>
               </a:ln>
             </p:spPr>
             <p:txBody>
@@ -2414,7 +2494,9 @@
           <p:sp>
             <p:nvSpPr>
               <p:cNvPr id="16411" name="Freeform 27"/>
-              <p:cNvSpPr/>
+              <p:cNvSpPr>
+                <a:spLocks/>
+              </p:cNvSpPr>
               <p:nvPr/>
             </p:nvSpPr>
             <p:spPr bwMode="hidden">
@@ -2423,6 +2505,9 @@
                 <a:ext cx="407" cy="486"/>
               </a:xfrm>
               <a:custGeom>
+                <a:avLst/>
+                <a:gdLst/>
+                <a:ahLst/>
                 <a:cxnLst>
                   <a:cxn ang="0">
                     <a:pos x="18" y="300"/>
@@ -2614,11 +2699,12 @@
                   </a:gs>
                 </a:gsLst>
                 <a:lin ang="0" scaled="1"/>
-                <a:tileRect/>
               </a:gradFill>
               <a:ln w="9525">
                 <a:noFill/>
                 <a:round/>
+                <a:headEnd/>
+                <a:tailEnd/>
               </a:ln>
             </p:spPr>
             <p:txBody>
@@ -2632,7 +2718,9 @@
           <p:sp>
             <p:nvSpPr>
               <p:cNvPr id="16412" name="Freeform 28"/>
-              <p:cNvSpPr/>
+              <p:cNvSpPr>
+                <a:spLocks/>
+              </p:cNvSpPr>
               <p:nvPr/>
             </p:nvSpPr>
             <p:spPr bwMode="hidden">
@@ -2641,6 +2729,9 @@
                 <a:ext cx="108" cy="252"/>
               </a:xfrm>
               <a:custGeom>
+                <a:avLst/>
+                <a:gdLst/>
+                <a:ahLst/>
                 <a:cxnLst>
                   <a:cxn ang="0">
                     <a:pos x="89" y="84"/>
@@ -2693,7 +2784,7 @@
                 </a:cxnLst>
                 <a:rect l="0" t="0" r="r" b="b"/>
                 <a:pathLst>
-                  <a:path w="107" h="251">
+                  <a:path w="107" h="252">
                     <a:moveTo>
                       <a:pt x="89" y="84"/>
                     </a:moveTo>
@@ -2760,11 +2851,12 @@
                   </a:gs>
                 </a:gsLst>
                 <a:lin ang="5400000" scaled="1"/>
-                <a:tileRect/>
               </a:gradFill>
               <a:ln w="9525">
                 <a:noFill/>
                 <a:round/>
+                <a:headEnd/>
+                <a:tailEnd/>
               </a:ln>
             </p:spPr>
             <p:txBody>
@@ -2778,7 +2870,9 @@
           <p:sp>
             <p:nvSpPr>
               <p:cNvPr id="16413" name="Freeform 29"/>
-              <p:cNvSpPr/>
+              <p:cNvSpPr>
+                <a:spLocks/>
+              </p:cNvSpPr>
               <p:nvPr/>
             </p:nvSpPr>
             <p:spPr bwMode="hidden">
@@ -2787,6 +2881,9 @@
                 <a:ext cx="835" cy="150"/>
               </a:xfrm>
               <a:custGeom>
+                <a:avLst/>
+                <a:gdLst/>
+                <a:ahLst/>
                 <a:cxnLst>
                   <a:cxn ang="0">
                     <a:pos x="518" y="18"/>
@@ -2922,6 +3019,8 @@
               <a:ln w="9525">
                 <a:noFill/>
                 <a:round/>
+                <a:headEnd/>
+                <a:tailEnd/>
               </a:ln>
             </p:spPr>
             <p:txBody>
@@ -2935,7 +3034,9 @@
           <p:sp>
             <p:nvSpPr>
               <p:cNvPr id="16414" name="Freeform 30"/>
-              <p:cNvSpPr/>
+              <p:cNvSpPr>
+                <a:spLocks/>
+              </p:cNvSpPr>
               <p:nvPr/>
             </p:nvSpPr>
             <p:spPr bwMode="hidden">
@@ -2944,6 +3045,9 @@
                 <a:ext cx="171" cy="461"/>
               </a:xfrm>
               <a:custGeom>
+                <a:avLst/>
+                <a:gdLst/>
+                <a:ahLst/>
                 <a:cxnLst>
                   <a:cxn ang="0">
                     <a:pos x="31" y="263"/>
@@ -3079,6 +3183,8 @@
               <a:ln w="9525">
                 <a:noFill/>
                 <a:round/>
+                <a:headEnd/>
+                <a:tailEnd/>
               </a:ln>
             </p:spPr>
             <p:txBody>
@@ -3092,7 +3198,9 @@
           <p:sp>
             <p:nvSpPr>
               <p:cNvPr id="16415" name="Freeform 31"/>
-              <p:cNvSpPr/>
+              <p:cNvSpPr>
+                <a:spLocks/>
+              </p:cNvSpPr>
               <p:nvPr/>
             </p:nvSpPr>
             <p:spPr bwMode="hidden">
@@ -3101,6 +3209,9 @@
                 <a:ext cx="360" cy="563"/>
               </a:xfrm>
               <a:custGeom>
+                <a:avLst/>
+                <a:gdLst/>
+                <a:ahLst/>
                 <a:cxnLst>
                   <a:cxn ang="0">
                     <a:pos x="360" y="365"/>
@@ -3292,11 +3403,12 @@
                   </a:gs>
                 </a:gsLst>
                 <a:lin ang="5400000" scaled="1"/>
-                <a:tileRect/>
               </a:gradFill>
               <a:ln w="9525">
                 <a:noFill/>
                 <a:round/>
+                <a:headEnd/>
+                <a:tailEnd/>
               </a:ln>
             </p:spPr>
             <p:txBody>
@@ -3310,7 +3422,9 @@
           <p:sp>
             <p:nvSpPr>
               <p:cNvPr id="16416" name="Freeform 32"/>
-              <p:cNvSpPr/>
+              <p:cNvSpPr>
+                <a:spLocks/>
+              </p:cNvSpPr>
               <p:nvPr/>
             </p:nvSpPr>
             <p:spPr bwMode="hidden">
@@ -3319,6 +3433,9 @@
                 <a:ext cx="1078" cy="425"/>
               </a:xfrm>
               <a:custGeom>
+                <a:avLst/>
+                <a:gdLst/>
+                <a:ahLst/>
                 <a:cxnLst>
                   <a:cxn ang="0">
                     <a:pos x="1053" y="425"/>
@@ -3504,11 +3621,12 @@
                   </a:gs>
                 </a:gsLst>
                 <a:lin ang="5400000" scaled="1"/>
-                <a:tileRect/>
               </a:gradFill>
               <a:ln w="9525">
                 <a:noFill/>
                 <a:round/>
+                <a:headEnd/>
+                <a:tailEnd/>
               </a:ln>
             </p:spPr>
             <p:txBody>
@@ -3522,7 +3640,9 @@
           <p:sp>
             <p:nvSpPr>
               <p:cNvPr id="16417" name="Freeform 33"/>
-              <p:cNvSpPr/>
+              <p:cNvSpPr>
+                <a:spLocks/>
+              </p:cNvSpPr>
               <p:nvPr/>
             </p:nvSpPr>
             <p:spPr bwMode="hidden">
@@ -3531,6 +3651,9 @@
                 <a:ext cx="98" cy="234"/>
               </a:xfrm>
               <a:custGeom>
+                <a:avLst/>
+                <a:gdLst/>
+                <a:ahLst/>
                 <a:cxnLst>
                   <a:cxn ang="0">
                     <a:pos x="0" y="234"/>
@@ -3638,11 +3761,12 @@
                   </a:gs>
                 </a:gsLst>
                 <a:lin ang="5400000" scaled="1"/>
-                <a:tileRect/>
               </a:gradFill>
               <a:ln w="9525">
                 <a:noFill/>
                 <a:round/>
+                <a:headEnd/>
+                <a:tailEnd/>
               </a:ln>
             </p:spPr>
             <p:txBody>
@@ -3656,7 +3780,9 @@
           <p:sp>
             <p:nvSpPr>
               <p:cNvPr id="16418" name="Freeform 34"/>
-              <p:cNvSpPr/>
+              <p:cNvSpPr>
+                <a:spLocks/>
+              </p:cNvSpPr>
               <p:nvPr/>
             </p:nvSpPr>
             <p:spPr bwMode="hidden">
@@ -3665,6 +3791,9 @@
                 <a:ext cx="481" cy="641"/>
               </a:xfrm>
               <a:custGeom>
+                <a:avLst/>
+                <a:gdLst/>
+                <a:ahLst/>
                 <a:cxnLst>
                   <a:cxn ang="0">
                     <a:pos x="18" y="443"/>
@@ -3848,6 +3977,8 @@
               <a:ln w="9525">
                 <a:noFill/>
                 <a:round/>
+                <a:headEnd/>
+                <a:tailEnd/>
               </a:ln>
             </p:spPr>
             <p:txBody>
@@ -3862,10 +3993,12 @@
         <p:grpSp>
           <p:nvGrpSpPr>
             <p:cNvPr id="16419" name="Group 35"/>
-            <p:cNvGrpSpPr/>
+            <p:cNvGrpSpPr>
+              <a:grpSpLocks/>
+            </p:cNvGrpSpPr>
             <p:nvPr userDrawn="1"/>
           </p:nvGrpSpPr>
-          <p:grpSpPr>
+          <p:grpSpPr bwMode="auto">
             <a:xfrm>
               <a:off x="4128" y="3360"/>
               <a:ext cx="1351" cy="821"/>
@@ -3887,6 +4020,9 @@
                 <a:ext cx="1201" cy="731"/>
               </a:xfrm>
               <a:custGeom>
+                <a:avLst/>
+                <a:gdLst/>
+                <a:ahLst/>
                 <a:cxnLst>
                   <a:cxn ang="0">
                     <a:pos x="484" y="6"/>
@@ -4244,11 +4380,12 @@
                   </a:gs>
                 </a:gsLst>
                 <a:lin ang="5400000" scaled="1"/>
-                <a:tileRect/>
               </a:gradFill>
               <a:ln w="9525">
                 <a:noFill/>
                 <a:round/>
+                <a:headEnd/>
+                <a:tailEnd/>
               </a:ln>
             </p:spPr>
             <p:txBody>
@@ -4262,7 +4399,9 @@
           <p:sp>
             <p:nvSpPr>
               <p:cNvPr id="16421" name="Freeform 37"/>
-              <p:cNvSpPr/>
+              <p:cNvSpPr>
+                <a:spLocks/>
+              </p:cNvSpPr>
               <p:nvPr/>
             </p:nvSpPr>
             <p:spPr bwMode="hidden">
@@ -4271,6 +4410,9 @@
                 <a:ext cx="544" cy="737"/>
               </a:xfrm>
               <a:custGeom>
+                <a:avLst/>
+                <a:gdLst/>
+                <a:ahLst/>
                 <a:cxnLst>
                   <a:cxn ang="0">
                     <a:pos x="24" y="402"/>
@@ -4510,11 +4652,12 @@
                   </a:gs>
                 </a:gsLst>
                 <a:lin ang="5400000" scaled="1"/>
-                <a:tileRect/>
               </a:gradFill>
               <a:ln w="9525">
                 <a:noFill/>
                 <a:round/>
+                <a:headEnd/>
+                <a:tailEnd/>
               </a:ln>
             </p:spPr>
             <p:txBody>
@@ -4528,7 +4671,9 @@
           <p:sp>
             <p:nvSpPr>
               <p:cNvPr id="16422" name="Freeform 38"/>
-              <p:cNvSpPr/>
+              <p:cNvSpPr>
+                <a:spLocks/>
+              </p:cNvSpPr>
               <p:nvPr/>
             </p:nvSpPr>
             <p:spPr bwMode="hidden">
@@ -4537,6 +4682,9 @@
                 <a:ext cx="609" cy="252"/>
               </a:xfrm>
               <a:custGeom>
+                <a:avLst/>
+                <a:gdLst/>
+                <a:ahLst/>
                 <a:cxnLst>
                   <a:cxn ang="0">
                     <a:pos x="12" y="12"/>
@@ -4613,7 +4761,7 @@
                 </a:cxnLst>
                 <a:rect l="0" t="0" r="r" b="b"/>
                 <a:pathLst>
-                  <a:path w="609" h="251">
+                  <a:path w="609" h="252">
                     <a:moveTo>
                       <a:pt x="12" y="12"/>
                     </a:moveTo>
@@ -4704,11 +4852,12 @@
                   </a:gs>
                 </a:gsLst>
                 <a:lin ang="5400000" scaled="1"/>
-                <a:tileRect/>
               </a:gradFill>
               <a:ln w="9525">
                 <a:noFill/>
                 <a:round/>
+                <a:headEnd/>
+                <a:tailEnd/>
               </a:ln>
             </p:spPr>
             <p:txBody>
@@ -4722,7 +4871,9 @@
           <p:sp>
             <p:nvSpPr>
               <p:cNvPr id="16423" name="Freeform 39"/>
-              <p:cNvSpPr/>
+              <p:cNvSpPr>
+                <a:spLocks/>
+              </p:cNvSpPr>
               <p:nvPr/>
             </p:nvSpPr>
             <p:spPr bwMode="hidden">
@@ -4731,6 +4882,9 @@
                 <a:ext cx="72" cy="54"/>
               </a:xfrm>
               <a:custGeom>
+                <a:avLst/>
+                <a:gdLst/>
+                <a:ahLst/>
                 <a:cxnLst>
                   <a:cxn ang="0">
                     <a:pos x="72" y="0"/>
@@ -4808,11 +4962,12 @@
                   </a:gs>
                 </a:gsLst>
                 <a:lin ang="5400000" scaled="1"/>
-                <a:tileRect/>
               </a:gradFill>
               <a:ln w="9525">
                 <a:noFill/>
                 <a:round/>
+                <a:headEnd/>
+                <a:tailEnd/>
               </a:ln>
             </p:spPr>
             <p:txBody>
@@ -4826,7 +4981,9 @@
           <p:sp>
             <p:nvSpPr>
               <p:cNvPr id="16424" name="Freeform 40"/>
-              <p:cNvSpPr/>
+              <p:cNvSpPr>
+                <a:spLocks/>
+              </p:cNvSpPr>
               <p:nvPr/>
             </p:nvSpPr>
             <p:spPr bwMode="hidden">
@@ -4835,6 +4992,9 @@
                 <a:ext cx="705" cy="108"/>
               </a:xfrm>
               <a:custGeom>
+                <a:avLst/>
+                <a:gdLst/>
+                <a:ahLst/>
                 <a:cxnLst>
                   <a:cxn ang="0">
                     <a:pos x="299" y="90"/>
@@ -4966,11 +5126,12 @@
                   </a:gs>
                 </a:gsLst>
                 <a:lin ang="5400000" scaled="1"/>
-                <a:tileRect/>
               </a:gradFill>
               <a:ln w="9525">
                 <a:noFill/>
                 <a:round/>
+                <a:headEnd/>
+                <a:tailEnd/>
               </a:ln>
             </p:spPr>
             <p:txBody>
@@ -4984,7 +5145,9 @@
           <p:sp>
             <p:nvSpPr>
               <p:cNvPr id="16425" name="Freeform 41"/>
-              <p:cNvSpPr/>
+              <p:cNvSpPr>
+                <a:spLocks/>
+              </p:cNvSpPr>
               <p:nvPr/>
             </p:nvSpPr>
             <p:spPr bwMode="hidden">
@@ -4993,6 +5156,9 @@
                 <a:ext cx="143" cy="341"/>
               </a:xfrm>
               <a:custGeom>
+                <a:avLst/>
+                <a:gdLst/>
+                <a:ahLst/>
                 <a:cxnLst>
                   <a:cxn ang="0">
                     <a:pos x="119" y="114"/>
@@ -5112,11 +5278,12 @@
                   </a:gs>
                 </a:gsLst>
                 <a:lin ang="5400000" scaled="1"/>
-                <a:tileRect/>
               </a:gradFill>
               <a:ln w="9525">
                 <a:noFill/>
                 <a:round/>
+                <a:headEnd/>
+                <a:tailEnd/>
               </a:ln>
             </p:spPr>
             <p:txBody>
@@ -5130,7 +5297,9 @@
           <p:sp>
             <p:nvSpPr>
               <p:cNvPr id="16426" name="Freeform 42"/>
-              <p:cNvSpPr/>
+              <p:cNvSpPr>
+                <a:spLocks/>
+              </p:cNvSpPr>
               <p:nvPr/>
             </p:nvSpPr>
             <p:spPr bwMode="hidden">
@@ -5139,6 +5308,9 @@
                 <a:ext cx="83" cy="90"/>
               </a:xfrm>
               <a:custGeom>
+                <a:avLst/>
+                <a:gdLst/>
+                <a:ahLst/>
                 <a:cxnLst>
                   <a:cxn ang="0">
                     <a:pos x="59" y="90"/>
@@ -5216,11 +5388,12 @@
                   </a:gs>
                 </a:gsLst>
                 <a:lin ang="5400000" scaled="1"/>
-                <a:tileRect/>
               </a:gradFill>
               <a:ln w="9525">
                 <a:noFill/>
                 <a:round/>
+                <a:headEnd/>
+                <a:tailEnd/>
               </a:ln>
             </p:spPr>
             <p:txBody>
@@ -5234,7 +5407,9 @@
           <p:sp>
             <p:nvSpPr>
               <p:cNvPr id="16427" name="Freeform 43"/>
-              <p:cNvSpPr/>
+              <p:cNvSpPr>
+                <a:spLocks/>
+              </p:cNvSpPr>
               <p:nvPr/>
             </p:nvSpPr>
             <p:spPr bwMode="hidden">
@@ -5243,6 +5418,9 @@
                 <a:ext cx="717" cy="431"/>
               </a:xfrm>
               <a:custGeom>
+                <a:avLst/>
+                <a:gdLst/>
+                <a:ahLst/>
                 <a:cxnLst>
                   <a:cxn ang="0">
                     <a:pos x="693" y="216"/>
@@ -5636,6 +5814,8 @@
               <a:ln w="9525">
                 <a:noFill/>
                 <a:round/>
+                <a:headEnd/>
+                <a:tailEnd/>
               </a:ln>
             </p:spPr>
             <p:txBody>
@@ -5649,7 +5829,9 @@
           <p:sp>
             <p:nvSpPr>
               <p:cNvPr id="16428" name="Freeform 44"/>
-              <p:cNvSpPr/>
+              <p:cNvSpPr>
+                <a:spLocks/>
+              </p:cNvSpPr>
               <p:nvPr/>
             </p:nvSpPr>
             <p:spPr bwMode="hidden">
@@ -5658,6 +5840,9 @@
                 <a:ext cx="909" cy="533"/>
               </a:xfrm>
               <a:custGeom>
+                <a:avLst/>
+                <a:gdLst/>
+                <a:ahLst/>
                 <a:cxnLst>
                   <a:cxn ang="0">
                     <a:pos x="616" y="0"/>
@@ -6029,11 +6214,12 @@
                   </a:gs>
                 </a:gsLst>
                 <a:lin ang="0" scaled="1"/>
-                <a:tileRect/>
               </a:gradFill>
               <a:ln w="9525">
                 <a:noFill/>
                 <a:round/>
+                <a:headEnd/>
+                <a:tailEnd/>
               </a:ln>
             </p:spPr>
             <p:txBody>
@@ -6047,7 +6233,9 @@
           <p:sp>
             <p:nvSpPr>
               <p:cNvPr id="16429" name="Freeform 45"/>
-              <p:cNvSpPr/>
+              <p:cNvSpPr>
+                <a:spLocks/>
+              </p:cNvSpPr>
               <p:nvPr/>
             </p:nvSpPr>
             <p:spPr bwMode="hidden">
@@ -6056,6 +6244,9 @@
                 <a:ext cx="365" cy="66"/>
               </a:xfrm>
               <a:custGeom>
+                <a:avLst/>
+                <a:gdLst/>
+                <a:ahLst/>
                 <a:cxnLst>
                   <a:cxn ang="0">
                     <a:pos x="240" y="18"/>
@@ -6169,11 +6360,12 @@
                   </a:gs>
                 </a:gsLst>
                 <a:lin ang="5400000" scaled="1"/>
-                <a:tileRect/>
               </a:gradFill>
               <a:ln w="9525">
                 <a:noFill/>
                 <a:round/>
+                <a:headEnd/>
+                <a:tailEnd/>
               </a:ln>
             </p:spPr>
             <p:txBody>
@@ -6187,7 +6379,9 @@
           <p:sp>
             <p:nvSpPr>
               <p:cNvPr id="16430" name="Freeform 46"/>
-              <p:cNvSpPr/>
+              <p:cNvSpPr>
+                <a:spLocks/>
+              </p:cNvSpPr>
               <p:nvPr/>
             </p:nvSpPr>
             <p:spPr bwMode="hidden">
@@ -6196,6 +6390,9 @@
                 <a:ext cx="66" cy="48"/>
               </a:xfrm>
               <a:custGeom>
+                <a:avLst/>
+                <a:gdLst/>
+                <a:ahLst/>
                 <a:cxnLst>
                   <a:cxn ang="0">
                     <a:pos x="66" y="18"/>
@@ -6267,11 +6464,12 @@
                   </a:gs>
                 </a:gsLst>
                 <a:lin ang="5400000" scaled="1"/>
-                <a:tileRect/>
               </a:gradFill>
               <a:ln w="9525">
                 <a:noFill/>
                 <a:round/>
+                <a:headEnd/>
+                <a:tailEnd/>
               </a:ln>
             </p:spPr>
             <p:txBody>
@@ -6312,12 +6510,14 @@
                   </a:gs>
                 </a:gsLst>
                 <a:lin ang="0" scaled="1"/>
-                <a:tileRect/>
               </a:gradFill>
               <a:ln w="9525">
                 <a:noFill/>
                 <a:round/>
+                <a:headEnd/>
+                <a:tailEnd/>
               </a:ln>
+              <a:effectLst/>
             </p:spPr>
             <p:txBody>
               <a:bodyPr/>
@@ -6357,12 +6557,14 @@
                   </a:gs>
                 </a:gsLst>
                 <a:lin ang="5400000" scaled="1"/>
-                <a:tileRect/>
               </a:gradFill>
               <a:ln w="9525">
                 <a:noFill/>
                 <a:round/>
+                <a:headEnd/>
+                <a:tailEnd/>
               </a:ln>
+              <a:effectLst/>
             </p:spPr>
             <p:txBody>
               <a:bodyPr/>
@@ -6402,12 +6604,14 @@
                   </a:gs>
                 </a:gsLst>
                 <a:lin ang="5400000" scaled="1"/>
-                <a:tileRect/>
               </a:gradFill>
               <a:ln w="9525">
                 <a:noFill/>
                 <a:round/>
+                <a:headEnd/>
+                <a:tailEnd/>
               </a:ln>
+              <a:effectLst/>
             </p:spPr>
             <p:txBody>
               <a:bodyPr/>
@@ -6447,12 +6651,14 @@
                   </a:gs>
                 </a:gsLst>
                 <a:lin ang="5400000" scaled="1"/>
-                <a:tileRect/>
               </a:gradFill>
               <a:ln w="9525">
                 <a:noFill/>
                 <a:round/>
+                <a:headEnd/>
+                <a:tailEnd/>
               </a:ln>
+              <a:effectLst/>
             </p:spPr>
             <p:txBody>
               <a:bodyPr/>
@@ -6492,12 +6698,14 @@
                   </a:gs>
                 </a:gsLst>
                 <a:lin ang="5400000" scaled="1"/>
-                <a:tileRect/>
               </a:gradFill>
               <a:ln w="9525">
                 <a:noFill/>
                 <a:round/>
+                <a:headEnd/>
+                <a:tailEnd/>
               </a:ln>
+              <a:effectLst/>
             </p:spPr>
             <p:txBody>
               <a:bodyPr/>
@@ -6537,12 +6745,14 @@
                   </a:gs>
                 </a:gsLst>
                 <a:lin ang="5400000" scaled="1"/>
-                <a:tileRect/>
               </a:gradFill>
               <a:ln w="9525">
                 <a:noFill/>
                 <a:round/>
+                <a:headEnd/>
+                <a:tailEnd/>
               </a:ln>
+              <a:effectLst/>
             </p:spPr>
             <p:txBody>
               <a:bodyPr/>
@@ -6556,10 +6766,12 @@
         <p:grpSp>
           <p:nvGrpSpPr>
             <p:cNvPr id="16437" name="Group 53"/>
-            <p:cNvGrpSpPr/>
+            <p:cNvGrpSpPr>
+              <a:grpSpLocks/>
+            </p:cNvGrpSpPr>
             <p:nvPr userDrawn="1"/>
           </p:nvGrpSpPr>
-          <p:grpSpPr>
+          <p:grpSpPr bwMode="auto">
             <a:xfrm>
               <a:off x="5280" y="3024"/>
               <a:ext cx="425" cy="258"/>
@@ -6570,7 +6782,9 @@
           <p:sp>
             <p:nvSpPr>
               <p:cNvPr id="16438" name="Freeform 54"/>
-              <p:cNvSpPr/>
+              <p:cNvSpPr>
+                <a:spLocks/>
+              </p:cNvSpPr>
               <p:nvPr/>
             </p:nvSpPr>
             <p:spPr bwMode="hidden">
@@ -6579,6 +6793,9 @@
                 <a:ext cx="383" cy="96"/>
               </a:xfrm>
               <a:custGeom>
+                <a:avLst/>
+                <a:gdLst/>
+                <a:ahLst/>
                 <a:cxnLst>
                   <a:cxn ang="0">
                     <a:pos x="209" y="96"/>
@@ -6718,11 +6935,12 @@
                   </a:gs>
                 </a:gsLst>
                 <a:lin ang="5400000" scaled="1"/>
-                <a:tileRect/>
               </a:gradFill>
               <a:ln w="9525">
                 <a:noFill/>
                 <a:round/>
+                <a:headEnd/>
+                <a:tailEnd/>
               </a:ln>
             </p:spPr>
             <p:txBody>
@@ -6736,7 +6954,9 @@
           <p:sp>
             <p:nvSpPr>
               <p:cNvPr id="16439" name="Freeform 55"/>
-              <p:cNvSpPr/>
+              <p:cNvSpPr>
+                <a:spLocks/>
+              </p:cNvSpPr>
               <p:nvPr/>
             </p:nvSpPr>
             <p:spPr bwMode="hidden">
@@ -6745,6 +6965,9 @@
                 <a:ext cx="258" cy="54"/>
               </a:xfrm>
               <a:custGeom>
+                <a:avLst/>
+                <a:gdLst/>
+                <a:ahLst/>
                 <a:cxnLst>
                   <a:cxn ang="0">
                     <a:pos x="174" y="0"/>
@@ -6860,11 +7083,12 @@
                   </a:gs>
                 </a:gsLst>
                 <a:lin ang="5400000" scaled="1"/>
-                <a:tileRect/>
               </a:gradFill>
               <a:ln w="9525">
                 <a:noFill/>
                 <a:round/>
+                <a:headEnd/>
+                <a:tailEnd/>
               </a:ln>
             </p:spPr>
             <p:txBody>
@@ -6878,7 +7102,9 @@
           <p:sp>
             <p:nvSpPr>
               <p:cNvPr id="16440" name="Freeform 56"/>
-              <p:cNvSpPr/>
+              <p:cNvSpPr>
+                <a:spLocks/>
+              </p:cNvSpPr>
               <p:nvPr/>
             </p:nvSpPr>
             <p:spPr bwMode="hidden">
@@ -6887,6 +7113,9 @@
                 <a:ext cx="60" cy="156"/>
               </a:xfrm>
               <a:custGeom>
+                <a:avLst/>
+                <a:gdLst/>
+                <a:ahLst/>
                 <a:cxnLst>
                   <a:cxn ang="0">
                     <a:pos x="54" y="90"/>
@@ -7002,11 +7231,12 @@
                   </a:gs>
                 </a:gsLst>
                 <a:lin ang="5400000" scaled="1"/>
-                <a:tileRect/>
               </a:gradFill>
               <a:ln w="9525">
                 <a:noFill/>
                 <a:round/>
+                <a:headEnd/>
+                <a:tailEnd/>
               </a:ln>
             </p:spPr>
             <p:txBody>
@@ -7020,7 +7250,9 @@
           <p:sp>
             <p:nvSpPr>
               <p:cNvPr id="16441" name="Freeform 57"/>
-              <p:cNvSpPr/>
+              <p:cNvSpPr>
+                <a:spLocks/>
+              </p:cNvSpPr>
               <p:nvPr/>
             </p:nvSpPr>
             <p:spPr bwMode="hidden">
@@ -7029,6 +7261,9 @@
                 <a:ext cx="192" cy="18"/>
               </a:xfrm>
               <a:custGeom>
+                <a:avLst/>
+                <a:gdLst/>
+                <a:ahLst/>
                 <a:cxnLst>
                   <a:cxn ang="0">
                     <a:pos x="114" y="12"/>
@@ -7120,11 +7355,12 @@
                   </a:gs>
                 </a:gsLst>
                 <a:lin ang="5400000" scaled="1"/>
-                <a:tileRect/>
               </a:gradFill>
               <a:ln w="9525">
                 <a:noFill/>
                 <a:round/>
+                <a:headEnd/>
+                <a:tailEnd/>
               </a:ln>
             </p:spPr>
             <p:txBody>
@@ -7138,7 +7374,9 @@
           <p:sp>
             <p:nvSpPr>
               <p:cNvPr id="16442" name="Freeform 58"/>
-              <p:cNvSpPr/>
+              <p:cNvSpPr>
+                <a:spLocks/>
+              </p:cNvSpPr>
               <p:nvPr/>
             </p:nvSpPr>
             <p:spPr bwMode="hidden">
@@ -7147,6 +7385,9 @@
                 <a:ext cx="161" cy="186"/>
               </a:xfrm>
               <a:custGeom>
+                <a:avLst/>
+                <a:gdLst/>
+                <a:ahLst/>
                 <a:cxnLst>
                   <a:cxn ang="0">
                     <a:pos x="11" y="114"/>
@@ -7292,11 +7533,12 @@
                   </a:gs>
                 </a:gsLst>
                 <a:lin ang="5400000" scaled="1"/>
-                <a:tileRect/>
               </a:gradFill>
               <a:ln w="9525">
                 <a:noFill/>
                 <a:round/>
+                <a:headEnd/>
+                <a:tailEnd/>
               </a:ln>
             </p:spPr>
             <p:txBody>
@@ -7310,7 +7552,9 @@
           <p:sp>
             <p:nvSpPr>
               <p:cNvPr id="16443" name="Freeform 59"/>
-              <p:cNvSpPr/>
+              <p:cNvSpPr>
+                <a:spLocks/>
+              </p:cNvSpPr>
               <p:nvPr/>
             </p:nvSpPr>
             <p:spPr bwMode="hidden">
@@ -7319,6 +7563,9 @@
                 <a:ext cx="186" cy="210"/>
               </a:xfrm>
               <a:custGeom>
+                <a:avLst/>
+                <a:gdLst/>
+                <a:ahLst/>
                 <a:cxnLst>
                   <a:cxn ang="0">
                     <a:pos x="0" y="6"/>
@@ -7482,11 +7729,12 @@
                   </a:gs>
                 </a:gsLst>
                 <a:lin ang="5400000" scaled="1"/>
-                <a:tileRect/>
               </a:gradFill>
               <a:ln w="9525">
                 <a:noFill/>
                 <a:round/>
+                <a:headEnd/>
+                <a:tailEnd/>
               </a:ln>
             </p:spPr>
             <p:txBody>
@@ -7511,6 +7759,9 @@
                 <a:ext cx="299" cy="186"/>
               </a:xfrm>
               <a:custGeom>
+                <a:avLst/>
+                <a:gdLst/>
+                <a:ahLst/>
                 <a:cxnLst>
                   <a:cxn ang="0">
                     <a:pos x="150" y="0"/>
@@ -7795,11 +8046,12 @@
                   </a:gs>
                 </a:gsLst>
                 <a:lin ang="5400000" scaled="1"/>
-                <a:tileRect/>
               </a:gradFill>
               <a:ln w="9525">
                 <a:noFill/>
                 <a:round/>
+                <a:headEnd/>
+                <a:tailEnd/>
               </a:ln>
             </p:spPr>
             <p:txBody>
@@ -7813,10 +8065,12 @@
           <p:grpSp>
             <p:nvGrpSpPr>
               <p:cNvPr id="16445" name="Group 61"/>
-              <p:cNvGrpSpPr/>
+              <p:cNvGrpSpPr>
+                <a:grpSpLocks/>
+              </p:cNvGrpSpPr>
               <p:nvPr/>
             </p:nvGrpSpPr>
-            <p:grpSpPr>
+            <p:grpSpPr bwMode="auto">
               <a:xfrm>
                 <a:off x="5381" y="3085"/>
                 <a:ext cx="227" cy="132"/>
@@ -7850,12 +8104,14 @@
                     </a:gs>
                   </a:gsLst>
                   <a:lin ang="5400000" scaled="1"/>
-                  <a:tileRect/>
                 </a:gradFill>
                 <a:ln w="9525">
                   <a:noFill/>
                   <a:round/>
+                  <a:headEnd/>
+                  <a:tailEnd/>
                 </a:ln>
+                <a:effectLst/>
               </p:spPr>
               <p:txBody>
                 <a:bodyPr/>
@@ -7891,12 +8147,14 @@
                     </a:gs>
                   </a:gsLst>
                   <a:lin ang="5400000" scaled="1"/>
-                  <a:tileRect/>
                 </a:gradFill>
                 <a:ln w="9525">
                   <a:noFill/>
                   <a:round/>
+                  <a:headEnd/>
+                  <a:tailEnd/>
                 </a:ln>
+                <a:effectLst/>
               </p:spPr>
               <p:txBody>
                 <a:bodyPr/>
@@ -7932,12 +8190,14 @@
                     </a:gs>
                   </a:gsLst>
                   <a:lin ang="5400000" scaled="1"/>
-                  <a:tileRect/>
                 </a:gradFill>
                 <a:ln w="9525">
                   <a:noFill/>
                   <a:round/>
+                  <a:headEnd/>
+                  <a:tailEnd/>
                 </a:ln>
+                <a:effectLst/>
               </p:spPr>
               <p:txBody>
                 <a:bodyPr/>
@@ -7973,12 +8233,14 @@
                     </a:gs>
                   </a:gsLst>
                   <a:lin ang="5400000" scaled="1"/>
-                  <a:tileRect/>
                 </a:gradFill>
                 <a:ln w="9525">
                   <a:noFill/>
                   <a:round/>
+                  <a:headEnd/>
+                  <a:tailEnd/>
                 </a:ln>
+                <a:effectLst/>
               </p:spPr>
               <p:txBody>
                 <a:bodyPr/>
@@ -8081,8 +8343,10 @@
           <a:p>
             <a:fld id="{DAB735F9-1465-49C8-9812-CE0D68338D28}" type="datetimeFigureOut">
               <a:rPr lang="en-US"/>
+              <a:pPr/>
               <a:t>7/3/2015</a:t>
             </a:fld>
+            <a:endParaRPr lang="en-US"/>
           </a:p>
         </p:txBody>
       </p:sp>
@@ -8140,8 +8404,10 @@
           <a:p>
             <a:fld id="{8E731920-0BDE-46C6-A859-AC509080224A}" type="slidenum">
               <a:rPr lang="en-US"/>
+              <a:pPr/>
               <a:t>‹#›</a:t>
             </a:fld>
+            <a:endParaRPr lang="en-US"/>
           </a:p>
         </p:txBody>
       </p:sp>
@@ -8150,13 +8416,18 @@
   <p:clrMapOvr>
     <a:masterClrMapping/>
   </p:clrMapOvr>
-  <p:transition/>
-  <p:timing/>
+  <p:timing>
+    <p:tnLst>
+      <p:par>
+        <p:cTn id="1" dur="indefinite" restart="never" nodeType="tmRoot"/>
+      </p:par>
+    </p:tnLst>
+  </p:timing>
 </p:sldLayout>
 </file>
 
 <file path=ppt/slideLayouts/slideLayout10.xml><?xml version="1.0" encoding="utf-8"?>
-<p:sldLayout xmlns:a="http://schemas.openxmlformats.org/drawingml/2006/main" xmlns:r="http://schemas.openxmlformats.org/officeDocument/2006/relationships" xmlns:p14="http://schemas.microsoft.com/office/powerpoint/2010/main" xmlns:p15="http://schemas.microsoft.com/office/powerpoint/2012/main" xmlns:p="http://schemas.openxmlformats.org/presentationml/2006/main" type="vertTx" preserve="1">
+<p:sldLayout xmlns:a="http://schemas.openxmlformats.org/drawingml/2006/main" xmlns:r="http://schemas.openxmlformats.org/officeDocument/2006/relationships" xmlns:p="http://schemas.openxmlformats.org/presentationml/2006/main" type="vertTx" preserve="1">
   <p:cSld name="Title and Vertical Text">
     <p:spTree>
       <p:nvGrpSpPr>
@@ -8168,6 +8439,8 @@
         <a:xfrm>
           <a:off x="0" y="0"/>
           <a:ext cx="0" cy="0"/>
+          <a:chOff x="0" y="0"/>
+          <a:chExt cx="0" cy="0"/>
         </a:xfrm>
       </p:grpSpPr>
       <p:sp>
@@ -8264,8 +8537,10 @@
           <a:p>
             <a:fld id="{31D77D96-391A-4375-818D-5522124446A4}" type="datetimeFigureOut">
               <a:rPr lang="en-US"/>
+              <a:pPr/>
               <a:t>7/3/2015</a:t>
             </a:fld>
+            <a:endParaRPr lang="en-US"/>
           </a:p>
         </p:txBody>
       </p:sp>
@@ -8313,8 +8588,10 @@
           <a:p>
             <a:fld id="{1AA9AE5A-0E4F-467E-AF32-A672A8FDA163}" type="slidenum">
               <a:rPr lang="en-US"/>
+              <a:pPr/>
               <a:t>‹#›</a:t>
             </a:fld>
+            <a:endParaRPr lang="en-US"/>
           </a:p>
         </p:txBody>
       </p:sp>
@@ -8323,13 +8600,11 @@
   <p:clrMapOvr>
     <a:masterClrMapping/>
   </p:clrMapOvr>
-  <p:transition/>
-  <p:timing/>
 </p:sldLayout>
 </file>
 
 <file path=ppt/slideLayouts/slideLayout11.xml><?xml version="1.0" encoding="utf-8"?>
-<p:sldLayout xmlns:a="http://schemas.openxmlformats.org/drawingml/2006/main" xmlns:r="http://schemas.openxmlformats.org/officeDocument/2006/relationships" xmlns:p14="http://schemas.microsoft.com/office/powerpoint/2010/main" xmlns:p15="http://schemas.microsoft.com/office/powerpoint/2012/main" xmlns:p="http://schemas.openxmlformats.org/presentationml/2006/main" type="vertTitleAndTx" preserve="1">
+<p:sldLayout xmlns:a="http://schemas.openxmlformats.org/drawingml/2006/main" xmlns:r="http://schemas.openxmlformats.org/officeDocument/2006/relationships" xmlns:p="http://schemas.openxmlformats.org/presentationml/2006/main" type="vertTitleAndTx" preserve="1">
   <p:cSld name="Vertical Title and Text">
     <p:spTree>
       <p:nvGrpSpPr>
@@ -8341,6 +8616,8 @@
         <a:xfrm>
           <a:off x="0" y="0"/>
           <a:ext cx="0" cy="0"/>
+          <a:chOff x="0" y="0"/>
+          <a:chExt cx="0" cy="0"/>
         </a:xfrm>
       </p:grpSpPr>
       <p:sp>
@@ -8447,8 +8724,10 @@
           <a:p>
             <a:fld id="{53D86CB1-7F68-4C87-8C62-F680E379926D}" type="datetimeFigureOut">
               <a:rPr lang="en-US"/>
+              <a:pPr/>
               <a:t>7/3/2015</a:t>
             </a:fld>
+            <a:endParaRPr lang="en-US"/>
           </a:p>
         </p:txBody>
       </p:sp>
@@ -8496,8 +8775,10 @@
           <a:p>
             <a:fld id="{40DC653E-2CE4-456A-94C1-725A3557A1BF}" type="slidenum">
               <a:rPr lang="en-US"/>
+              <a:pPr/>
               <a:t>‹#›</a:t>
             </a:fld>
+            <a:endParaRPr lang="en-US"/>
           </a:p>
         </p:txBody>
       </p:sp>
@@ -8506,13 +8787,11 @@
   <p:clrMapOvr>
     <a:masterClrMapping/>
   </p:clrMapOvr>
-  <p:transition/>
-  <p:timing/>
 </p:sldLayout>
 </file>
 
 <file path=ppt/slideLayouts/slideLayout2.xml><?xml version="1.0" encoding="utf-8"?>
-<p:sldLayout xmlns:a="http://schemas.openxmlformats.org/drawingml/2006/main" xmlns:r="http://schemas.openxmlformats.org/officeDocument/2006/relationships" xmlns:p14="http://schemas.microsoft.com/office/powerpoint/2010/main" xmlns:p15="http://schemas.microsoft.com/office/powerpoint/2012/main" xmlns:p="http://schemas.openxmlformats.org/presentationml/2006/main" type="obj" preserve="1">
+<p:sldLayout xmlns:a="http://schemas.openxmlformats.org/drawingml/2006/main" xmlns:r="http://schemas.openxmlformats.org/officeDocument/2006/relationships" xmlns:p="http://schemas.openxmlformats.org/presentationml/2006/main" type="obj" preserve="1">
   <p:cSld name="Title and Content">
     <p:spTree>
       <p:nvGrpSpPr>
@@ -8524,6 +8803,8 @@
         <a:xfrm>
           <a:off x="0" y="0"/>
           <a:ext cx="0" cy="0"/>
+          <a:chOff x="0" y="0"/>
+          <a:chExt cx="0" cy="0"/>
         </a:xfrm>
       </p:grpSpPr>
       <p:sp>
@@ -8620,8 +8901,10 @@
           <a:p>
             <a:fld id="{92184A04-54A4-472F-8B4D-A875DADF2067}" type="datetimeFigureOut">
               <a:rPr lang="en-US"/>
+              <a:pPr/>
               <a:t>7/3/2015</a:t>
             </a:fld>
+            <a:endParaRPr lang="en-US"/>
           </a:p>
         </p:txBody>
       </p:sp>
@@ -8669,8 +8952,10 @@
           <a:p>
             <a:fld id="{A4880B40-C4F3-419F-88D2-FD9CF6DA8C75}" type="slidenum">
               <a:rPr lang="en-US"/>
+              <a:pPr/>
               <a:t>‹#›</a:t>
             </a:fld>
+            <a:endParaRPr lang="en-US"/>
           </a:p>
         </p:txBody>
       </p:sp>
@@ -8679,13 +8964,11 @@
   <p:clrMapOvr>
     <a:masterClrMapping/>
   </p:clrMapOvr>
-  <p:transition/>
-  <p:timing/>
 </p:sldLayout>
 </file>
 
 <file path=ppt/slideLayouts/slideLayout3.xml><?xml version="1.0" encoding="utf-8"?>
-<p:sldLayout xmlns:a="http://schemas.openxmlformats.org/drawingml/2006/main" xmlns:r="http://schemas.openxmlformats.org/officeDocument/2006/relationships" xmlns:p14="http://schemas.microsoft.com/office/powerpoint/2010/main" xmlns:p15="http://schemas.microsoft.com/office/powerpoint/2012/main" xmlns:p="http://schemas.openxmlformats.org/presentationml/2006/main" type="secHead" preserve="1">
+<p:sldLayout xmlns:a="http://schemas.openxmlformats.org/drawingml/2006/main" xmlns:r="http://schemas.openxmlformats.org/officeDocument/2006/relationships" xmlns:p="http://schemas.openxmlformats.org/presentationml/2006/main" type="secHead" preserve="1">
   <p:cSld name="Section Header">
     <p:spTree>
       <p:nvGrpSpPr>
@@ -8697,6 +8980,8 @@
         <a:xfrm>
           <a:off x="0" y="0"/>
           <a:ext cx="0" cy="0"/>
+          <a:chOff x="0" y="0"/>
+          <a:chExt cx="0" cy="0"/>
         </a:xfrm>
       </p:grpSpPr>
       <p:sp>
@@ -8816,8 +9101,10 @@
           <a:p>
             <a:fld id="{6CC6A98F-5A40-4A42-A5B0-0D7DB493E056}" type="datetimeFigureOut">
               <a:rPr lang="en-US"/>
+              <a:pPr/>
               <a:t>7/3/2015</a:t>
             </a:fld>
+            <a:endParaRPr lang="en-US"/>
           </a:p>
         </p:txBody>
       </p:sp>
@@ -8865,8 +9152,10 @@
           <a:p>
             <a:fld id="{2333D397-79CF-4573-BF78-59E25B2D9C96}" type="slidenum">
               <a:rPr lang="en-US"/>
+              <a:pPr/>
               <a:t>‹#›</a:t>
             </a:fld>
+            <a:endParaRPr lang="en-US"/>
           </a:p>
         </p:txBody>
       </p:sp>
@@ -8875,13 +9164,11 @@
   <p:clrMapOvr>
     <a:masterClrMapping/>
   </p:clrMapOvr>
-  <p:transition/>
-  <p:timing/>
 </p:sldLayout>
 </file>
 
 <file path=ppt/slideLayouts/slideLayout4.xml><?xml version="1.0" encoding="utf-8"?>
-<p:sldLayout xmlns:a="http://schemas.openxmlformats.org/drawingml/2006/main" xmlns:r="http://schemas.openxmlformats.org/officeDocument/2006/relationships" xmlns:p14="http://schemas.microsoft.com/office/powerpoint/2010/main" xmlns:p15="http://schemas.microsoft.com/office/powerpoint/2012/main" xmlns:p="http://schemas.openxmlformats.org/presentationml/2006/main" type="twoObj" preserve="1">
+<p:sldLayout xmlns:a="http://schemas.openxmlformats.org/drawingml/2006/main" xmlns:r="http://schemas.openxmlformats.org/officeDocument/2006/relationships" xmlns:p="http://schemas.openxmlformats.org/presentationml/2006/main" type="twoObj" preserve="1">
   <p:cSld name="Two Content">
     <p:spTree>
       <p:nvGrpSpPr>
@@ -8893,6 +9180,8 @@
         <a:xfrm>
           <a:off x="0" y="0"/>
           <a:ext cx="0" cy="0"/>
+          <a:chOff x="0" y="0"/>
+          <a:chExt cx="0" cy="0"/>
         </a:xfrm>
       </p:grpSpPr>
       <p:sp>
@@ -9106,8 +9395,10 @@
           <a:p>
             <a:fld id="{1BA54017-AAA9-4966-88B6-61C08F322DD4}" type="datetimeFigureOut">
               <a:rPr lang="en-US"/>
+              <a:pPr/>
               <a:t>7/3/2015</a:t>
             </a:fld>
+            <a:endParaRPr lang="en-US"/>
           </a:p>
         </p:txBody>
       </p:sp>
@@ -9155,8 +9446,10 @@
           <a:p>
             <a:fld id="{DAAE48EC-5505-4A06-91B6-DB50510D79B5}" type="slidenum">
               <a:rPr lang="en-US"/>
+              <a:pPr/>
               <a:t>‹#›</a:t>
             </a:fld>
+            <a:endParaRPr lang="en-US"/>
           </a:p>
         </p:txBody>
       </p:sp>
@@ -9165,13 +9458,11 @@
   <p:clrMapOvr>
     <a:masterClrMapping/>
   </p:clrMapOvr>
-  <p:transition/>
-  <p:timing/>
 </p:sldLayout>
 </file>
 
 <file path=ppt/slideLayouts/slideLayout5.xml><?xml version="1.0" encoding="utf-8"?>
-<p:sldLayout xmlns:a="http://schemas.openxmlformats.org/drawingml/2006/main" xmlns:r="http://schemas.openxmlformats.org/officeDocument/2006/relationships" xmlns:p14="http://schemas.microsoft.com/office/powerpoint/2010/main" xmlns:p15="http://schemas.microsoft.com/office/powerpoint/2012/main" xmlns:p="http://schemas.openxmlformats.org/presentationml/2006/main" type="twoTxTwoObj" preserve="1">
+<p:sldLayout xmlns:a="http://schemas.openxmlformats.org/drawingml/2006/main" xmlns:r="http://schemas.openxmlformats.org/officeDocument/2006/relationships" xmlns:p="http://schemas.openxmlformats.org/presentationml/2006/main" type="twoTxTwoObj" preserve="1">
   <p:cSld name="Comparison">
     <p:spTree>
       <p:nvGrpSpPr>
@@ -9183,6 +9474,8 @@
         <a:xfrm>
           <a:off x="0" y="0"/>
           <a:ext cx="0" cy="0"/>
+          <a:chOff x="0" y="0"/>
+          <a:chExt cx="0" cy="0"/>
         </a:xfrm>
       </p:grpSpPr>
       <p:sp>
@@ -9535,8 +9828,10 @@
           <a:p>
             <a:fld id="{C14BFD42-95A8-491B-8FD5-5033584B4632}" type="datetimeFigureOut">
               <a:rPr lang="en-US"/>
+              <a:pPr/>
               <a:t>7/3/2015</a:t>
             </a:fld>
+            <a:endParaRPr lang="en-US"/>
           </a:p>
         </p:txBody>
       </p:sp>
@@ -9584,8 +9879,10 @@
           <a:p>
             <a:fld id="{90849084-8E58-435F-AB9E-D541B48C4836}" type="slidenum">
               <a:rPr lang="en-US"/>
+              <a:pPr/>
               <a:t>‹#›</a:t>
             </a:fld>
+            <a:endParaRPr lang="en-US"/>
           </a:p>
         </p:txBody>
       </p:sp>
@@ -9594,13 +9891,11 @@
   <p:clrMapOvr>
     <a:masterClrMapping/>
   </p:clrMapOvr>
-  <p:transition/>
-  <p:timing/>
 </p:sldLayout>
 </file>
 
 <file path=ppt/slideLayouts/slideLayout6.xml><?xml version="1.0" encoding="utf-8"?>
-<p:sldLayout xmlns:a="http://schemas.openxmlformats.org/drawingml/2006/main" xmlns:r="http://schemas.openxmlformats.org/officeDocument/2006/relationships" xmlns:p14="http://schemas.microsoft.com/office/powerpoint/2010/main" xmlns:p15="http://schemas.microsoft.com/office/powerpoint/2012/main" xmlns:p="http://schemas.openxmlformats.org/presentationml/2006/main" type="titleOnly" preserve="1">
+<p:sldLayout xmlns:a="http://schemas.openxmlformats.org/drawingml/2006/main" xmlns:r="http://schemas.openxmlformats.org/officeDocument/2006/relationships" xmlns:p="http://schemas.openxmlformats.org/presentationml/2006/main" type="titleOnly" preserve="1">
   <p:cSld name="Title Only">
     <p:spTree>
       <p:nvGrpSpPr>
@@ -9612,6 +9907,8 @@
         <a:xfrm>
           <a:off x="0" y="0"/>
           <a:ext cx="0" cy="0"/>
+          <a:chOff x="0" y="0"/>
+          <a:chExt cx="0" cy="0"/>
         </a:xfrm>
       </p:grpSpPr>
       <p:sp>
@@ -9657,8 +9954,10 @@
           <a:p>
             <a:fld id="{A01ED480-B474-4FF1-A8A6-8BA796E9C451}" type="datetimeFigureOut">
               <a:rPr lang="en-US"/>
+              <a:pPr/>
               <a:t>7/3/2015</a:t>
             </a:fld>
+            <a:endParaRPr lang="en-US"/>
           </a:p>
         </p:txBody>
       </p:sp>
@@ -9706,8 +10005,10 @@
           <a:p>
             <a:fld id="{681212CD-3FB2-417E-A700-9C6635A9CDA3}" type="slidenum">
               <a:rPr lang="en-US"/>
+              <a:pPr/>
               <a:t>‹#›</a:t>
             </a:fld>
+            <a:endParaRPr lang="en-US"/>
           </a:p>
         </p:txBody>
       </p:sp>
@@ -9716,13 +10017,11 @@
   <p:clrMapOvr>
     <a:masterClrMapping/>
   </p:clrMapOvr>
-  <p:transition/>
-  <p:timing/>
 </p:sldLayout>
 </file>
 
 <file path=ppt/slideLayouts/slideLayout7.xml><?xml version="1.0" encoding="utf-8"?>
-<p:sldLayout xmlns:a="http://schemas.openxmlformats.org/drawingml/2006/main" xmlns:r="http://schemas.openxmlformats.org/officeDocument/2006/relationships" xmlns:p14="http://schemas.microsoft.com/office/powerpoint/2010/main" xmlns:p15="http://schemas.microsoft.com/office/powerpoint/2012/main" xmlns:p="http://schemas.openxmlformats.org/presentationml/2006/main" type="blank" preserve="1">
+<p:sldLayout xmlns:a="http://schemas.openxmlformats.org/drawingml/2006/main" xmlns:r="http://schemas.openxmlformats.org/officeDocument/2006/relationships" xmlns:p="http://schemas.openxmlformats.org/presentationml/2006/main" type="blank" preserve="1">
   <p:cSld name="Blank">
     <p:spTree>
       <p:nvGrpSpPr>
@@ -9734,6 +10033,8 @@
         <a:xfrm>
           <a:off x="0" y="0"/>
           <a:ext cx="0" cy="0"/>
+          <a:chOff x="0" y="0"/>
+          <a:chExt cx="0" cy="0"/>
         </a:xfrm>
       </p:grpSpPr>
       <p:sp>
@@ -9757,8 +10058,10 @@
           <a:p>
             <a:fld id="{895DBBBC-4629-4D4F-82EF-EF2844C56C4D}" type="datetimeFigureOut">
               <a:rPr lang="en-US"/>
+              <a:pPr/>
               <a:t>7/3/2015</a:t>
             </a:fld>
+            <a:endParaRPr lang="en-US"/>
           </a:p>
         </p:txBody>
       </p:sp>
@@ -9806,8 +10109,10 @@
           <a:p>
             <a:fld id="{24819197-F007-4A2B-9395-55DB50924193}" type="slidenum">
               <a:rPr lang="en-US"/>
+              <a:pPr/>
               <a:t>‹#›</a:t>
             </a:fld>
+            <a:endParaRPr lang="en-US"/>
           </a:p>
         </p:txBody>
       </p:sp>
@@ -9816,13 +10121,11 @@
   <p:clrMapOvr>
     <a:masterClrMapping/>
   </p:clrMapOvr>
-  <p:transition/>
-  <p:timing/>
 </p:sldLayout>
 </file>
 
 <file path=ppt/slideLayouts/slideLayout8.xml><?xml version="1.0" encoding="utf-8"?>
-<p:sldLayout xmlns:a="http://schemas.openxmlformats.org/drawingml/2006/main" xmlns:r="http://schemas.openxmlformats.org/officeDocument/2006/relationships" xmlns:p14="http://schemas.microsoft.com/office/powerpoint/2010/main" xmlns:p15="http://schemas.microsoft.com/office/powerpoint/2012/main" xmlns:p="http://schemas.openxmlformats.org/presentationml/2006/main" type="objTx" preserve="1">
+<p:sldLayout xmlns:a="http://schemas.openxmlformats.org/drawingml/2006/main" xmlns:r="http://schemas.openxmlformats.org/officeDocument/2006/relationships" xmlns:p="http://schemas.openxmlformats.org/presentationml/2006/main" type="objTx" preserve="1">
   <p:cSld name="Content with Caption">
     <p:spTree>
       <p:nvGrpSpPr>
@@ -9834,6 +10137,8 @@
         <a:xfrm>
           <a:off x="0" y="0"/>
           <a:ext cx="0" cy="0"/>
+          <a:chOff x="0" y="0"/>
+          <a:chExt cx="0" cy="0"/>
         </a:xfrm>
       </p:grpSpPr>
       <p:sp>
@@ -10037,8 +10342,10 @@
           <a:p>
             <a:fld id="{2F115FD5-6359-42C4-923E-C0F966879EE2}" type="datetimeFigureOut">
               <a:rPr lang="en-US"/>
+              <a:pPr/>
               <a:t>7/3/2015</a:t>
             </a:fld>
+            <a:endParaRPr lang="en-US"/>
           </a:p>
         </p:txBody>
       </p:sp>
@@ -10086,8 +10393,10 @@
           <a:p>
             <a:fld id="{26EF36FD-4A21-4390-9F90-388F6D0F0C98}" type="slidenum">
               <a:rPr lang="en-US"/>
+              <a:pPr/>
               <a:t>‹#›</a:t>
             </a:fld>
+            <a:endParaRPr lang="en-US"/>
           </a:p>
         </p:txBody>
       </p:sp>
@@ -10096,13 +10405,11 @@
   <p:clrMapOvr>
     <a:masterClrMapping/>
   </p:clrMapOvr>
-  <p:transition/>
-  <p:timing/>
 </p:sldLayout>
 </file>
 
 <file path=ppt/slideLayouts/slideLayout9.xml><?xml version="1.0" encoding="utf-8"?>
-<p:sldLayout xmlns:a="http://schemas.openxmlformats.org/drawingml/2006/main" xmlns:r="http://schemas.openxmlformats.org/officeDocument/2006/relationships" xmlns:p14="http://schemas.microsoft.com/office/powerpoint/2010/main" xmlns:p15="http://schemas.microsoft.com/office/powerpoint/2012/main" xmlns:p="http://schemas.openxmlformats.org/presentationml/2006/main" type="picTx" preserve="1">
+<p:sldLayout xmlns:a="http://schemas.openxmlformats.org/drawingml/2006/main" xmlns:r="http://schemas.openxmlformats.org/officeDocument/2006/relationships" xmlns:p="http://schemas.openxmlformats.org/presentationml/2006/main" type="picTx" preserve="1">
   <p:cSld name="Picture with Caption">
     <p:spTree>
       <p:nvGrpSpPr>
@@ -10114,6 +10421,8 @@
         <a:xfrm>
           <a:off x="0" y="0"/>
           <a:ext cx="0" cy="0"/>
+          <a:chOff x="0" y="0"/>
+          <a:chExt cx="0" cy="0"/>
         </a:xfrm>
       </p:grpSpPr>
       <p:sp>
@@ -10294,8 +10603,10 @@
           <a:p>
             <a:fld id="{760E2472-C22E-4089-9160-E8F32CC63BB8}" type="datetimeFigureOut">
               <a:rPr lang="en-US"/>
+              <a:pPr/>
               <a:t>7/3/2015</a:t>
             </a:fld>
+            <a:endParaRPr lang="en-US"/>
           </a:p>
         </p:txBody>
       </p:sp>
@@ -10343,8 +10654,10 @@
           <a:p>
             <a:fld id="{7E814312-7F1D-46D1-B99C-1D90EA0C3704}" type="slidenum">
               <a:rPr lang="en-US"/>
+              <a:pPr/>
               <a:t>‹#›</a:t>
             </a:fld>
+            <a:endParaRPr lang="en-US"/>
           </a:p>
         </p:txBody>
       </p:sp>
@@ -10353,13 +10666,11 @@
   <p:clrMapOvr>
     <a:masterClrMapping/>
   </p:clrMapOvr>
-  <p:transition/>
-  <p:timing/>
 </p:sldLayout>
 </file>
 
 <file path=ppt/slideMasters/slideMaster1.xml><?xml version="1.0" encoding="utf-8"?>
-<p:sldMaster xmlns:a="http://schemas.openxmlformats.org/drawingml/2006/main" xmlns:r="http://schemas.openxmlformats.org/officeDocument/2006/relationships" xmlns:p14="http://schemas.microsoft.com/office/powerpoint/2010/main" xmlns:p15="http://schemas.microsoft.com/office/powerpoint/2012/main" xmlns:p="http://schemas.openxmlformats.org/presentationml/2006/main">
+<p:sldMaster xmlns:a="http://schemas.openxmlformats.org/drawingml/2006/main" xmlns:r="http://schemas.openxmlformats.org/officeDocument/2006/relationships" xmlns:p="http://schemas.openxmlformats.org/presentationml/2006/main">
   <p:cSld>
     <p:bg>
       <p:bgPr>
@@ -10379,12 +10690,16 @@
         <a:xfrm>
           <a:off x="0" y="0"/>
           <a:ext cx="0" cy="0"/>
+          <a:chOff x="0" y="0"/>
+          <a:chExt cx="0" cy="0"/>
         </a:xfrm>
       </p:grpSpPr>
       <p:sp>
         <p:nvSpPr>
           <p:cNvPr id="15362" name="Freeform 2"/>
-          <p:cNvSpPr/>
+          <p:cNvSpPr>
+            <a:spLocks/>
+          </p:cNvSpPr>
           <p:nvPr/>
         </p:nvSpPr>
         <p:spPr bwMode="hidden">
@@ -10393,6 +10708,9 @@
             <a:ext cx="285750" cy="209550"/>
           </a:xfrm>
           <a:custGeom>
+            <a:avLst/>
+            <a:gdLst/>
+            <a:ahLst/>
             <a:cxnLst>
               <a:cxn ang="0">
                 <a:pos x="0" y="132"/>
@@ -10494,11 +10812,12 @@
               </a:gs>
             </a:gsLst>
             <a:lin ang="18900000" scaled="1"/>
-            <a:tileRect/>
           </a:gradFill>
           <a:ln w="9525">
             <a:noFill/>
             <a:round/>
+            <a:headEnd/>
+            <a:tailEnd/>
           </a:ln>
         </p:spPr>
         <p:txBody>
@@ -10512,10 +10831,12 @@
       <p:grpSp>
         <p:nvGrpSpPr>
           <p:cNvPr id="15363" name="Group 3"/>
-          <p:cNvGrpSpPr/>
+          <p:cNvGrpSpPr>
+            <a:grpSpLocks/>
+          </p:cNvGrpSpPr>
           <p:nvPr/>
         </p:nvGrpSpPr>
-        <p:grpSpPr>
+        <p:grpSpPr bwMode="auto">
           <a:xfrm>
             <a:off x="3175" y="4267200"/>
             <a:ext cx="9140825" cy="2590800"/>
@@ -10526,7 +10847,9 @@
         <p:sp>
           <p:nvSpPr>
             <p:cNvPr id="15364" name="Freeform 4"/>
-            <p:cNvSpPr/>
+            <p:cNvSpPr>
+              <a:spLocks/>
+            </p:cNvSpPr>
             <p:nvPr/>
           </p:nvSpPr>
           <p:spPr bwMode="hidden">
@@ -10535,6 +10858,9 @@
               <a:ext cx="5758" cy="1632"/>
             </a:xfrm>
             <a:custGeom>
+              <a:avLst/>
+              <a:gdLst/>
+              <a:ahLst/>
               <a:cxnLst>
                 <a:cxn ang="0">
                   <a:pos x="5740" y="4316"/>
@@ -10590,11 +10916,12 @@
                 </a:gs>
               </a:gsLst>
               <a:lin ang="5400000" scaled="1"/>
-              <a:tileRect/>
             </a:gradFill>
             <a:ln w="9525">
               <a:noFill/>
               <a:round/>
+              <a:headEnd/>
+              <a:tailEnd/>
             </a:ln>
           </p:spPr>
           <p:txBody>
@@ -10608,10 +10935,12 @@
         <p:grpSp>
           <p:nvGrpSpPr>
             <p:cNvPr id="15365" name="Group 5"/>
-            <p:cNvGrpSpPr/>
+            <p:cNvGrpSpPr>
+              <a:grpSpLocks/>
+            </p:cNvGrpSpPr>
             <p:nvPr userDrawn="1"/>
           </p:nvGrpSpPr>
-          <p:grpSpPr>
+          <p:grpSpPr bwMode="auto">
             <a:xfrm>
               <a:off x="3528" y="3715"/>
               <a:ext cx="792" cy="521"/>
@@ -10651,12 +10980,14 @@
                 <a:path path="shape">
                   <a:fillToRect l="50000" t="50000" r="50000" b="50000"/>
                 </a:path>
-                <a:tileRect/>
               </a:gradFill>
               <a:ln w="9525">
                 <a:noFill/>
                 <a:round/>
+                <a:headEnd/>
+                <a:tailEnd/>
               </a:ln>
+              <a:effectLst/>
             </p:spPr>
             <p:txBody>
               <a:bodyPr/>
@@ -10696,12 +11027,14 @@
                   </a:gs>
                 </a:gsLst>
                 <a:lin ang="5400000" scaled="1"/>
-                <a:tileRect/>
               </a:gradFill>
               <a:ln w="9525">
                 <a:noFill/>
                 <a:round/>
+                <a:headEnd/>
+                <a:tailEnd/>
               </a:ln>
+              <a:effectLst/>
             </p:spPr>
             <p:txBody>
               <a:bodyPr/>
@@ -10741,12 +11074,14 @@
                   </a:gs>
                 </a:gsLst>
                 <a:lin ang="5400000" scaled="1"/>
-                <a:tileRect/>
               </a:gradFill>
               <a:ln w="9525">
                 <a:noFill/>
                 <a:round/>
+                <a:headEnd/>
+                <a:tailEnd/>
               </a:ln>
+              <a:effectLst/>
             </p:spPr>
             <p:txBody>
               <a:bodyPr/>
@@ -10786,12 +11121,14 @@
                   </a:gs>
                 </a:gsLst>
                 <a:lin ang="5400000" scaled="1"/>
-                <a:tileRect/>
               </a:gradFill>
               <a:ln w="9525">
                 <a:noFill/>
                 <a:round/>
+                <a:headEnd/>
+                <a:tailEnd/>
               </a:ln>
+              <a:effectLst/>
             </p:spPr>
             <p:txBody>
               <a:bodyPr/>
@@ -10831,12 +11168,14 @@
                   </a:gs>
                 </a:gsLst>
                 <a:lin ang="5400000" scaled="1"/>
-                <a:tileRect/>
               </a:gradFill>
               <a:ln w="9525">
                 <a:noFill/>
                 <a:round/>
+                <a:headEnd/>
+                <a:tailEnd/>
               </a:ln>
+              <a:effectLst/>
             </p:spPr>
             <p:txBody>
               <a:bodyPr/>
@@ -10849,7 +11188,9 @@
           <p:sp>
             <p:nvSpPr>
               <p:cNvPr id="15371" name="Freeform 11"/>
-              <p:cNvSpPr/>
+              <p:cNvSpPr>
+                <a:spLocks/>
+              </p:cNvSpPr>
               <p:nvPr/>
             </p:nvSpPr>
             <p:spPr bwMode="hidden">
@@ -10858,6 +11199,9 @@
                 <a:ext cx="383" cy="161"/>
               </a:xfrm>
               <a:custGeom>
+                <a:avLst/>
+                <a:gdLst/>
+                <a:ahLst/>
                 <a:cxnLst>
                   <a:cxn ang="0">
                     <a:pos x="376" y="12"/>
@@ -10995,11 +11339,12 @@
                   </a:gs>
                 </a:gsLst>
                 <a:lin ang="5400000" scaled="1"/>
-                <a:tileRect/>
               </a:gradFill>
               <a:ln w="9525">
                 <a:noFill/>
                 <a:round/>
+                <a:headEnd/>
+                <a:tailEnd/>
               </a:ln>
             </p:spPr>
             <p:txBody>
@@ -11013,7 +11358,9 @@
           <p:sp>
             <p:nvSpPr>
               <p:cNvPr id="15372" name="Freeform 12"/>
-              <p:cNvSpPr/>
+              <p:cNvSpPr>
+                <a:spLocks/>
+              </p:cNvSpPr>
               <p:nvPr/>
             </p:nvSpPr>
             <p:spPr bwMode="hidden">
@@ -11022,6 +11369,9 @@
                 <a:ext cx="444" cy="66"/>
               </a:xfrm>
               <a:custGeom>
+                <a:avLst/>
+                <a:gdLst/>
+                <a:ahLst/>
                 <a:cxnLst>
                   <a:cxn ang="0">
                     <a:pos x="257" y="54"/>
@@ -11074,7 +11424,7 @@
                 </a:cxnLst>
                 <a:rect l="0" t="0" r="r" b="b"/>
                 <a:pathLst>
-                  <a:path w="442" h="66">
+                  <a:path w="443" h="66">
                     <a:moveTo>
                       <a:pt x="257" y="54"/>
                     </a:moveTo>
@@ -11141,11 +11491,12 @@
                   </a:gs>
                 </a:gsLst>
                 <a:lin ang="18900000" scaled="1"/>
-                <a:tileRect/>
               </a:gradFill>
               <a:ln w="9525">
                 <a:noFill/>
                 <a:round/>
+                <a:headEnd/>
+                <a:tailEnd/>
               </a:ln>
             </p:spPr>
             <p:txBody>
@@ -11159,7 +11510,9 @@
           <p:sp>
             <p:nvSpPr>
               <p:cNvPr id="15373" name="Freeform 13"/>
-              <p:cNvSpPr/>
+              <p:cNvSpPr>
+                <a:spLocks/>
+              </p:cNvSpPr>
               <p:nvPr/>
             </p:nvSpPr>
             <p:spPr bwMode="hidden">
@@ -11168,6 +11521,9 @@
                 <a:ext cx="89" cy="216"/>
               </a:xfrm>
               <a:custGeom>
+                <a:avLst/>
+                <a:gdLst/>
+                <a:ahLst/>
                 <a:cxnLst>
                   <a:cxn ang="0">
                     <a:pos x="12" y="66"/>
@@ -11287,11 +11643,12 @@
                   </a:gs>
                 </a:gsLst>
                 <a:lin ang="5400000" scaled="1"/>
-                <a:tileRect/>
               </a:gradFill>
               <a:ln w="9525">
                 <a:noFill/>
                 <a:round/>
+                <a:headEnd/>
+                <a:tailEnd/>
               </a:ln>
             </p:spPr>
             <p:txBody>
@@ -11305,7 +11662,9 @@
           <p:sp>
             <p:nvSpPr>
               <p:cNvPr id="15374" name="Freeform 14"/>
-              <p:cNvSpPr/>
+              <p:cNvSpPr>
+                <a:spLocks/>
+              </p:cNvSpPr>
               <p:nvPr/>
             </p:nvSpPr>
             <p:spPr bwMode="hidden">
@@ -11314,6 +11673,9 @@
                 <a:ext cx="750" cy="461"/>
               </a:xfrm>
               <a:custGeom>
+                <a:avLst/>
+                <a:gdLst/>
+                <a:ahLst/>
                 <a:cxnLst>
                   <a:cxn ang="0">
                     <a:pos x="382" y="443"/>
@@ -11675,11 +12037,12 @@
                 <a:path path="rect">
                   <a:fillToRect l="50000" t="50000" r="50000" b="50000"/>
                 </a:path>
-                <a:tileRect/>
               </a:gradFill>
               <a:ln w="9525">
                 <a:noFill/>
                 <a:round/>
+                <a:headEnd/>
+                <a:tailEnd/>
               </a:ln>
             </p:spPr>
             <p:txBody>
@@ -11693,7 +12056,9 @@
           <p:sp>
             <p:nvSpPr>
               <p:cNvPr id="15375" name="Freeform 15"/>
-              <p:cNvSpPr/>
+              <p:cNvSpPr>
+                <a:spLocks/>
+              </p:cNvSpPr>
               <p:nvPr/>
             </p:nvSpPr>
             <p:spPr bwMode="hidden">
@@ -11702,6 +12067,9 @@
                 <a:ext cx="96" cy="30"/>
               </a:xfrm>
               <a:custGeom>
+                <a:avLst/>
+                <a:gdLst/>
+                <a:ahLst/>
                 <a:cxnLst>
                   <a:cxn ang="0">
                     <a:pos x="0" y="0"/>
@@ -11779,11 +12147,12 @@
                   </a:gs>
                 </a:gsLst>
                 <a:lin ang="0" scaled="1"/>
-                <a:tileRect/>
               </a:gradFill>
               <a:ln w="9525">
                 <a:noFill/>
                 <a:round/>
+                <a:headEnd/>
+                <a:tailEnd/>
               </a:ln>
             </p:spPr>
             <p:txBody>
@@ -11824,12 +12193,14 @@
                   </a:gs>
                 </a:gsLst>
                 <a:lin ang="5400000" scaled="1"/>
-                <a:tileRect/>
               </a:gradFill>
               <a:ln w="9525">
                 <a:noFill/>
                 <a:round/>
+                <a:headEnd/>
+                <a:tailEnd/>
               </a:ln>
+              <a:effectLst/>
             </p:spPr>
             <p:txBody>
               <a:bodyPr/>
@@ -11843,10 +12214,12 @@
         <p:grpSp>
           <p:nvGrpSpPr>
             <p:cNvPr id="15377" name="Group 17"/>
-            <p:cNvGrpSpPr/>
+            <p:cNvGrpSpPr>
+              <a:grpSpLocks/>
+            </p:cNvGrpSpPr>
             <p:nvPr userDrawn="1"/>
           </p:nvGrpSpPr>
-          <p:grpSpPr>
+          <p:grpSpPr bwMode="auto">
             <a:xfrm>
               <a:off x="1776" y="3631"/>
               <a:ext cx="1626" cy="683"/>
@@ -11884,12 +12257,14 @@
                   </a:gs>
                 </a:gsLst>
                 <a:lin ang="2700000" scaled="1"/>
-                <a:tileRect/>
               </a:gradFill>
               <a:ln w="9525">
                 <a:noFill/>
                 <a:round/>
+                <a:headEnd/>
+                <a:tailEnd/>
               </a:ln>
+              <a:effectLst/>
             </p:spPr>
             <p:txBody>
               <a:bodyPr/>
@@ -11929,12 +12304,14 @@
                   </a:gs>
                 </a:gsLst>
                 <a:lin ang="2700000" scaled="1"/>
-                <a:tileRect/>
               </a:gradFill>
               <a:ln w="9525">
                 <a:noFill/>
                 <a:round/>
+                <a:headEnd/>
+                <a:tailEnd/>
               </a:ln>
+              <a:effectLst/>
             </p:spPr>
             <p:txBody>
               <a:bodyPr/>
@@ -11974,12 +12351,14 @@
                   </a:gs>
                 </a:gsLst>
                 <a:lin ang="2700000" scaled="1"/>
-                <a:tileRect/>
               </a:gradFill>
               <a:ln w="9525">
                 <a:noFill/>
                 <a:round/>
+                <a:headEnd/>
+                <a:tailEnd/>
               </a:ln>
+              <a:effectLst/>
             </p:spPr>
             <p:txBody>
               <a:bodyPr/>
@@ -12019,12 +12398,14 @@
                   </a:gs>
                 </a:gsLst>
                 <a:lin ang="5400000" scaled="1"/>
-                <a:tileRect/>
               </a:gradFill>
               <a:ln w="9525">
                 <a:noFill/>
                 <a:round/>
+                <a:headEnd/>
+                <a:tailEnd/>
               </a:ln>
+              <a:effectLst/>
             </p:spPr>
             <p:txBody>
               <a:bodyPr/>
@@ -12064,12 +12445,14 @@
                   </a:gs>
                 </a:gsLst>
                 <a:lin ang="5400000" scaled="1"/>
-                <a:tileRect/>
               </a:gradFill>
               <a:ln w="9525">
                 <a:noFill/>
                 <a:round/>
+                <a:headEnd/>
+                <a:tailEnd/>
               </a:ln>
+              <a:effectLst/>
             </p:spPr>
             <p:txBody>
               <a:bodyPr/>
@@ -12109,12 +12492,14 @@
                   </a:gs>
                 </a:gsLst>
                 <a:lin ang="5400000" scaled="1"/>
-                <a:tileRect/>
               </a:gradFill>
               <a:ln w="9525">
                 <a:noFill/>
                 <a:round/>
+                <a:headEnd/>
+                <a:tailEnd/>
               </a:ln>
+              <a:effectLst/>
             </p:spPr>
             <p:txBody>
               <a:bodyPr/>
@@ -12154,12 +12539,14 @@
                   </a:gs>
                 </a:gsLst>
                 <a:lin ang="2700000" scaled="1"/>
-                <a:tileRect/>
               </a:gradFill>
               <a:ln w="9525">
                 <a:noFill/>
                 <a:round/>
+                <a:headEnd/>
+                <a:tailEnd/>
               </a:ln>
+              <a:effectLst/>
             </p:spPr>
             <p:txBody>
               <a:bodyPr/>
@@ -12199,12 +12586,14 @@
                   </a:gs>
                 </a:gsLst>
                 <a:lin ang="0" scaled="1"/>
-                <a:tileRect/>
               </a:gradFill>
               <a:ln w="9525">
                 <a:noFill/>
                 <a:round/>
+                <a:headEnd/>
+                <a:tailEnd/>
               </a:ln>
+              <a:effectLst/>
             </p:spPr>
             <p:txBody>
               <a:bodyPr/>
@@ -12217,7 +12606,9 @@
           <p:sp>
             <p:nvSpPr>
               <p:cNvPr id="15386" name="Freeform 26"/>
-              <p:cNvSpPr/>
+              <p:cNvSpPr>
+                <a:spLocks/>
+              </p:cNvSpPr>
               <p:nvPr/>
             </p:nvSpPr>
             <p:spPr bwMode="hidden">
@@ -12226,6 +12617,9 @@
                 <a:ext cx="449" cy="186"/>
               </a:xfrm>
               <a:custGeom>
+                <a:avLst/>
+                <a:gdLst/>
+                <a:ahLst/>
                 <a:cxnLst>
                   <a:cxn ang="0">
                     <a:pos x="6" y="6"/>
@@ -12387,11 +12781,12 @@
                   </a:gs>
                 </a:gsLst>
                 <a:lin ang="5400000" scaled="1"/>
-                <a:tileRect/>
               </a:gradFill>
               <a:ln w="9525">
                 <a:noFill/>
                 <a:round/>
+                <a:headEnd/>
+                <a:tailEnd/>
               </a:ln>
             </p:spPr>
             <p:txBody>
@@ -12405,7 +12800,9 @@
           <p:sp>
             <p:nvSpPr>
               <p:cNvPr id="15387" name="Freeform 27"/>
-              <p:cNvSpPr/>
+              <p:cNvSpPr>
+                <a:spLocks/>
+              </p:cNvSpPr>
               <p:nvPr/>
             </p:nvSpPr>
             <p:spPr bwMode="hidden">
@@ -12414,6 +12811,9 @@
                 <a:ext cx="892" cy="462"/>
               </a:xfrm>
               <a:custGeom>
+                <a:avLst/>
+                <a:gdLst/>
+                <a:ahLst/>
                 <a:cxnLst>
                   <a:cxn ang="0">
                     <a:pos x="23" y="276"/>
@@ -12749,11 +13149,12 @@
                   </a:gs>
                 </a:gsLst>
                 <a:lin ang="2700000" scaled="1"/>
-                <a:tileRect/>
               </a:gradFill>
               <a:ln w="9525">
                 <a:noFill/>
                 <a:round/>
+                <a:headEnd/>
+                <a:tailEnd/>
               </a:ln>
             </p:spPr>
             <p:txBody>
@@ -12767,7 +13168,9 @@
           <p:sp>
             <p:nvSpPr>
               <p:cNvPr id="15388" name="Freeform 28"/>
-              <p:cNvSpPr/>
+              <p:cNvSpPr>
+                <a:spLocks/>
+              </p:cNvSpPr>
               <p:nvPr/>
             </p:nvSpPr>
             <p:spPr bwMode="hidden">
@@ -12776,6 +13179,9 @@
                 <a:ext cx="407" cy="486"/>
               </a:xfrm>
               <a:custGeom>
+                <a:avLst/>
+                <a:gdLst/>
+                <a:ahLst/>
                 <a:cxnLst>
                   <a:cxn ang="0">
                     <a:pos x="18" y="300"/>
@@ -12967,11 +13373,12 @@
                   </a:gs>
                 </a:gsLst>
                 <a:lin ang="0" scaled="1"/>
-                <a:tileRect/>
               </a:gradFill>
               <a:ln w="9525">
                 <a:noFill/>
                 <a:round/>
+                <a:headEnd/>
+                <a:tailEnd/>
               </a:ln>
             </p:spPr>
             <p:txBody>
@@ -12985,7 +13392,9 @@
           <p:sp>
             <p:nvSpPr>
               <p:cNvPr id="15389" name="Freeform 29"/>
-              <p:cNvSpPr/>
+              <p:cNvSpPr>
+                <a:spLocks/>
+              </p:cNvSpPr>
               <p:nvPr/>
             </p:nvSpPr>
             <p:spPr bwMode="hidden">
@@ -12994,6 +13403,9 @@
                 <a:ext cx="108" cy="252"/>
               </a:xfrm>
               <a:custGeom>
+                <a:avLst/>
+                <a:gdLst/>
+                <a:ahLst/>
                 <a:cxnLst>
                   <a:cxn ang="0">
                     <a:pos x="89" y="84"/>
@@ -13046,7 +13458,7 @@
                 </a:cxnLst>
                 <a:rect l="0" t="0" r="r" b="b"/>
                 <a:pathLst>
-                  <a:path w="107" h="251">
+                  <a:path w="107" h="252">
                     <a:moveTo>
                       <a:pt x="89" y="84"/>
                     </a:moveTo>
@@ -13113,11 +13525,12 @@
                   </a:gs>
                 </a:gsLst>
                 <a:lin ang="5400000" scaled="1"/>
-                <a:tileRect/>
               </a:gradFill>
               <a:ln w="9525">
                 <a:noFill/>
                 <a:round/>
+                <a:headEnd/>
+                <a:tailEnd/>
               </a:ln>
             </p:spPr>
             <p:txBody>
@@ -13131,7 +13544,9 @@
           <p:sp>
             <p:nvSpPr>
               <p:cNvPr id="15390" name="Freeform 30"/>
-              <p:cNvSpPr/>
+              <p:cNvSpPr>
+                <a:spLocks/>
+              </p:cNvSpPr>
               <p:nvPr/>
             </p:nvSpPr>
             <p:spPr bwMode="hidden">
@@ -13140,6 +13555,9 @@
                 <a:ext cx="835" cy="150"/>
               </a:xfrm>
               <a:custGeom>
+                <a:avLst/>
+                <a:gdLst/>
+                <a:ahLst/>
                 <a:cxnLst>
                   <a:cxn ang="0">
                     <a:pos x="518" y="18"/>
@@ -13275,6 +13693,8 @@
               <a:ln w="9525">
                 <a:noFill/>
                 <a:round/>
+                <a:headEnd/>
+                <a:tailEnd/>
               </a:ln>
             </p:spPr>
             <p:txBody>
@@ -13288,7 +13708,9 @@
           <p:sp>
             <p:nvSpPr>
               <p:cNvPr id="15391" name="Freeform 31"/>
-              <p:cNvSpPr/>
+              <p:cNvSpPr>
+                <a:spLocks/>
+              </p:cNvSpPr>
               <p:nvPr/>
             </p:nvSpPr>
             <p:spPr bwMode="hidden">
@@ -13297,6 +13719,9 @@
                 <a:ext cx="171" cy="461"/>
               </a:xfrm>
               <a:custGeom>
+                <a:avLst/>
+                <a:gdLst/>
+                <a:ahLst/>
                 <a:cxnLst>
                   <a:cxn ang="0">
                     <a:pos x="31" y="263"/>
@@ -13432,6 +13857,8 @@
               <a:ln w="9525">
                 <a:noFill/>
                 <a:round/>
+                <a:headEnd/>
+                <a:tailEnd/>
               </a:ln>
             </p:spPr>
             <p:txBody>
@@ -13445,7 +13872,9 @@
           <p:sp>
             <p:nvSpPr>
               <p:cNvPr id="15392" name="Freeform 32"/>
-              <p:cNvSpPr/>
+              <p:cNvSpPr>
+                <a:spLocks/>
+              </p:cNvSpPr>
               <p:nvPr/>
             </p:nvSpPr>
             <p:spPr bwMode="hidden">
@@ -13454,6 +13883,9 @@
                 <a:ext cx="360" cy="563"/>
               </a:xfrm>
               <a:custGeom>
+                <a:avLst/>
+                <a:gdLst/>
+                <a:ahLst/>
                 <a:cxnLst>
                   <a:cxn ang="0">
                     <a:pos x="360" y="365"/>
@@ -13645,11 +14077,12 @@
                   </a:gs>
                 </a:gsLst>
                 <a:lin ang="5400000" scaled="1"/>
-                <a:tileRect/>
               </a:gradFill>
               <a:ln w="9525">
                 <a:noFill/>
                 <a:round/>
+                <a:headEnd/>
+                <a:tailEnd/>
               </a:ln>
             </p:spPr>
             <p:txBody>
@@ -13663,7 +14096,9 @@
           <p:sp>
             <p:nvSpPr>
               <p:cNvPr id="15393" name="Freeform 33"/>
-              <p:cNvSpPr/>
+              <p:cNvSpPr>
+                <a:spLocks/>
+              </p:cNvSpPr>
               <p:nvPr/>
             </p:nvSpPr>
             <p:spPr bwMode="hidden">
@@ -13672,6 +14107,9 @@
                 <a:ext cx="1078" cy="425"/>
               </a:xfrm>
               <a:custGeom>
+                <a:avLst/>
+                <a:gdLst/>
+                <a:ahLst/>
                 <a:cxnLst>
                   <a:cxn ang="0">
                     <a:pos x="1053" y="425"/>
@@ -13857,11 +14295,12 @@
                   </a:gs>
                 </a:gsLst>
                 <a:lin ang="5400000" scaled="1"/>
-                <a:tileRect/>
               </a:gradFill>
               <a:ln w="9525">
                 <a:noFill/>
                 <a:round/>
+                <a:headEnd/>
+                <a:tailEnd/>
               </a:ln>
             </p:spPr>
             <p:txBody>
@@ -13875,7 +14314,9 @@
           <p:sp>
             <p:nvSpPr>
               <p:cNvPr id="15394" name="Freeform 34"/>
-              <p:cNvSpPr/>
+              <p:cNvSpPr>
+                <a:spLocks/>
+              </p:cNvSpPr>
               <p:nvPr/>
             </p:nvSpPr>
             <p:spPr bwMode="hidden">
@@ -13884,6 +14325,9 @@
                 <a:ext cx="98" cy="234"/>
               </a:xfrm>
               <a:custGeom>
+                <a:avLst/>
+                <a:gdLst/>
+                <a:ahLst/>
                 <a:cxnLst>
                   <a:cxn ang="0">
                     <a:pos x="0" y="234"/>
@@ -13991,11 +14435,12 @@
                   </a:gs>
                 </a:gsLst>
                 <a:lin ang="5400000" scaled="1"/>
-                <a:tileRect/>
               </a:gradFill>
               <a:ln w="9525">
                 <a:noFill/>
                 <a:round/>
+                <a:headEnd/>
+                <a:tailEnd/>
               </a:ln>
             </p:spPr>
             <p:txBody>
@@ -14009,7 +14454,9 @@
           <p:sp>
             <p:nvSpPr>
               <p:cNvPr id="15395" name="Freeform 35"/>
-              <p:cNvSpPr/>
+              <p:cNvSpPr>
+                <a:spLocks/>
+              </p:cNvSpPr>
               <p:nvPr/>
             </p:nvSpPr>
             <p:spPr bwMode="hidden">
@@ -14018,6 +14465,9 @@
                 <a:ext cx="481" cy="641"/>
               </a:xfrm>
               <a:custGeom>
+                <a:avLst/>
+                <a:gdLst/>
+                <a:ahLst/>
                 <a:cxnLst>
                   <a:cxn ang="0">
                     <a:pos x="18" y="443"/>
@@ -14201,6 +14651,8 @@
               <a:ln w="9525">
                 <a:noFill/>
                 <a:round/>
+                <a:headEnd/>
+                <a:tailEnd/>
               </a:ln>
             </p:spPr>
             <p:txBody>
@@ -14215,10 +14667,12 @@
         <p:grpSp>
           <p:nvGrpSpPr>
             <p:cNvPr id="15396" name="Group 36"/>
-            <p:cNvGrpSpPr/>
+            <p:cNvGrpSpPr>
+              <a:grpSpLocks/>
+            </p:cNvGrpSpPr>
             <p:nvPr userDrawn="1"/>
           </p:nvGrpSpPr>
-          <p:grpSpPr>
+          <p:grpSpPr bwMode="auto">
             <a:xfrm>
               <a:off x="4128" y="3360"/>
               <a:ext cx="1351" cy="821"/>
@@ -14240,6 +14694,9 @@
                 <a:ext cx="1201" cy="731"/>
               </a:xfrm>
               <a:custGeom>
+                <a:avLst/>
+                <a:gdLst/>
+                <a:ahLst/>
                 <a:cxnLst>
                   <a:cxn ang="0">
                     <a:pos x="484" y="6"/>
@@ -14597,11 +15054,12 @@
                   </a:gs>
                 </a:gsLst>
                 <a:lin ang="5400000" scaled="1"/>
-                <a:tileRect/>
               </a:gradFill>
               <a:ln w="9525">
                 <a:noFill/>
                 <a:round/>
+                <a:headEnd/>
+                <a:tailEnd/>
               </a:ln>
             </p:spPr>
             <p:txBody>
@@ -14615,7 +15073,9 @@
           <p:sp>
             <p:nvSpPr>
               <p:cNvPr id="15398" name="Freeform 38"/>
-              <p:cNvSpPr/>
+              <p:cNvSpPr>
+                <a:spLocks/>
+              </p:cNvSpPr>
               <p:nvPr/>
             </p:nvSpPr>
             <p:spPr bwMode="hidden">
@@ -14624,6 +15084,9 @@
                 <a:ext cx="544" cy="737"/>
               </a:xfrm>
               <a:custGeom>
+                <a:avLst/>
+                <a:gdLst/>
+                <a:ahLst/>
                 <a:cxnLst>
                   <a:cxn ang="0">
                     <a:pos x="24" y="402"/>
@@ -14863,11 +15326,12 @@
                   </a:gs>
                 </a:gsLst>
                 <a:lin ang="5400000" scaled="1"/>
-                <a:tileRect/>
               </a:gradFill>
               <a:ln w="9525">
                 <a:noFill/>
                 <a:round/>
+                <a:headEnd/>
+                <a:tailEnd/>
               </a:ln>
             </p:spPr>
             <p:txBody>
@@ -14881,7 +15345,9 @@
           <p:sp>
             <p:nvSpPr>
               <p:cNvPr id="15399" name="Freeform 39"/>
-              <p:cNvSpPr/>
+              <p:cNvSpPr>
+                <a:spLocks/>
+              </p:cNvSpPr>
               <p:nvPr/>
             </p:nvSpPr>
             <p:spPr bwMode="hidden">
@@ -14890,6 +15356,9 @@
                 <a:ext cx="609" cy="252"/>
               </a:xfrm>
               <a:custGeom>
+                <a:avLst/>
+                <a:gdLst/>
+                <a:ahLst/>
                 <a:cxnLst>
                   <a:cxn ang="0">
                     <a:pos x="12" y="12"/>
@@ -14966,7 +15435,7 @@
                 </a:cxnLst>
                 <a:rect l="0" t="0" r="r" b="b"/>
                 <a:pathLst>
-                  <a:path w="609" h="251">
+                  <a:path w="609" h="252">
                     <a:moveTo>
                       <a:pt x="12" y="12"/>
                     </a:moveTo>
@@ -15057,11 +15526,12 @@
                   </a:gs>
                 </a:gsLst>
                 <a:lin ang="5400000" scaled="1"/>
-                <a:tileRect/>
               </a:gradFill>
               <a:ln w="9525">
                 <a:noFill/>
                 <a:round/>
+                <a:headEnd/>
+                <a:tailEnd/>
               </a:ln>
             </p:spPr>
             <p:txBody>
@@ -15075,7 +15545,9 @@
           <p:sp>
             <p:nvSpPr>
               <p:cNvPr id="15400" name="Freeform 40"/>
-              <p:cNvSpPr/>
+              <p:cNvSpPr>
+                <a:spLocks/>
+              </p:cNvSpPr>
               <p:nvPr/>
             </p:nvSpPr>
             <p:spPr bwMode="hidden">
@@ -15084,6 +15556,9 @@
                 <a:ext cx="72" cy="54"/>
               </a:xfrm>
               <a:custGeom>
+                <a:avLst/>
+                <a:gdLst/>
+                <a:ahLst/>
                 <a:cxnLst>
                   <a:cxn ang="0">
                     <a:pos x="72" y="0"/>
@@ -15161,11 +15636,12 @@
                   </a:gs>
                 </a:gsLst>
                 <a:lin ang="5400000" scaled="1"/>
-                <a:tileRect/>
               </a:gradFill>
               <a:ln w="9525">
                 <a:noFill/>
                 <a:round/>
+                <a:headEnd/>
+                <a:tailEnd/>
               </a:ln>
             </p:spPr>
             <p:txBody>
@@ -15179,7 +15655,9 @@
           <p:sp>
             <p:nvSpPr>
               <p:cNvPr id="15401" name="Freeform 41"/>
-              <p:cNvSpPr/>
+              <p:cNvSpPr>
+                <a:spLocks/>
+              </p:cNvSpPr>
               <p:nvPr/>
             </p:nvSpPr>
             <p:spPr bwMode="hidden">
@@ -15188,6 +15666,9 @@
                 <a:ext cx="705" cy="108"/>
               </a:xfrm>
               <a:custGeom>
+                <a:avLst/>
+                <a:gdLst/>
+                <a:ahLst/>
                 <a:cxnLst>
                   <a:cxn ang="0">
                     <a:pos x="299" y="90"/>
@@ -15319,11 +15800,12 @@
                   </a:gs>
                 </a:gsLst>
                 <a:lin ang="5400000" scaled="1"/>
-                <a:tileRect/>
               </a:gradFill>
               <a:ln w="9525">
                 <a:noFill/>
                 <a:round/>
+                <a:headEnd/>
+                <a:tailEnd/>
               </a:ln>
             </p:spPr>
             <p:txBody>
@@ -15337,7 +15819,9 @@
           <p:sp>
             <p:nvSpPr>
               <p:cNvPr id="15402" name="Freeform 42"/>
-              <p:cNvSpPr/>
+              <p:cNvSpPr>
+                <a:spLocks/>
+              </p:cNvSpPr>
               <p:nvPr/>
             </p:nvSpPr>
             <p:spPr bwMode="hidden">
@@ -15346,6 +15830,9 @@
                 <a:ext cx="143" cy="341"/>
               </a:xfrm>
               <a:custGeom>
+                <a:avLst/>
+                <a:gdLst/>
+                <a:ahLst/>
                 <a:cxnLst>
                   <a:cxn ang="0">
                     <a:pos x="119" y="114"/>
@@ -15465,11 +15952,12 @@
                   </a:gs>
                 </a:gsLst>
                 <a:lin ang="5400000" scaled="1"/>
-                <a:tileRect/>
               </a:gradFill>
               <a:ln w="9525">
                 <a:noFill/>
                 <a:round/>
+                <a:headEnd/>
+                <a:tailEnd/>
               </a:ln>
             </p:spPr>
             <p:txBody>
@@ -15483,7 +15971,9 @@
           <p:sp>
             <p:nvSpPr>
               <p:cNvPr id="15403" name="Freeform 43"/>
-              <p:cNvSpPr/>
+              <p:cNvSpPr>
+                <a:spLocks/>
+              </p:cNvSpPr>
               <p:nvPr/>
             </p:nvSpPr>
             <p:spPr bwMode="hidden">
@@ -15492,6 +15982,9 @@
                 <a:ext cx="83" cy="90"/>
               </a:xfrm>
               <a:custGeom>
+                <a:avLst/>
+                <a:gdLst/>
+                <a:ahLst/>
                 <a:cxnLst>
                   <a:cxn ang="0">
                     <a:pos x="59" y="90"/>
@@ -15569,11 +16062,12 @@
                   </a:gs>
                 </a:gsLst>
                 <a:lin ang="5400000" scaled="1"/>
-                <a:tileRect/>
               </a:gradFill>
               <a:ln w="9525">
                 <a:noFill/>
                 <a:round/>
+                <a:headEnd/>
+                <a:tailEnd/>
               </a:ln>
             </p:spPr>
             <p:txBody>
@@ -15587,7 +16081,9 @@
           <p:sp>
             <p:nvSpPr>
               <p:cNvPr id="15404" name="Freeform 44"/>
-              <p:cNvSpPr/>
+              <p:cNvSpPr>
+                <a:spLocks/>
+              </p:cNvSpPr>
               <p:nvPr/>
             </p:nvSpPr>
             <p:spPr bwMode="hidden">
@@ -15596,6 +16092,9 @@
                 <a:ext cx="717" cy="431"/>
               </a:xfrm>
               <a:custGeom>
+                <a:avLst/>
+                <a:gdLst/>
+                <a:ahLst/>
                 <a:cxnLst>
                   <a:cxn ang="0">
                     <a:pos x="693" y="216"/>
@@ -15989,6 +16488,8 @@
               <a:ln w="9525">
                 <a:noFill/>
                 <a:round/>
+                <a:headEnd/>
+                <a:tailEnd/>
               </a:ln>
             </p:spPr>
             <p:txBody>
@@ -16002,7 +16503,9 @@
           <p:sp>
             <p:nvSpPr>
               <p:cNvPr id="15405" name="Freeform 45"/>
-              <p:cNvSpPr/>
+              <p:cNvSpPr>
+                <a:spLocks/>
+              </p:cNvSpPr>
               <p:nvPr/>
             </p:nvSpPr>
             <p:spPr bwMode="hidden">
@@ -16011,6 +16514,9 @@
                 <a:ext cx="909" cy="533"/>
               </a:xfrm>
               <a:custGeom>
+                <a:avLst/>
+                <a:gdLst/>
+                <a:ahLst/>
                 <a:cxnLst>
                   <a:cxn ang="0">
                     <a:pos x="616" y="0"/>
@@ -16382,11 +16888,12 @@
                   </a:gs>
                 </a:gsLst>
                 <a:lin ang="0" scaled="1"/>
-                <a:tileRect/>
               </a:gradFill>
               <a:ln w="9525">
                 <a:noFill/>
                 <a:round/>
+                <a:headEnd/>
+                <a:tailEnd/>
               </a:ln>
             </p:spPr>
             <p:txBody>
@@ -16400,7 +16907,9 @@
           <p:sp>
             <p:nvSpPr>
               <p:cNvPr id="15406" name="Freeform 46"/>
-              <p:cNvSpPr/>
+              <p:cNvSpPr>
+                <a:spLocks/>
+              </p:cNvSpPr>
               <p:nvPr/>
             </p:nvSpPr>
             <p:spPr bwMode="hidden">
@@ -16409,6 +16918,9 @@
                 <a:ext cx="365" cy="66"/>
               </a:xfrm>
               <a:custGeom>
+                <a:avLst/>
+                <a:gdLst/>
+                <a:ahLst/>
                 <a:cxnLst>
                   <a:cxn ang="0">
                     <a:pos x="240" y="18"/>
@@ -16522,11 +17034,12 @@
                   </a:gs>
                 </a:gsLst>
                 <a:lin ang="5400000" scaled="1"/>
-                <a:tileRect/>
               </a:gradFill>
               <a:ln w="9525">
                 <a:noFill/>
                 <a:round/>
+                <a:headEnd/>
+                <a:tailEnd/>
               </a:ln>
             </p:spPr>
             <p:txBody>
@@ -16540,7 +17053,9 @@
           <p:sp>
             <p:nvSpPr>
               <p:cNvPr id="15407" name="Freeform 47"/>
-              <p:cNvSpPr/>
+              <p:cNvSpPr>
+                <a:spLocks/>
+              </p:cNvSpPr>
               <p:nvPr/>
             </p:nvSpPr>
             <p:spPr bwMode="hidden">
@@ -16549,6 +17064,9 @@
                 <a:ext cx="66" cy="48"/>
               </a:xfrm>
               <a:custGeom>
+                <a:avLst/>
+                <a:gdLst/>
+                <a:ahLst/>
                 <a:cxnLst>
                   <a:cxn ang="0">
                     <a:pos x="66" y="18"/>
@@ -16620,11 +17138,12 @@
                   </a:gs>
                 </a:gsLst>
                 <a:lin ang="5400000" scaled="1"/>
-                <a:tileRect/>
               </a:gradFill>
               <a:ln w="9525">
                 <a:noFill/>
                 <a:round/>
+                <a:headEnd/>
+                <a:tailEnd/>
               </a:ln>
             </p:spPr>
             <p:txBody>
@@ -16665,12 +17184,14 @@
                   </a:gs>
                 </a:gsLst>
                 <a:lin ang="0" scaled="1"/>
-                <a:tileRect/>
               </a:gradFill>
               <a:ln w="9525">
                 <a:noFill/>
                 <a:round/>
+                <a:headEnd/>
+                <a:tailEnd/>
               </a:ln>
+              <a:effectLst/>
             </p:spPr>
             <p:txBody>
               <a:bodyPr/>
@@ -16710,12 +17231,14 @@
                   </a:gs>
                 </a:gsLst>
                 <a:lin ang="5400000" scaled="1"/>
-                <a:tileRect/>
               </a:gradFill>
               <a:ln w="9525">
                 <a:noFill/>
                 <a:round/>
+                <a:headEnd/>
+                <a:tailEnd/>
               </a:ln>
+              <a:effectLst/>
             </p:spPr>
             <p:txBody>
               <a:bodyPr/>
@@ -16755,12 +17278,14 @@
                   </a:gs>
                 </a:gsLst>
                 <a:lin ang="5400000" scaled="1"/>
-                <a:tileRect/>
               </a:gradFill>
               <a:ln w="9525">
                 <a:noFill/>
                 <a:round/>
+                <a:headEnd/>
+                <a:tailEnd/>
               </a:ln>
+              <a:effectLst/>
             </p:spPr>
             <p:txBody>
               <a:bodyPr/>
@@ -16800,12 +17325,14 @@
                   </a:gs>
                 </a:gsLst>
                 <a:lin ang="5400000" scaled="1"/>
-                <a:tileRect/>
               </a:gradFill>
               <a:ln w="9525">
                 <a:noFill/>
                 <a:round/>
+                <a:headEnd/>
+                <a:tailEnd/>
               </a:ln>
+              <a:effectLst/>
             </p:spPr>
             <p:txBody>
               <a:bodyPr/>
@@ -16845,12 +17372,14 @@
                   </a:gs>
                 </a:gsLst>
                 <a:lin ang="5400000" scaled="1"/>
-                <a:tileRect/>
               </a:gradFill>
               <a:ln w="9525">
                 <a:noFill/>
                 <a:round/>
+                <a:headEnd/>
+                <a:tailEnd/>
               </a:ln>
+              <a:effectLst/>
             </p:spPr>
             <p:txBody>
               <a:bodyPr/>
@@ -16890,12 +17419,14 @@
                   </a:gs>
                 </a:gsLst>
                 <a:lin ang="5400000" scaled="1"/>
-                <a:tileRect/>
               </a:gradFill>
               <a:ln w="9525">
                 <a:noFill/>
                 <a:round/>
+                <a:headEnd/>
+                <a:tailEnd/>
               </a:ln>
+              <a:effectLst/>
             </p:spPr>
             <p:txBody>
               <a:bodyPr/>
@@ -16909,10 +17440,12 @@
         <p:grpSp>
           <p:nvGrpSpPr>
             <p:cNvPr id="15414" name="Group 54"/>
-            <p:cNvGrpSpPr/>
+            <p:cNvGrpSpPr>
+              <a:grpSpLocks/>
+            </p:cNvGrpSpPr>
             <p:nvPr userDrawn="1"/>
           </p:nvGrpSpPr>
-          <p:grpSpPr>
+          <p:grpSpPr bwMode="auto">
             <a:xfrm>
               <a:off x="5280" y="3024"/>
               <a:ext cx="425" cy="258"/>
@@ -16923,7 +17456,9 @@
           <p:sp>
             <p:nvSpPr>
               <p:cNvPr id="15415" name="Freeform 55"/>
-              <p:cNvSpPr/>
+              <p:cNvSpPr>
+                <a:spLocks/>
+              </p:cNvSpPr>
               <p:nvPr/>
             </p:nvSpPr>
             <p:spPr bwMode="hidden">
@@ -16932,6 +17467,9 @@
                 <a:ext cx="383" cy="96"/>
               </a:xfrm>
               <a:custGeom>
+                <a:avLst/>
+                <a:gdLst/>
+                <a:ahLst/>
                 <a:cxnLst>
                   <a:cxn ang="0">
                     <a:pos x="209" y="96"/>
@@ -17071,11 +17609,12 @@
                   </a:gs>
                 </a:gsLst>
                 <a:lin ang="5400000" scaled="1"/>
-                <a:tileRect/>
               </a:gradFill>
               <a:ln w="9525">
                 <a:noFill/>
                 <a:round/>
+                <a:headEnd/>
+                <a:tailEnd/>
               </a:ln>
             </p:spPr>
             <p:txBody>
@@ -17089,7 +17628,9 @@
           <p:sp>
             <p:nvSpPr>
               <p:cNvPr id="15416" name="Freeform 56"/>
-              <p:cNvSpPr/>
+              <p:cNvSpPr>
+                <a:spLocks/>
+              </p:cNvSpPr>
               <p:nvPr/>
             </p:nvSpPr>
             <p:spPr bwMode="hidden">
@@ -17098,6 +17639,9 @@
                 <a:ext cx="258" cy="54"/>
               </a:xfrm>
               <a:custGeom>
+                <a:avLst/>
+                <a:gdLst/>
+                <a:ahLst/>
                 <a:cxnLst>
                   <a:cxn ang="0">
                     <a:pos x="174" y="0"/>
@@ -17213,11 +17757,12 @@
                   </a:gs>
                 </a:gsLst>
                 <a:lin ang="5400000" scaled="1"/>
-                <a:tileRect/>
               </a:gradFill>
               <a:ln w="9525">
                 <a:noFill/>
                 <a:round/>
+                <a:headEnd/>
+                <a:tailEnd/>
               </a:ln>
             </p:spPr>
             <p:txBody>
@@ -17231,7 +17776,9 @@
           <p:sp>
             <p:nvSpPr>
               <p:cNvPr id="15417" name="Freeform 57"/>
-              <p:cNvSpPr/>
+              <p:cNvSpPr>
+                <a:spLocks/>
+              </p:cNvSpPr>
               <p:nvPr/>
             </p:nvSpPr>
             <p:spPr bwMode="hidden">
@@ -17240,6 +17787,9 @@
                 <a:ext cx="60" cy="156"/>
               </a:xfrm>
               <a:custGeom>
+                <a:avLst/>
+                <a:gdLst/>
+                <a:ahLst/>
                 <a:cxnLst>
                   <a:cxn ang="0">
                     <a:pos x="54" y="90"/>
@@ -17355,11 +17905,12 @@
                   </a:gs>
                 </a:gsLst>
                 <a:lin ang="5400000" scaled="1"/>
-                <a:tileRect/>
               </a:gradFill>
               <a:ln w="9525">
                 <a:noFill/>
                 <a:round/>
+                <a:headEnd/>
+                <a:tailEnd/>
               </a:ln>
             </p:spPr>
             <p:txBody>
@@ -17373,7 +17924,9 @@
           <p:sp>
             <p:nvSpPr>
               <p:cNvPr id="15418" name="Freeform 58"/>
-              <p:cNvSpPr/>
+              <p:cNvSpPr>
+                <a:spLocks/>
+              </p:cNvSpPr>
               <p:nvPr/>
             </p:nvSpPr>
             <p:spPr bwMode="hidden">
@@ -17382,6 +17935,9 @@
                 <a:ext cx="192" cy="18"/>
               </a:xfrm>
               <a:custGeom>
+                <a:avLst/>
+                <a:gdLst/>
+                <a:ahLst/>
                 <a:cxnLst>
                   <a:cxn ang="0">
                     <a:pos x="114" y="12"/>
@@ -17473,11 +18029,12 @@
                   </a:gs>
                 </a:gsLst>
                 <a:lin ang="5400000" scaled="1"/>
-                <a:tileRect/>
               </a:gradFill>
               <a:ln w="9525">
                 <a:noFill/>
                 <a:round/>
+                <a:headEnd/>
+                <a:tailEnd/>
               </a:ln>
             </p:spPr>
             <p:txBody>
@@ -17491,7 +18048,9 @@
           <p:sp>
             <p:nvSpPr>
               <p:cNvPr id="15419" name="Freeform 59"/>
-              <p:cNvSpPr/>
+              <p:cNvSpPr>
+                <a:spLocks/>
+              </p:cNvSpPr>
               <p:nvPr/>
             </p:nvSpPr>
             <p:spPr bwMode="hidden">
@@ -17500,6 +18059,9 @@
                 <a:ext cx="161" cy="186"/>
               </a:xfrm>
               <a:custGeom>
+                <a:avLst/>
+                <a:gdLst/>
+                <a:ahLst/>
                 <a:cxnLst>
                   <a:cxn ang="0">
                     <a:pos x="11" y="114"/>
@@ -17645,11 +18207,12 @@
                   </a:gs>
                 </a:gsLst>
                 <a:lin ang="5400000" scaled="1"/>
-                <a:tileRect/>
               </a:gradFill>
               <a:ln w="9525">
                 <a:noFill/>
                 <a:round/>
+                <a:headEnd/>
+                <a:tailEnd/>
               </a:ln>
             </p:spPr>
             <p:txBody>
@@ -17663,7 +18226,9 @@
           <p:sp>
             <p:nvSpPr>
               <p:cNvPr id="15420" name="Freeform 60"/>
-              <p:cNvSpPr/>
+              <p:cNvSpPr>
+                <a:spLocks/>
+              </p:cNvSpPr>
               <p:nvPr/>
             </p:nvSpPr>
             <p:spPr bwMode="hidden">
@@ -17672,6 +18237,9 @@
                 <a:ext cx="186" cy="210"/>
               </a:xfrm>
               <a:custGeom>
+                <a:avLst/>
+                <a:gdLst/>
+                <a:ahLst/>
                 <a:cxnLst>
                   <a:cxn ang="0">
                     <a:pos x="0" y="6"/>
@@ -17835,11 +18403,12 @@
                   </a:gs>
                 </a:gsLst>
                 <a:lin ang="5400000" scaled="1"/>
-                <a:tileRect/>
               </a:gradFill>
               <a:ln w="9525">
                 <a:noFill/>
                 <a:round/>
+                <a:headEnd/>
+                <a:tailEnd/>
               </a:ln>
             </p:spPr>
             <p:txBody>
@@ -17864,6 +18433,9 @@
                 <a:ext cx="299" cy="186"/>
               </a:xfrm>
               <a:custGeom>
+                <a:avLst/>
+                <a:gdLst/>
+                <a:ahLst/>
                 <a:cxnLst>
                   <a:cxn ang="0">
                     <a:pos x="150" y="0"/>
@@ -18148,11 +18720,12 @@
                   </a:gs>
                 </a:gsLst>
                 <a:lin ang="5400000" scaled="1"/>
-                <a:tileRect/>
               </a:gradFill>
               <a:ln w="9525">
                 <a:noFill/>
                 <a:round/>
+                <a:headEnd/>
+                <a:tailEnd/>
               </a:ln>
             </p:spPr>
             <p:txBody>
@@ -18166,10 +18739,12 @@
           <p:grpSp>
             <p:nvGrpSpPr>
               <p:cNvPr id="15422" name="Group 62"/>
-              <p:cNvGrpSpPr/>
+              <p:cNvGrpSpPr>
+                <a:grpSpLocks/>
+              </p:cNvGrpSpPr>
               <p:nvPr/>
             </p:nvGrpSpPr>
-            <p:grpSpPr>
+            <p:grpSpPr bwMode="auto">
               <a:xfrm>
                 <a:off x="5381" y="3085"/>
                 <a:ext cx="227" cy="132"/>
@@ -18203,12 +18778,14 @@
                     </a:gs>
                   </a:gsLst>
                   <a:lin ang="5400000" scaled="1"/>
-                  <a:tileRect/>
                 </a:gradFill>
                 <a:ln w="9525">
                   <a:noFill/>
                   <a:round/>
+                  <a:headEnd/>
+                  <a:tailEnd/>
                 </a:ln>
+                <a:effectLst/>
               </p:spPr>
               <p:txBody>
                 <a:bodyPr/>
@@ -18244,12 +18821,14 @@
                     </a:gs>
                   </a:gsLst>
                   <a:lin ang="5400000" scaled="1"/>
-                  <a:tileRect/>
                 </a:gradFill>
                 <a:ln w="9525">
                   <a:noFill/>
                   <a:round/>
+                  <a:headEnd/>
+                  <a:tailEnd/>
                 </a:ln>
+                <a:effectLst/>
               </p:spPr>
               <p:txBody>
                 <a:bodyPr/>
@@ -18285,12 +18864,14 @@
                     </a:gs>
                   </a:gsLst>
                   <a:lin ang="5400000" scaled="1"/>
-                  <a:tileRect/>
                 </a:gradFill>
                 <a:ln w="9525">
                   <a:noFill/>
                   <a:round/>
+                  <a:headEnd/>
+                  <a:tailEnd/>
                 </a:ln>
+                <a:effectLst/>
               </p:spPr>
               <p:txBody>
                 <a:bodyPr/>
@@ -18326,12 +18907,14 @@
                     </a:gs>
                   </a:gsLst>
                   <a:lin ang="5400000" scaled="1"/>
-                  <a:tileRect/>
                 </a:gradFill>
                 <a:ln w="9525">
                   <a:noFill/>
                   <a:round/>
+                  <a:headEnd/>
+                  <a:tailEnd/>
                 </a:ln>
+                <a:effectLst/>
               </p:spPr>
               <p:txBody>
                 <a:bodyPr/>
@@ -18366,10 +18949,13 @@
           <a:ln w="9525">
             <a:noFill/>
             <a:miter lim="800000"/>
+            <a:headEnd/>
+            <a:tailEnd/>
           </a:ln>
+          <a:effectLst/>
         </p:spPr>
         <p:txBody>
-          <a:bodyPr vert="horz" wrap="square" lIns="91440" tIns="45720" rIns="91440" bIns="45720" anchor="ctr" anchorCtr="1" compatLnSpc="1">
+          <a:bodyPr vert="horz" wrap="square" lIns="91440" tIns="45720" rIns="91440" bIns="45720" numCol="1" anchor="ctr" anchorCtr="1" compatLnSpc="1">
             <a:prstTxWarp prst="textNoShape">
               <a:avLst/>
             </a:prstTxWarp>
@@ -18406,10 +18992,13 @@
           <a:ln w="9525">
             <a:noFill/>
             <a:miter lim="800000"/>
+            <a:headEnd/>
+            <a:tailEnd/>
           </a:ln>
+          <a:effectLst/>
         </p:spPr>
         <p:txBody>
-          <a:bodyPr vert="horz" wrap="square" lIns="91440" tIns="45720" rIns="91440" bIns="45720" anchor="t" anchorCtr="0" compatLnSpc="1">
+          <a:bodyPr vert="horz" wrap="square" lIns="91440" tIns="45720" rIns="91440" bIns="45720" numCol="1" anchor="t" anchorCtr="0" compatLnSpc="1">
             <a:prstTxWarp prst="textNoShape">
               <a:avLst/>
             </a:prstTxWarp>
@@ -18474,10 +19063,13 @@
           <a:ln w="9525">
             <a:noFill/>
             <a:miter lim="800000"/>
+            <a:headEnd/>
+            <a:tailEnd/>
           </a:ln>
+          <a:effectLst/>
         </p:spPr>
         <p:txBody>
-          <a:bodyPr vert="horz" wrap="square" lIns="91440" tIns="45720" rIns="91440" bIns="45720" anchor="b" anchorCtr="0" compatLnSpc="1">
+          <a:bodyPr vert="horz" wrap="square" lIns="91440" tIns="45720" rIns="91440" bIns="45720" numCol="1" anchor="b" anchorCtr="0" compatLnSpc="1">
             <a:prstTxWarp prst="textNoShape">
               <a:avLst/>
             </a:prstTxWarp>
@@ -18496,8 +19088,10 @@
           <a:p>
             <a:fld id="{75829D23-D5C5-4532-A903-E7A1A930AAC6}" type="datetimeFigureOut">
               <a:rPr lang="en-US"/>
+              <a:pPr/>
               <a:t>7/3/2015</a:t>
             </a:fld>
+            <a:endParaRPr lang="en-US"/>
           </a:p>
         </p:txBody>
       </p:sp>
@@ -18523,10 +19117,13 @@
           <a:ln w="9525">
             <a:noFill/>
             <a:miter lim="800000"/>
+            <a:headEnd/>
+            <a:tailEnd/>
           </a:ln>
+          <a:effectLst/>
         </p:spPr>
         <p:txBody>
-          <a:bodyPr vert="horz" wrap="square" lIns="91440" tIns="45720" rIns="91440" bIns="45720" anchor="b" anchorCtr="0" compatLnSpc="1">
+          <a:bodyPr vert="horz" wrap="square" lIns="91440" tIns="45720" rIns="91440" bIns="45720" numCol="1" anchor="b" anchorCtr="0" compatLnSpc="1">
             <a:prstTxWarp prst="textNoShape">
               <a:avLst/>
             </a:prstTxWarp>
@@ -18569,10 +19166,13 @@
           <a:ln w="9525">
             <a:noFill/>
             <a:miter lim="800000"/>
+            <a:headEnd/>
+            <a:tailEnd/>
           </a:ln>
+          <a:effectLst/>
         </p:spPr>
         <p:txBody>
-          <a:bodyPr vert="horz" wrap="square" lIns="91440" tIns="45720" rIns="91440" bIns="45720" anchor="b" anchorCtr="0" compatLnSpc="1">
+          <a:bodyPr vert="horz" wrap="square" lIns="91440" tIns="45720" rIns="91440" bIns="45720" numCol="1" anchor="b" anchorCtr="0" compatLnSpc="1">
             <a:prstTxWarp prst="textNoShape">
               <a:avLst/>
             </a:prstTxWarp>
@@ -18591,8 +19191,10 @@
           <a:p>
             <a:fld id="{5B5D8AA1-506C-44E5-AA0C-EE41E52E30D3}" type="slidenum">
               <a:rPr lang="en-US"/>
+              <a:pPr/>
               <a:t>‹#›</a:t>
             </a:fld>
+            <a:endParaRPr lang="en-US"/>
           </a:p>
         </p:txBody>
       </p:sp>
@@ -18612,8 +19214,13 @@
     <p:sldLayoutId id="2147483659" r:id="rId10"/>
     <p:sldLayoutId id="2147483660" r:id="rId11"/>
   </p:sldLayoutIdLst>
-  <p:transition/>
-  <p:timing/>
+  <p:timing>
+    <p:tnLst>
+      <p:par>
+        <p:cTn id="1" dur="indefinite" restart="never" nodeType="tmRoot"/>
+      </p:par>
+    </p:tnLst>
+  </p:timing>
   <p:txStyles>
     <p:titleStyle>
       <a:lvl1pPr algn="ctr" rtl="0" fontAlgn="base">
@@ -18653,7 +19260,7 @@
               <a:srgbClr val="000000"/>
             </a:outerShdw>
           </a:effectLst>
-          <a:latin typeface="Arial"/>
+          <a:latin typeface="Arial" charset="0"/>
         </a:defRPr>
       </a:lvl2pPr>
       <a:lvl3pPr algn="ctr" rtl="0" fontAlgn="base">
@@ -18672,7 +19279,7 @@
               <a:srgbClr val="000000"/>
             </a:outerShdw>
           </a:effectLst>
-          <a:latin typeface="Arial"/>
+          <a:latin typeface="Arial" charset="0"/>
         </a:defRPr>
       </a:lvl3pPr>
       <a:lvl4pPr algn="ctr" rtl="0" fontAlgn="base">
@@ -18691,7 +19298,7 @@
               <a:srgbClr val="000000"/>
             </a:outerShdw>
           </a:effectLst>
-          <a:latin typeface="Arial"/>
+          <a:latin typeface="Arial" charset="0"/>
         </a:defRPr>
       </a:lvl4pPr>
       <a:lvl5pPr algn="ctr" rtl="0" fontAlgn="base">
@@ -18710,7 +19317,7 @@
               <a:srgbClr val="000000"/>
             </a:outerShdw>
           </a:effectLst>
-          <a:latin typeface="Arial"/>
+          <a:latin typeface="Arial" charset="0"/>
         </a:defRPr>
       </a:lvl5pPr>
       <a:lvl6pPr marL="457200" algn="ctr" rtl="0" fontAlgn="base">
@@ -18729,7 +19336,7 @@
               <a:srgbClr val="000000"/>
             </a:outerShdw>
           </a:effectLst>
-          <a:latin typeface="Arial"/>
+          <a:latin typeface="Arial" charset="0"/>
         </a:defRPr>
       </a:lvl6pPr>
       <a:lvl7pPr marL="914400" algn="ctr" rtl="0" fontAlgn="base">
@@ -18748,7 +19355,7 @@
               <a:srgbClr val="000000"/>
             </a:outerShdw>
           </a:effectLst>
-          <a:latin typeface="Arial"/>
+          <a:latin typeface="Arial" charset="0"/>
         </a:defRPr>
       </a:lvl7pPr>
       <a:lvl8pPr marL="1371600" algn="ctr" rtl="0" fontAlgn="base">
@@ -18767,7 +19374,7 @@
               <a:srgbClr val="000000"/>
             </a:outerShdw>
           </a:effectLst>
-          <a:latin typeface="Arial"/>
+          <a:latin typeface="Arial" charset="0"/>
         </a:defRPr>
       </a:lvl8pPr>
       <a:lvl9pPr marL="1828800" algn="ctr" rtl="0" fontAlgn="base">
@@ -18786,7 +19393,7 @@
               <a:srgbClr val="000000"/>
             </a:outerShdw>
           </a:effectLst>
-          <a:latin typeface="Arial"/>
+          <a:latin typeface="Arial" charset="0"/>
         </a:defRPr>
       </a:lvl9pPr>
     </p:titleStyle>
@@ -19107,13 +19714,8 @@
 </file>
 
 <file path=ppt/slides/slide1.xml><?xml version="1.0" encoding="utf-8"?>
-<p:sld xmlns:a="http://schemas.openxmlformats.org/drawingml/2006/main" xmlns:r="http://schemas.openxmlformats.org/officeDocument/2006/relationships" xmlns:p14="http://schemas.microsoft.com/office/powerpoint/2010/main" xmlns:p15="http://schemas.microsoft.com/office/powerpoint/2012/main" xmlns:p="http://schemas.openxmlformats.org/presentationml/2006/main">
+<p:sld xmlns:a="http://schemas.openxmlformats.org/drawingml/2006/main" xmlns:r="http://schemas.openxmlformats.org/officeDocument/2006/relationships" xmlns:p="http://schemas.openxmlformats.org/presentationml/2006/main">
   <p:cSld>
-    <p:bg>
-      <p:bgPr>
-        <a:noFill/>
-      </p:bgPr>
-    </p:bg>
     <p:spTree>
       <p:nvGrpSpPr>
         <p:cNvPr id="1" name=""/>
@@ -19124,6 +19726,8 @@
         <a:xfrm>
           <a:off x="0" y="0"/>
           <a:ext cx="0" cy="0"/>
+          <a:chOff x="0" y="0"/>
+          <a:chExt cx="0" cy="0"/>
         </a:xfrm>
       </p:grpSpPr>
       <p:sp>
@@ -19198,6 +19802,7 @@
         </p:nvPicPr>
         <p:blipFill>
           <a:blip r:embed="rId2"/>
+          <a:srcRect/>
           <a:stretch>
             <a:fillRect/>
           </a:stretch>
@@ -19214,6 +19819,8 @@
           <a:ln w="9525">
             <a:noFill/>
             <a:miter lim="800000"/>
+            <a:headEnd/>
+            <a:tailEnd/>
           </a:ln>
         </p:spPr>
       </p:pic>
@@ -19222,23 +19829,11 @@
   <p:clrMapOvr>
     <a:masterClrMapping/>
   </p:clrMapOvr>
-  <p:transition/>
-  <p:timing/>
 </p:sld>
 </file>
 
-<file path=ppt/tags/tag1.xml><?xml version="1.0" encoding="utf-8"?>
-<p:tagLst xmlns:p="http://schemas.openxmlformats.org/presentationml/2006/main">
-  <p:tag name="AS_NET" val="4.0.30319.34209"/>
-  <p:tag name="AS_OS" val="Microsoft Windows NT 6.2.9200.0"/>
-  <p:tag name="AS_RELEASE_DATE" val="2015.08.28"/>
-  <p:tag name="AS_TITLE" val="Aspose.Slides for .NET 4.0"/>
-  <p:tag name="AS_VERSION" val="15.7.0.0"/>
-</p:tagLst>
-</file>
-
 <file path=ppt/theme/theme1.xml><?xml version="1.0" encoding="utf-8"?>
-<a:theme xmlns:r="http://schemas.openxmlformats.org/officeDocument/2006/relationships" xmlns:a="http://schemas.openxmlformats.org/drawingml/2006/main" name="Ripple">
+<a:theme xmlns:a="http://schemas.openxmlformats.org/drawingml/2006/main" name="Ripple">
   <a:themeElements>
     <a:clrScheme name="Ripple 3">
       <a:dk1>
@@ -19281,13 +19876,13 @@
     <a:fontScheme name="Ripple">
       <a:majorFont>
         <a:latin typeface="Arial"/>
-        <a:ea typeface="Arial"/>
-        <a:cs typeface="Arial"/>
+        <a:ea typeface=""/>
+        <a:cs typeface=""/>
       </a:majorFont>
       <a:minorFont>
         <a:latin typeface="Arial"/>
-        <a:ea typeface="Arial"/>
-        <a:cs typeface="Arial"/>
+        <a:ea typeface=""/>
+        <a:cs typeface=""/>
       </a:minorFont>
     </a:fontScheme>
     <a:fmtScheme name="Office">
@@ -19317,7 +19912,6 @@
             </a:gs>
           </a:gsLst>
           <a:lin ang="16200000" scaled="1"/>
-          <a:tileRect/>
         </a:gradFill>
         <a:gradFill rotWithShape="1">
           <a:gsLst>
@@ -19341,7 +19935,6 @@
             </a:gs>
           </a:gsLst>
           <a:lin ang="16200000" scaled="0"/>
-          <a:tileRect/>
         </a:gradFill>
       </a:fillStyleLst>
       <a:lnStyleLst>
@@ -19436,7 +20029,6 @@
           <a:path path="circle">
             <a:fillToRect l="50000" t="-80000" r="50000" b="180000"/>
           </a:path>
-          <a:tileRect/>
         </a:gradFill>
         <a:gradFill rotWithShape="1">
           <a:gsLst>
@@ -19456,7 +20048,6 @@
           <a:path path="circle">
             <a:fillToRect l="50000" t="50000" r="50000" b="50000"/>
           </a:path>
-          <a:tileRect/>
         </a:gradFill>
       </a:bgFillStyleLst>
     </a:fmtScheme>

</xml_diff>

<commit_message>
Changed DotNet, Node.js and Perl Unit test cases project to read input files from root Data folder and removed internal data folders
</commit_message>
<xml_diff>
--- a/Data/demo.pptx
+++ b/Data/demo.pptx
@@ -1,6 +1,7 @@
 
 <file path=ppt/presentation.xml><?xml version="1.0" encoding="utf-8"?>
-<p:presentation xmlns:a="http://schemas.openxmlformats.org/drawingml/2006/main" xmlns:r="http://schemas.openxmlformats.org/officeDocument/2006/relationships" xmlns:p="http://schemas.openxmlformats.org/presentationml/2006/main" saveSubsetFonts="1">
+<!--Generated by Aspose.Slides for .NET 15.7.0.0-->
+<p:presentation xmlns:r="http://schemas.openxmlformats.org/officeDocument/2006/relationships" xmlns:a="http://schemas.openxmlformats.org/drawingml/2006/main" xmlns:p="http://schemas.openxmlformats.org/presentationml/2006/main" saveSubsetFonts="1">
   <p:sldMasterIdLst>
     <p:sldMasterId id="2147483649" r:id="rId1"/>
   </p:sldMasterIdLst>
@@ -9,6 +10,9 @@
   </p:sldIdLst>
   <p:sldSz cx="9144000" cy="6858000" type="screen4x3"/>
   <p:notesSz cx="6858000" cy="9144000"/>
+  <p:custDataLst>
+    <p:tags r:id="rId3"/>
+  </p:custDataLst>
   <p:defaultTextStyle>
     <a:defPPr>
       <a:defRPr lang="en-US"/>
@@ -24,7 +28,7 @@
         <a:solidFill>
           <a:schemeClr val="tx1"/>
         </a:solidFill>
-        <a:latin typeface="Arial" charset="0"/>
+        <a:latin typeface="Arial"/>
         <a:ea typeface="+mn-ea"/>
         <a:cs typeface="+mn-cs"/>
       </a:defRPr>
@@ -40,7 +44,7 @@
         <a:solidFill>
           <a:schemeClr val="tx1"/>
         </a:solidFill>
-        <a:latin typeface="Arial" charset="0"/>
+        <a:latin typeface="Arial"/>
         <a:ea typeface="+mn-ea"/>
         <a:cs typeface="+mn-cs"/>
       </a:defRPr>
@@ -56,7 +60,7 @@
         <a:solidFill>
           <a:schemeClr val="tx1"/>
         </a:solidFill>
-        <a:latin typeface="Arial" charset="0"/>
+        <a:latin typeface="Arial"/>
         <a:ea typeface="+mn-ea"/>
         <a:cs typeface="+mn-cs"/>
       </a:defRPr>
@@ -72,7 +76,7 @@
         <a:solidFill>
           <a:schemeClr val="tx1"/>
         </a:solidFill>
-        <a:latin typeface="Arial" charset="0"/>
+        <a:latin typeface="Arial"/>
         <a:ea typeface="+mn-ea"/>
         <a:cs typeface="+mn-cs"/>
       </a:defRPr>
@@ -88,7 +92,7 @@
         <a:solidFill>
           <a:schemeClr val="tx1"/>
         </a:solidFill>
-        <a:latin typeface="Arial" charset="0"/>
+        <a:latin typeface="Arial"/>
         <a:ea typeface="+mn-ea"/>
         <a:cs typeface="+mn-cs"/>
       </a:defRPr>
@@ -98,7 +102,7 @@
         <a:solidFill>
           <a:schemeClr val="tx1"/>
         </a:solidFill>
-        <a:latin typeface="Arial" charset="0"/>
+        <a:latin typeface="Arial"/>
         <a:ea typeface="+mn-ea"/>
         <a:cs typeface="+mn-cs"/>
       </a:defRPr>
@@ -108,7 +112,7 @@
         <a:solidFill>
           <a:schemeClr val="tx1"/>
         </a:solidFill>
-        <a:latin typeface="Arial" charset="0"/>
+        <a:latin typeface="Arial"/>
         <a:ea typeface="+mn-ea"/>
         <a:cs typeface="+mn-cs"/>
       </a:defRPr>
@@ -118,7 +122,7 @@
         <a:solidFill>
           <a:schemeClr val="tx1"/>
         </a:solidFill>
-        <a:latin typeface="Arial" charset="0"/>
+        <a:latin typeface="Arial"/>
         <a:ea typeface="+mn-ea"/>
         <a:cs typeface="+mn-cs"/>
       </a:defRPr>
@@ -128,7 +132,7 @@
         <a:solidFill>
           <a:schemeClr val="tx1"/>
         </a:solidFill>
-        <a:latin typeface="Arial" charset="0"/>
+        <a:latin typeface="Arial"/>
         <a:ea typeface="+mn-ea"/>
         <a:cs typeface="+mn-cs"/>
       </a:defRPr>
@@ -138,7 +142,7 @@
 </file>
 
 <file path=ppt/slideLayouts/slideLayout1.xml><?xml version="1.0" encoding="utf-8"?>
-<p:sldLayout xmlns:a="http://schemas.openxmlformats.org/drawingml/2006/main" xmlns:r="http://schemas.openxmlformats.org/officeDocument/2006/relationships" xmlns:p="http://schemas.openxmlformats.org/presentationml/2006/main" showMasterSp="0" type="title" preserve="1">
+<p:sldLayout xmlns:a="http://schemas.openxmlformats.org/drawingml/2006/main" xmlns:r="http://schemas.openxmlformats.org/officeDocument/2006/relationships" xmlns:p14="http://schemas.microsoft.com/office/powerpoint/2010/main" xmlns:p15="http://schemas.microsoft.com/office/powerpoint/2012/main" xmlns:p="http://schemas.openxmlformats.org/presentationml/2006/main" showMasterSp="0" type="title" preserve="1">
   <p:cSld name="Title Slide">
     <p:spTree>
       <p:nvGrpSpPr>
@@ -150,19 +154,15 @@
         <a:xfrm>
           <a:off x="0" y="0"/>
           <a:ext cx="0" cy="0"/>
-          <a:chOff x="0" y="0"/>
-          <a:chExt cx="0" cy="0"/>
         </a:xfrm>
       </p:grpSpPr>
       <p:grpSp>
         <p:nvGrpSpPr>
           <p:cNvPr id="16386" name="Group 2"/>
-          <p:cNvGrpSpPr>
-            <a:grpSpLocks/>
-          </p:cNvGrpSpPr>
+          <p:cNvGrpSpPr/>
           <p:nvPr/>
         </p:nvGrpSpPr>
-        <p:grpSpPr bwMode="auto">
+        <p:grpSpPr>
           <a:xfrm>
             <a:off x="3175" y="4267200"/>
             <a:ext cx="9140825" cy="2590800"/>
@@ -173,9 +173,7 @@
         <p:sp>
           <p:nvSpPr>
             <p:cNvPr id="16387" name="Freeform 3"/>
-            <p:cNvSpPr>
-              <a:spLocks/>
-            </p:cNvSpPr>
+            <p:cNvSpPr/>
             <p:nvPr/>
           </p:nvSpPr>
           <p:spPr bwMode="hidden">
@@ -184,9 +182,6 @@
               <a:ext cx="5758" cy="1632"/>
             </a:xfrm>
             <a:custGeom>
-              <a:avLst/>
-              <a:gdLst/>
-              <a:ahLst/>
               <a:cxnLst>
                 <a:cxn ang="0">
                   <a:pos x="5740" y="4316"/>
@@ -242,12 +237,11 @@
                 </a:gs>
               </a:gsLst>
               <a:lin ang="5400000" scaled="1"/>
+              <a:tileRect/>
             </a:gradFill>
             <a:ln w="9525">
               <a:noFill/>
               <a:round/>
-              <a:headEnd/>
-              <a:tailEnd/>
             </a:ln>
           </p:spPr>
           <p:txBody>
@@ -261,12 +255,10 @@
         <p:grpSp>
           <p:nvGrpSpPr>
             <p:cNvPr id="16388" name="Group 4"/>
-            <p:cNvGrpSpPr>
-              <a:grpSpLocks/>
-            </p:cNvGrpSpPr>
+            <p:cNvGrpSpPr/>
             <p:nvPr userDrawn="1"/>
           </p:nvGrpSpPr>
-          <p:grpSpPr bwMode="auto">
+          <p:grpSpPr>
             <a:xfrm>
               <a:off x="3528" y="3715"/>
               <a:ext cx="792" cy="521"/>
@@ -306,14 +298,12 @@
                 <a:path path="shape">
                   <a:fillToRect l="50000" t="50000" r="50000" b="50000"/>
                 </a:path>
+                <a:tileRect/>
               </a:gradFill>
               <a:ln w="9525">
                 <a:noFill/>
                 <a:round/>
-                <a:headEnd/>
-                <a:tailEnd/>
               </a:ln>
-              <a:effectLst/>
             </p:spPr>
             <p:txBody>
               <a:bodyPr/>
@@ -353,14 +343,12 @@
                   </a:gs>
                 </a:gsLst>
                 <a:lin ang="5400000" scaled="1"/>
+                <a:tileRect/>
               </a:gradFill>
               <a:ln w="9525">
                 <a:noFill/>
                 <a:round/>
-                <a:headEnd/>
-                <a:tailEnd/>
               </a:ln>
-              <a:effectLst/>
             </p:spPr>
             <p:txBody>
               <a:bodyPr/>
@@ -400,14 +388,12 @@
                   </a:gs>
                 </a:gsLst>
                 <a:lin ang="5400000" scaled="1"/>
+                <a:tileRect/>
               </a:gradFill>
               <a:ln w="9525">
                 <a:noFill/>
                 <a:round/>
-                <a:headEnd/>
-                <a:tailEnd/>
               </a:ln>
-              <a:effectLst/>
             </p:spPr>
             <p:txBody>
               <a:bodyPr/>
@@ -447,14 +433,12 @@
                   </a:gs>
                 </a:gsLst>
                 <a:lin ang="5400000" scaled="1"/>
+                <a:tileRect/>
               </a:gradFill>
               <a:ln w="9525">
                 <a:noFill/>
                 <a:round/>
-                <a:headEnd/>
-                <a:tailEnd/>
               </a:ln>
-              <a:effectLst/>
             </p:spPr>
             <p:txBody>
               <a:bodyPr/>
@@ -494,14 +478,12 @@
                   </a:gs>
                 </a:gsLst>
                 <a:lin ang="5400000" scaled="1"/>
+                <a:tileRect/>
               </a:gradFill>
               <a:ln w="9525">
                 <a:noFill/>
                 <a:round/>
-                <a:headEnd/>
-                <a:tailEnd/>
               </a:ln>
-              <a:effectLst/>
             </p:spPr>
             <p:txBody>
               <a:bodyPr/>
@@ -514,9 +496,7 @@
           <p:sp>
             <p:nvSpPr>
               <p:cNvPr id="16394" name="Freeform 10"/>
-              <p:cNvSpPr>
-                <a:spLocks/>
-              </p:cNvSpPr>
+              <p:cNvSpPr/>
               <p:nvPr/>
             </p:nvSpPr>
             <p:spPr bwMode="hidden">
@@ -525,9 +505,6 @@
                 <a:ext cx="383" cy="161"/>
               </a:xfrm>
               <a:custGeom>
-                <a:avLst/>
-                <a:gdLst/>
-                <a:ahLst/>
                 <a:cxnLst>
                   <a:cxn ang="0">
                     <a:pos x="376" y="12"/>
@@ -665,12 +642,11 @@
                   </a:gs>
                 </a:gsLst>
                 <a:lin ang="5400000" scaled="1"/>
+                <a:tileRect/>
               </a:gradFill>
               <a:ln w="9525">
                 <a:noFill/>
                 <a:round/>
-                <a:headEnd/>
-                <a:tailEnd/>
               </a:ln>
             </p:spPr>
             <p:txBody>
@@ -684,9 +660,7 @@
           <p:sp>
             <p:nvSpPr>
               <p:cNvPr id="16395" name="Freeform 11"/>
-              <p:cNvSpPr>
-                <a:spLocks/>
-              </p:cNvSpPr>
+              <p:cNvSpPr/>
               <p:nvPr/>
             </p:nvSpPr>
             <p:spPr bwMode="hidden">
@@ -695,9 +669,6 @@
                 <a:ext cx="444" cy="66"/>
               </a:xfrm>
               <a:custGeom>
-                <a:avLst/>
-                <a:gdLst/>
-                <a:ahLst/>
                 <a:cxnLst>
                   <a:cxn ang="0">
                     <a:pos x="257" y="54"/>
@@ -750,7 +721,7 @@
                 </a:cxnLst>
                 <a:rect l="0" t="0" r="r" b="b"/>
                 <a:pathLst>
-                  <a:path w="443" h="66">
+                  <a:path w="442" h="66">
                     <a:moveTo>
                       <a:pt x="257" y="54"/>
                     </a:moveTo>
@@ -817,12 +788,11 @@
                   </a:gs>
                 </a:gsLst>
                 <a:lin ang="18900000" scaled="1"/>
+                <a:tileRect/>
               </a:gradFill>
               <a:ln w="9525">
                 <a:noFill/>
                 <a:round/>
-                <a:headEnd/>
-                <a:tailEnd/>
               </a:ln>
             </p:spPr>
             <p:txBody>
@@ -836,9 +806,7 @@
           <p:sp>
             <p:nvSpPr>
               <p:cNvPr id="16396" name="Freeform 12"/>
-              <p:cNvSpPr>
-                <a:spLocks/>
-              </p:cNvSpPr>
+              <p:cNvSpPr/>
               <p:nvPr/>
             </p:nvSpPr>
             <p:spPr bwMode="hidden">
@@ -847,9 +815,6 @@
                 <a:ext cx="89" cy="216"/>
               </a:xfrm>
               <a:custGeom>
-                <a:avLst/>
-                <a:gdLst/>
-                <a:ahLst/>
                 <a:cxnLst>
                   <a:cxn ang="0">
                     <a:pos x="12" y="66"/>
@@ -969,12 +934,11 @@
                   </a:gs>
                 </a:gsLst>
                 <a:lin ang="5400000" scaled="1"/>
+                <a:tileRect/>
               </a:gradFill>
               <a:ln w="9525">
                 <a:noFill/>
                 <a:round/>
-                <a:headEnd/>
-                <a:tailEnd/>
               </a:ln>
             </p:spPr>
             <p:txBody>
@@ -988,9 +952,7 @@
           <p:sp>
             <p:nvSpPr>
               <p:cNvPr id="16397" name="Freeform 13"/>
-              <p:cNvSpPr>
-                <a:spLocks/>
-              </p:cNvSpPr>
+              <p:cNvSpPr/>
               <p:nvPr/>
             </p:nvSpPr>
             <p:spPr bwMode="hidden">
@@ -999,9 +961,6 @@
                 <a:ext cx="750" cy="461"/>
               </a:xfrm>
               <a:custGeom>
-                <a:avLst/>
-                <a:gdLst/>
-                <a:ahLst/>
                 <a:cxnLst>
                   <a:cxn ang="0">
                     <a:pos x="382" y="443"/>
@@ -1363,12 +1322,11 @@
                 <a:path path="rect">
                   <a:fillToRect l="50000" t="50000" r="50000" b="50000"/>
                 </a:path>
+                <a:tileRect/>
               </a:gradFill>
               <a:ln w="9525">
                 <a:noFill/>
                 <a:round/>
-                <a:headEnd/>
-                <a:tailEnd/>
               </a:ln>
             </p:spPr>
             <p:txBody>
@@ -1382,9 +1340,7 @@
           <p:sp>
             <p:nvSpPr>
               <p:cNvPr id="16398" name="Freeform 14"/>
-              <p:cNvSpPr>
-                <a:spLocks/>
-              </p:cNvSpPr>
+              <p:cNvSpPr/>
               <p:nvPr/>
             </p:nvSpPr>
             <p:spPr bwMode="hidden">
@@ -1393,9 +1349,6 @@
                 <a:ext cx="96" cy="30"/>
               </a:xfrm>
               <a:custGeom>
-                <a:avLst/>
-                <a:gdLst/>
-                <a:ahLst/>
                 <a:cxnLst>
                   <a:cxn ang="0">
                     <a:pos x="0" y="0"/>
@@ -1473,12 +1426,11 @@
                   </a:gs>
                 </a:gsLst>
                 <a:lin ang="0" scaled="1"/>
+                <a:tileRect/>
               </a:gradFill>
               <a:ln w="9525">
                 <a:noFill/>
                 <a:round/>
-                <a:headEnd/>
-                <a:tailEnd/>
               </a:ln>
             </p:spPr>
             <p:txBody>
@@ -1519,14 +1471,12 @@
                   </a:gs>
                 </a:gsLst>
                 <a:lin ang="5400000" scaled="1"/>
+                <a:tileRect/>
               </a:gradFill>
               <a:ln w="9525">
                 <a:noFill/>
                 <a:round/>
-                <a:headEnd/>
-                <a:tailEnd/>
               </a:ln>
-              <a:effectLst/>
             </p:spPr>
             <p:txBody>
               <a:bodyPr/>
@@ -1540,12 +1490,10 @@
         <p:grpSp>
           <p:nvGrpSpPr>
             <p:cNvPr id="16400" name="Group 16"/>
-            <p:cNvGrpSpPr>
-              <a:grpSpLocks/>
-            </p:cNvGrpSpPr>
+            <p:cNvGrpSpPr/>
             <p:nvPr userDrawn="1"/>
           </p:nvGrpSpPr>
-          <p:grpSpPr bwMode="auto">
+          <p:grpSpPr>
             <a:xfrm>
               <a:off x="1776" y="3631"/>
               <a:ext cx="1626" cy="683"/>
@@ -1583,14 +1531,12 @@
                   </a:gs>
                 </a:gsLst>
                 <a:lin ang="2700000" scaled="1"/>
+                <a:tileRect/>
               </a:gradFill>
               <a:ln w="9525">
                 <a:noFill/>
                 <a:round/>
-                <a:headEnd/>
-                <a:tailEnd/>
               </a:ln>
-              <a:effectLst/>
             </p:spPr>
             <p:txBody>
               <a:bodyPr/>
@@ -1630,14 +1576,12 @@
                   </a:gs>
                 </a:gsLst>
                 <a:lin ang="2700000" scaled="1"/>
+                <a:tileRect/>
               </a:gradFill>
               <a:ln w="9525">
                 <a:noFill/>
                 <a:round/>
-                <a:headEnd/>
-                <a:tailEnd/>
               </a:ln>
-              <a:effectLst/>
             </p:spPr>
             <p:txBody>
               <a:bodyPr/>
@@ -1677,14 +1621,12 @@
                   </a:gs>
                 </a:gsLst>
                 <a:lin ang="2700000" scaled="1"/>
+                <a:tileRect/>
               </a:gradFill>
               <a:ln w="9525">
                 <a:noFill/>
                 <a:round/>
-                <a:headEnd/>
-                <a:tailEnd/>
               </a:ln>
-              <a:effectLst/>
             </p:spPr>
             <p:txBody>
               <a:bodyPr/>
@@ -1724,14 +1666,12 @@
                   </a:gs>
                 </a:gsLst>
                 <a:lin ang="5400000" scaled="1"/>
+                <a:tileRect/>
               </a:gradFill>
               <a:ln w="9525">
                 <a:noFill/>
                 <a:round/>
-                <a:headEnd/>
-                <a:tailEnd/>
               </a:ln>
-              <a:effectLst/>
             </p:spPr>
             <p:txBody>
               <a:bodyPr/>
@@ -1771,14 +1711,12 @@
                   </a:gs>
                 </a:gsLst>
                 <a:lin ang="5400000" scaled="1"/>
+                <a:tileRect/>
               </a:gradFill>
               <a:ln w="9525">
                 <a:noFill/>
                 <a:round/>
-                <a:headEnd/>
-                <a:tailEnd/>
               </a:ln>
-              <a:effectLst/>
             </p:spPr>
             <p:txBody>
               <a:bodyPr/>
@@ -1818,14 +1756,12 @@
                   </a:gs>
                 </a:gsLst>
                 <a:lin ang="5400000" scaled="1"/>
+                <a:tileRect/>
               </a:gradFill>
               <a:ln w="9525">
                 <a:noFill/>
                 <a:round/>
-                <a:headEnd/>
-                <a:tailEnd/>
               </a:ln>
-              <a:effectLst/>
             </p:spPr>
             <p:txBody>
               <a:bodyPr/>
@@ -1865,14 +1801,12 @@
                   </a:gs>
                 </a:gsLst>
                 <a:lin ang="2700000" scaled="1"/>
+                <a:tileRect/>
               </a:gradFill>
               <a:ln w="9525">
                 <a:noFill/>
                 <a:round/>
-                <a:headEnd/>
-                <a:tailEnd/>
               </a:ln>
-              <a:effectLst/>
             </p:spPr>
             <p:txBody>
               <a:bodyPr/>
@@ -1912,14 +1846,12 @@
                   </a:gs>
                 </a:gsLst>
                 <a:lin ang="0" scaled="1"/>
+                <a:tileRect/>
               </a:gradFill>
               <a:ln w="9525">
                 <a:noFill/>
                 <a:round/>
-                <a:headEnd/>
-                <a:tailEnd/>
               </a:ln>
-              <a:effectLst/>
             </p:spPr>
             <p:txBody>
               <a:bodyPr/>
@@ -1932,9 +1864,7 @@
           <p:sp>
             <p:nvSpPr>
               <p:cNvPr id="16409" name="Freeform 25"/>
-              <p:cNvSpPr>
-                <a:spLocks/>
-              </p:cNvSpPr>
+              <p:cNvSpPr/>
               <p:nvPr/>
             </p:nvSpPr>
             <p:spPr bwMode="hidden">
@@ -1943,9 +1873,6 @@
                 <a:ext cx="449" cy="186"/>
               </a:xfrm>
               <a:custGeom>
-                <a:avLst/>
-                <a:gdLst/>
-                <a:ahLst/>
                 <a:cxnLst>
                   <a:cxn ang="0">
                     <a:pos x="6" y="6"/>
@@ -2107,12 +2034,11 @@
                   </a:gs>
                 </a:gsLst>
                 <a:lin ang="5400000" scaled="1"/>
+                <a:tileRect/>
               </a:gradFill>
               <a:ln w="9525">
                 <a:noFill/>
                 <a:round/>
-                <a:headEnd/>
-                <a:tailEnd/>
               </a:ln>
             </p:spPr>
             <p:txBody>
@@ -2126,9 +2052,7 @@
           <p:sp>
             <p:nvSpPr>
               <p:cNvPr id="16410" name="Freeform 26"/>
-              <p:cNvSpPr>
-                <a:spLocks/>
-              </p:cNvSpPr>
+              <p:cNvSpPr/>
               <p:nvPr/>
             </p:nvSpPr>
             <p:spPr bwMode="hidden">
@@ -2137,9 +2061,6 @@
                 <a:ext cx="892" cy="462"/>
               </a:xfrm>
               <a:custGeom>
-                <a:avLst/>
-                <a:gdLst/>
-                <a:ahLst/>
                 <a:cxnLst>
                   <a:cxn ang="0">
                     <a:pos x="23" y="276"/>
@@ -2475,12 +2396,11 @@
                   </a:gs>
                 </a:gsLst>
                 <a:lin ang="2700000" scaled="1"/>
+                <a:tileRect/>
               </a:gradFill>
               <a:ln w="9525">
                 <a:noFill/>
                 <a:round/>
-                <a:headEnd/>
-                <a:tailEnd/>
               </a:ln>
             </p:spPr>
             <p:txBody>
@@ -2494,9 +2414,7 @@
           <p:sp>
             <p:nvSpPr>
               <p:cNvPr id="16411" name="Freeform 27"/>
-              <p:cNvSpPr>
-                <a:spLocks/>
-              </p:cNvSpPr>
+              <p:cNvSpPr/>
               <p:nvPr/>
             </p:nvSpPr>
             <p:spPr bwMode="hidden">
@@ -2505,9 +2423,6 @@
                 <a:ext cx="407" cy="486"/>
               </a:xfrm>
               <a:custGeom>
-                <a:avLst/>
-                <a:gdLst/>
-                <a:ahLst/>
                 <a:cxnLst>
                   <a:cxn ang="0">
                     <a:pos x="18" y="300"/>
@@ -2699,12 +2614,11 @@
                   </a:gs>
                 </a:gsLst>
                 <a:lin ang="0" scaled="1"/>
+                <a:tileRect/>
               </a:gradFill>
               <a:ln w="9525">
                 <a:noFill/>
                 <a:round/>
-                <a:headEnd/>
-                <a:tailEnd/>
               </a:ln>
             </p:spPr>
             <p:txBody>
@@ -2718,9 +2632,7 @@
           <p:sp>
             <p:nvSpPr>
               <p:cNvPr id="16412" name="Freeform 28"/>
-              <p:cNvSpPr>
-                <a:spLocks/>
-              </p:cNvSpPr>
+              <p:cNvSpPr/>
               <p:nvPr/>
             </p:nvSpPr>
             <p:spPr bwMode="hidden">
@@ -2729,9 +2641,6 @@
                 <a:ext cx="108" cy="252"/>
               </a:xfrm>
               <a:custGeom>
-                <a:avLst/>
-                <a:gdLst/>
-                <a:ahLst/>
                 <a:cxnLst>
                   <a:cxn ang="0">
                     <a:pos x="89" y="84"/>
@@ -2784,7 +2693,7 @@
                 </a:cxnLst>
                 <a:rect l="0" t="0" r="r" b="b"/>
                 <a:pathLst>
-                  <a:path w="107" h="252">
+                  <a:path w="107" h="251">
                     <a:moveTo>
                       <a:pt x="89" y="84"/>
                     </a:moveTo>
@@ -2851,12 +2760,11 @@
                   </a:gs>
                 </a:gsLst>
                 <a:lin ang="5400000" scaled="1"/>
+                <a:tileRect/>
               </a:gradFill>
               <a:ln w="9525">
                 <a:noFill/>
                 <a:round/>
-                <a:headEnd/>
-                <a:tailEnd/>
               </a:ln>
             </p:spPr>
             <p:txBody>
@@ -2870,9 +2778,7 @@
           <p:sp>
             <p:nvSpPr>
               <p:cNvPr id="16413" name="Freeform 29"/>
-              <p:cNvSpPr>
-                <a:spLocks/>
-              </p:cNvSpPr>
+              <p:cNvSpPr/>
               <p:nvPr/>
             </p:nvSpPr>
             <p:spPr bwMode="hidden">
@@ -2881,9 +2787,6 @@
                 <a:ext cx="835" cy="150"/>
               </a:xfrm>
               <a:custGeom>
-                <a:avLst/>
-                <a:gdLst/>
-                <a:ahLst/>
                 <a:cxnLst>
                   <a:cxn ang="0">
                     <a:pos x="518" y="18"/>
@@ -3019,8 +2922,6 @@
               <a:ln w="9525">
                 <a:noFill/>
                 <a:round/>
-                <a:headEnd/>
-                <a:tailEnd/>
               </a:ln>
             </p:spPr>
             <p:txBody>
@@ -3034,9 +2935,7 @@
           <p:sp>
             <p:nvSpPr>
               <p:cNvPr id="16414" name="Freeform 30"/>
-              <p:cNvSpPr>
-                <a:spLocks/>
-              </p:cNvSpPr>
+              <p:cNvSpPr/>
               <p:nvPr/>
             </p:nvSpPr>
             <p:spPr bwMode="hidden">
@@ -3045,9 +2944,6 @@
                 <a:ext cx="171" cy="461"/>
               </a:xfrm>
               <a:custGeom>
-                <a:avLst/>
-                <a:gdLst/>
-                <a:ahLst/>
                 <a:cxnLst>
                   <a:cxn ang="0">
                     <a:pos x="31" y="263"/>
@@ -3183,8 +3079,6 @@
               <a:ln w="9525">
                 <a:noFill/>
                 <a:round/>
-                <a:headEnd/>
-                <a:tailEnd/>
               </a:ln>
             </p:spPr>
             <p:txBody>
@@ -3198,9 +3092,7 @@
           <p:sp>
             <p:nvSpPr>
               <p:cNvPr id="16415" name="Freeform 31"/>
-              <p:cNvSpPr>
-                <a:spLocks/>
-              </p:cNvSpPr>
+              <p:cNvSpPr/>
               <p:nvPr/>
             </p:nvSpPr>
             <p:spPr bwMode="hidden">
@@ -3209,9 +3101,6 @@
                 <a:ext cx="360" cy="563"/>
               </a:xfrm>
               <a:custGeom>
-                <a:avLst/>
-                <a:gdLst/>
-                <a:ahLst/>
                 <a:cxnLst>
                   <a:cxn ang="0">
                     <a:pos x="360" y="365"/>
@@ -3403,12 +3292,11 @@
                   </a:gs>
                 </a:gsLst>
                 <a:lin ang="5400000" scaled="1"/>
+                <a:tileRect/>
               </a:gradFill>
               <a:ln w="9525">
                 <a:noFill/>
                 <a:round/>
-                <a:headEnd/>
-                <a:tailEnd/>
               </a:ln>
             </p:spPr>
             <p:txBody>
@@ -3422,9 +3310,7 @@
           <p:sp>
             <p:nvSpPr>
               <p:cNvPr id="16416" name="Freeform 32"/>
-              <p:cNvSpPr>
-                <a:spLocks/>
-              </p:cNvSpPr>
+              <p:cNvSpPr/>
               <p:nvPr/>
             </p:nvSpPr>
             <p:spPr bwMode="hidden">
@@ -3433,9 +3319,6 @@
                 <a:ext cx="1078" cy="425"/>
               </a:xfrm>
               <a:custGeom>
-                <a:avLst/>
-                <a:gdLst/>
-                <a:ahLst/>
                 <a:cxnLst>
                   <a:cxn ang="0">
                     <a:pos x="1053" y="425"/>
@@ -3621,12 +3504,11 @@
                   </a:gs>
                 </a:gsLst>
                 <a:lin ang="5400000" scaled="1"/>
+                <a:tileRect/>
               </a:gradFill>
               <a:ln w="9525">
                 <a:noFill/>
                 <a:round/>
-                <a:headEnd/>
-                <a:tailEnd/>
               </a:ln>
             </p:spPr>
             <p:txBody>
@@ -3640,9 +3522,7 @@
           <p:sp>
             <p:nvSpPr>
               <p:cNvPr id="16417" name="Freeform 33"/>
-              <p:cNvSpPr>
-                <a:spLocks/>
-              </p:cNvSpPr>
+              <p:cNvSpPr/>
               <p:nvPr/>
             </p:nvSpPr>
             <p:spPr bwMode="hidden">
@@ -3651,9 +3531,6 @@
                 <a:ext cx="98" cy="234"/>
               </a:xfrm>
               <a:custGeom>
-                <a:avLst/>
-                <a:gdLst/>
-                <a:ahLst/>
                 <a:cxnLst>
                   <a:cxn ang="0">
                     <a:pos x="0" y="234"/>
@@ -3761,12 +3638,11 @@
                   </a:gs>
                 </a:gsLst>
                 <a:lin ang="5400000" scaled="1"/>
+                <a:tileRect/>
               </a:gradFill>
               <a:ln w="9525">
                 <a:noFill/>
                 <a:round/>
-                <a:headEnd/>
-                <a:tailEnd/>
               </a:ln>
             </p:spPr>
             <p:txBody>
@@ -3780,9 +3656,7 @@
           <p:sp>
             <p:nvSpPr>
               <p:cNvPr id="16418" name="Freeform 34"/>
-              <p:cNvSpPr>
-                <a:spLocks/>
-              </p:cNvSpPr>
+              <p:cNvSpPr/>
               <p:nvPr/>
             </p:nvSpPr>
             <p:spPr bwMode="hidden">
@@ -3791,9 +3665,6 @@
                 <a:ext cx="481" cy="641"/>
               </a:xfrm>
               <a:custGeom>
-                <a:avLst/>
-                <a:gdLst/>
-                <a:ahLst/>
                 <a:cxnLst>
                   <a:cxn ang="0">
                     <a:pos x="18" y="443"/>
@@ -3977,8 +3848,6 @@
               <a:ln w="9525">
                 <a:noFill/>
                 <a:round/>
-                <a:headEnd/>
-                <a:tailEnd/>
               </a:ln>
             </p:spPr>
             <p:txBody>
@@ -3993,12 +3862,10 @@
         <p:grpSp>
           <p:nvGrpSpPr>
             <p:cNvPr id="16419" name="Group 35"/>
-            <p:cNvGrpSpPr>
-              <a:grpSpLocks/>
-            </p:cNvGrpSpPr>
+            <p:cNvGrpSpPr/>
             <p:nvPr userDrawn="1"/>
           </p:nvGrpSpPr>
-          <p:grpSpPr bwMode="auto">
+          <p:grpSpPr>
             <a:xfrm>
               <a:off x="4128" y="3360"/>
               <a:ext cx="1351" cy="821"/>
@@ -4020,9 +3887,6 @@
                 <a:ext cx="1201" cy="731"/>
               </a:xfrm>
               <a:custGeom>
-                <a:avLst/>
-                <a:gdLst/>
-                <a:ahLst/>
                 <a:cxnLst>
                   <a:cxn ang="0">
                     <a:pos x="484" y="6"/>
@@ -4380,12 +4244,11 @@
                   </a:gs>
                 </a:gsLst>
                 <a:lin ang="5400000" scaled="1"/>
+                <a:tileRect/>
               </a:gradFill>
               <a:ln w="9525">
                 <a:noFill/>
                 <a:round/>
-                <a:headEnd/>
-                <a:tailEnd/>
               </a:ln>
             </p:spPr>
             <p:txBody>
@@ -4399,9 +4262,7 @@
           <p:sp>
             <p:nvSpPr>
               <p:cNvPr id="16421" name="Freeform 37"/>
-              <p:cNvSpPr>
-                <a:spLocks/>
-              </p:cNvSpPr>
+              <p:cNvSpPr/>
               <p:nvPr/>
             </p:nvSpPr>
             <p:spPr bwMode="hidden">
@@ -4410,9 +4271,6 @@
                 <a:ext cx="544" cy="737"/>
               </a:xfrm>
               <a:custGeom>
-                <a:avLst/>
-                <a:gdLst/>
-                <a:ahLst/>
                 <a:cxnLst>
                   <a:cxn ang="0">
                     <a:pos x="24" y="402"/>
@@ -4652,12 +4510,11 @@
                   </a:gs>
                 </a:gsLst>
                 <a:lin ang="5400000" scaled="1"/>
+                <a:tileRect/>
               </a:gradFill>
               <a:ln w="9525">
                 <a:noFill/>
                 <a:round/>
-                <a:headEnd/>
-                <a:tailEnd/>
               </a:ln>
             </p:spPr>
             <p:txBody>
@@ -4671,9 +4528,7 @@
           <p:sp>
             <p:nvSpPr>
               <p:cNvPr id="16422" name="Freeform 38"/>
-              <p:cNvSpPr>
-                <a:spLocks/>
-              </p:cNvSpPr>
+              <p:cNvSpPr/>
               <p:nvPr/>
             </p:nvSpPr>
             <p:spPr bwMode="hidden">
@@ -4682,9 +4537,6 @@
                 <a:ext cx="609" cy="252"/>
               </a:xfrm>
               <a:custGeom>
-                <a:avLst/>
-                <a:gdLst/>
-                <a:ahLst/>
                 <a:cxnLst>
                   <a:cxn ang="0">
                     <a:pos x="12" y="12"/>
@@ -4761,7 +4613,7 @@
                 </a:cxnLst>
                 <a:rect l="0" t="0" r="r" b="b"/>
                 <a:pathLst>
-                  <a:path w="609" h="252">
+                  <a:path w="609" h="251">
                     <a:moveTo>
                       <a:pt x="12" y="12"/>
                     </a:moveTo>
@@ -4852,12 +4704,11 @@
                   </a:gs>
                 </a:gsLst>
                 <a:lin ang="5400000" scaled="1"/>
+                <a:tileRect/>
               </a:gradFill>
               <a:ln w="9525">
                 <a:noFill/>
                 <a:round/>
-                <a:headEnd/>
-                <a:tailEnd/>
               </a:ln>
             </p:spPr>
             <p:txBody>
@@ -4871,9 +4722,7 @@
           <p:sp>
             <p:nvSpPr>
               <p:cNvPr id="16423" name="Freeform 39"/>
-              <p:cNvSpPr>
-                <a:spLocks/>
-              </p:cNvSpPr>
+              <p:cNvSpPr/>
               <p:nvPr/>
             </p:nvSpPr>
             <p:spPr bwMode="hidden">
@@ -4882,9 +4731,6 @@
                 <a:ext cx="72" cy="54"/>
               </a:xfrm>
               <a:custGeom>
-                <a:avLst/>
-                <a:gdLst/>
-                <a:ahLst/>
                 <a:cxnLst>
                   <a:cxn ang="0">
                     <a:pos x="72" y="0"/>
@@ -4962,12 +4808,11 @@
                   </a:gs>
                 </a:gsLst>
                 <a:lin ang="5400000" scaled="1"/>
+                <a:tileRect/>
               </a:gradFill>
               <a:ln w="9525">
                 <a:noFill/>
                 <a:round/>
-                <a:headEnd/>
-                <a:tailEnd/>
               </a:ln>
             </p:spPr>
             <p:txBody>
@@ -4981,9 +4826,7 @@
           <p:sp>
             <p:nvSpPr>
               <p:cNvPr id="16424" name="Freeform 40"/>
-              <p:cNvSpPr>
-                <a:spLocks/>
-              </p:cNvSpPr>
+              <p:cNvSpPr/>
               <p:nvPr/>
             </p:nvSpPr>
             <p:spPr bwMode="hidden">
@@ -4992,9 +4835,6 @@
                 <a:ext cx="705" cy="108"/>
               </a:xfrm>
               <a:custGeom>
-                <a:avLst/>
-                <a:gdLst/>
-                <a:ahLst/>
                 <a:cxnLst>
                   <a:cxn ang="0">
                     <a:pos x="299" y="90"/>
@@ -5126,12 +4966,11 @@
                   </a:gs>
                 </a:gsLst>
                 <a:lin ang="5400000" scaled="1"/>
+                <a:tileRect/>
               </a:gradFill>
               <a:ln w="9525">
                 <a:noFill/>
                 <a:round/>
-                <a:headEnd/>
-                <a:tailEnd/>
               </a:ln>
             </p:spPr>
             <p:txBody>
@@ -5145,9 +4984,7 @@
           <p:sp>
             <p:nvSpPr>
               <p:cNvPr id="16425" name="Freeform 41"/>
-              <p:cNvSpPr>
-                <a:spLocks/>
-              </p:cNvSpPr>
+              <p:cNvSpPr/>
               <p:nvPr/>
             </p:nvSpPr>
             <p:spPr bwMode="hidden">
@@ -5156,9 +4993,6 @@
                 <a:ext cx="143" cy="341"/>
               </a:xfrm>
               <a:custGeom>
-                <a:avLst/>
-                <a:gdLst/>
-                <a:ahLst/>
                 <a:cxnLst>
                   <a:cxn ang="0">
                     <a:pos x="119" y="114"/>
@@ -5278,12 +5112,11 @@
                   </a:gs>
                 </a:gsLst>
                 <a:lin ang="5400000" scaled="1"/>
+                <a:tileRect/>
               </a:gradFill>
               <a:ln w="9525">
                 <a:noFill/>
                 <a:round/>
-                <a:headEnd/>
-                <a:tailEnd/>
               </a:ln>
             </p:spPr>
             <p:txBody>
@@ -5297,9 +5130,7 @@
           <p:sp>
             <p:nvSpPr>
               <p:cNvPr id="16426" name="Freeform 42"/>
-              <p:cNvSpPr>
-                <a:spLocks/>
-              </p:cNvSpPr>
+              <p:cNvSpPr/>
               <p:nvPr/>
             </p:nvSpPr>
             <p:spPr bwMode="hidden">
@@ -5308,9 +5139,6 @@
                 <a:ext cx="83" cy="90"/>
               </a:xfrm>
               <a:custGeom>
-                <a:avLst/>
-                <a:gdLst/>
-                <a:ahLst/>
                 <a:cxnLst>
                   <a:cxn ang="0">
                     <a:pos x="59" y="90"/>
@@ -5388,12 +5216,11 @@
                   </a:gs>
                 </a:gsLst>
                 <a:lin ang="5400000" scaled="1"/>
+                <a:tileRect/>
               </a:gradFill>
               <a:ln w="9525">
                 <a:noFill/>
                 <a:round/>
-                <a:headEnd/>
-                <a:tailEnd/>
               </a:ln>
             </p:spPr>
             <p:txBody>
@@ -5407,9 +5234,7 @@
           <p:sp>
             <p:nvSpPr>
               <p:cNvPr id="16427" name="Freeform 43"/>
-              <p:cNvSpPr>
-                <a:spLocks/>
-              </p:cNvSpPr>
+              <p:cNvSpPr/>
               <p:nvPr/>
             </p:nvSpPr>
             <p:spPr bwMode="hidden">
@@ -5418,9 +5243,6 @@
                 <a:ext cx="717" cy="431"/>
               </a:xfrm>
               <a:custGeom>
-                <a:avLst/>
-                <a:gdLst/>
-                <a:ahLst/>
                 <a:cxnLst>
                   <a:cxn ang="0">
                     <a:pos x="693" y="216"/>
@@ -5814,8 +5636,6 @@
               <a:ln w="9525">
                 <a:noFill/>
                 <a:round/>
-                <a:headEnd/>
-                <a:tailEnd/>
               </a:ln>
             </p:spPr>
             <p:txBody>
@@ -5829,9 +5649,7 @@
           <p:sp>
             <p:nvSpPr>
               <p:cNvPr id="16428" name="Freeform 44"/>
-              <p:cNvSpPr>
-                <a:spLocks/>
-              </p:cNvSpPr>
+              <p:cNvSpPr/>
               <p:nvPr/>
             </p:nvSpPr>
             <p:spPr bwMode="hidden">
@@ -5840,9 +5658,6 @@
                 <a:ext cx="909" cy="533"/>
               </a:xfrm>
               <a:custGeom>
-                <a:avLst/>
-                <a:gdLst/>
-                <a:ahLst/>
                 <a:cxnLst>
                   <a:cxn ang="0">
                     <a:pos x="616" y="0"/>
@@ -6214,12 +6029,11 @@
                   </a:gs>
                 </a:gsLst>
                 <a:lin ang="0" scaled="1"/>
+                <a:tileRect/>
               </a:gradFill>
               <a:ln w="9525">
                 <a:noFill/>
                 <a:round/>
-                <a:headEnd/>
-                <a:tailEnd/>
               </a:ln>
             </p:spPr>
             <p:txBody>
@@ -6233,9 +6047,7 @@
           <p:sp>
             <p:nvSpPr>
               <p:cNvPr id="16429" name="Freeform 45"/>
-              <p:cNvSpPr>
-                <a:spLocks/>
-              </p:cNvSpPr>
+              <p:cNvSpPr/>
               <p:nvPr/>
             </p:nvSpPr>
             <p:spPr bwMode="hidden">
@@ -6244,9 +6056,6 @@
                 <a:ext cx="365" cy="66"/>
               </a:xfrm>
               <a:custGeom>
-                <a:avLst/>
-                <a:gdLst/>
-                <a:ahLst/>
                 <a:cxnLst>
                   <a:cxn ang="0">
                     <a:pos x="240" y="18"/>
@@ -6360,12 +6169,11 @@
                   </a:gs>
                 </a:gsLst>
                 <a:lin ang="5400000" scaled="1"/>
+                <a:tileRect/>
               </a:gradFill>
               <a:ln w="9525">
                 <a:noFill/>
                 <a:round/>
-                <a:headEnd/>
-                <a:tailEnd/>
               </a:ln>
             </p:spPr>
             <p:txBody>
@@ -6379,9 +6187,7 @@
           <p:sp>
             <p:nvSpPr>
               <p:cNvPr id="16430" name="Freeform 46"/>
-              <p:cNvSpPr>
-                <a:spLocks/>
-              </p:cNvSpPr>
+              <p:cNvSpPr/>
               <p:nvPr/>
             </p:nvSpPr>
             <p:spPr bwMode="hidden">
@@ -6390,9 +6196,6 @@
                 <a:ext cx="66" cy="48"/>
               </a:xfrm>
               <a:custGeom>
-                <a:avLst/>
-                <a:gdLst/>
-                <a:ahLst/>
                 <a:cxnLst>
                   <a:cxn ang="0">
                     <a:pos x="66" y="18"/>
@@ -6464,12 +6267,11 @@
                   </a:gs>
                 </a:gsLst>
                 <a:lin ang="5400000" scaled="1"/>
+                <a:tileRect/>
               </a:gradFill>
               <a:ln w="9525">
                 <a:noFill/>
                 <a:round/>
-                <a:headEnd/>
-                <a:tailEnd/>
               </a:ln>
             </p:spPr>
             <p:txBody>
@@ -6510,14 +6312,12 @@
                   </a:gs>
                 </a:gsLst>
                 <a:lin ang="0" scaled="1"/>
+                <a:tileRect/>
               </a:gradFill>
               <a:ln w="9525">
                 <a:noFill/>
                 <a:round/>
-                <a:headEnd/>
-                <a:tailEnd/>
               </a:ln>
-              <a:effectLst/>
             </p:spPr>
             <p:txBody>
               <a:bodyPr/>
@@ -6557,14 +6357,12 @@
                   </a:gs>
                 </a:gsLst>
                 <a:lin ang="5400000" scaled="1"/>
+                <a:tileRect/>
               </a:gradFill>
               <a:ln w="9525">
                 <a:noFill/>
                 <a:round/>
-                <a:headEnd/>
-                <a:tailEnd/>
               </a:ln>
-              <a:effectLst/>
             </p:spPr>
             <p:txBody>
               <a:bodyPr/>
@@ -6604,14 +6402,12 @@
                   </a:gs>
                 </a:gsLst>
                 <a:lin ang="5400000" scaled="1"/>
+                <a:tileRect/>
               </a:gradFill>
               <a:ln w="9525">
                 <a:noFill/>
                 <a:round/>
-                <a:headEnd/>
-                <a:tailEnd/>
               </a:ln>
-              <a:effectLst/>
             </p:spPr>
             <p:txBody>
               <a:bodyPr/>
@@ -6651,14 +6447,12 @@
                   </a:gs>
                 </a:gsLst>
                 <a:lin ang="5400000" scaled="1"/>
+                <a:tileRect/>
               </a:gradFill>
               <a:ln w="9525">
                 <a:noFill/>
                 <a:round/>
-                <a:headEnd/>
-                <a:tailEnd/>
               </a:ln>
-              <a:effectLst/>
             </p:spPr>
             <p:txBody>
               <a:bodyPr/>
@@ -6698,14 +6492,12 @@
                   </a:gs>
                 </a:gsLst>
                 <a:lin ang="5400000" scaled="1"/>
+                <a:tileRect/>
               </a:gradFill>
               <a:ln w="9525">
                 <a:noFill/>
                 <a:round/>
-                <a:headEnd/>
-                <a:tailEnd/>
               </a:ln>
-              <a:effectLst/>
             </p:spPr>
             <p:txBody>
               <a:bodyPr/>
@@ -6745,14 +6537,12 @@
                   </a:gs>
                 </a:gsLst>
                 <a:lin ang="5400000" scaled="1"/>
+                <a:tileRect/>
               </a:gradFill>
               <a:ln w="9525">
                 <a:noFill/>
                 <a:round/>
-                <a:headEnd/>
-                <a:tailEnd/>
               </a:ln>
-              <a:effectLst/>
             </p:spPr>
             <p:txBody>
               <a:bodyPr/>
@@ -6766,12 +6556,10 @@
         <p:grpSp>
           <p:nvGrpSpPr>
             <p:cNvPr id="16437" name="Group 53"/>
-            <p:cNvGrpSpPr>
-              <a:grpSpLocks/>
-            </p:cNvGrpSpPr>
+            <p:cNvGrpSpPr/>
             <p:nvPr userDrawn="1"/>
           </p:nvGrpSpPr>
-          <p:grpSpPr bwMode="auto">
+          <p:grpSpPr>
             <a:xfrm>
               <a:off x="5280" y="3024"/>
               <a:ext cx="425" cy="258"/>
@@ -6782,9 +6570,7 @@
           <p:sp>
             <p:nvSpPr>
               <p:cNvPr id="16438" name="Freeform 54"/>
-              <p:cNvSpPr>
-                <a:spLocks/>
-              </p:cNvSpPr>
+              <p:cNvSpPr/>
               <p:nvPr/>
             </p:nvSpPr>
             <p:spPr bwMode="hidden">
@@ -6793,9 +6579,6 @@
                 <a:ext cx="383" cy="96"/>
               </a:xfrm>
               <a:custGeom>
-                <a:avLst/>
-                <a:gdLst/>
-                <a:ahLst/>
                 <a:cxnLst>
                   <a:cxn ang="0">
                     <a:pos x="209" y="96"/>
@@ -6935,12 +6718,11 @@
                   </a:gs>
                 </a:gsLst>
                 <a:lin ang="5400000" scaled="1"/>
+                <a:tileRect/>
               </a:gradFill>
               <a:ln w="9525">
                 <a:noFill/>
                 <a:round/>
-                <a:headEnd/>
-                <a:tailEnd/>
               </a:ln>
             </p:spPr>
             <p:txBody>
@@ -6954,9 +6736,7 @@
           <p:sp>
             <p:nvSpPr>
               <p:cNvPr id="16439" name="Freeform 55"/>
-              <p:cNvSpPr>
-                <a:spLocks/>
-              </p:cNvSpPr>
+              <p:cNvSpPr/>
               <p:nvPr/>
             </p:nvSpPr>
             <p:spPr bwMode="hidden">
@@ -6965,9 +6745,6 @@
                 <a:ext cx="258" cy="54"/>
               </a:xfrm>
               <a:custGeom>
-                <a:avLst/>
-                <a:gdLst/>
-                <a:ahLst/>
                 <a:cxnLst>
                   <a:cxn ang="0">
                     <a:pos x="174" y="0"/>
@@ -7083,12 +6860,11 @@
                   </a:gs>
                 </a:gsLst>
                 <a:lin ang="5400000" scaled="1"/>
+                <a:tileRect/>
               </a:gradFill>
               <a:ln w="9525">
                 <a:noFill/>
                 <a:round/>
-                <a:headEnd/>
-                <a:tailEnd/>
               </a:ln>
             </p:spPr>
             <p:txBody>
@@ -7102,9 +6878,7 @@
           <p:sp>
             <p:nvSpPr>
               <p:cNvPr id="16440" name="Freeform 56"/>
-              <p:cNvSpPr>
-                <a:spLocks/>
-              </p:cNvSpPr>
+              <p:cNvSpPr/>
               <p:nvPr/>
             </p:nvSpPr>
             <p:spPr bwMode="hidden">
@@ -7113,9 +6887,6 @@
                 <a:ext cx="60" cy="156"/>
               </a:xfrm>
               <a:custGeom>
-                <a:avLst/>
-                <a:gdLst/>
-                <a:ahLst/>
                 <a:cxnLst>
                   <a:cxn ang="0">
                     <a:pos x="54" y="90"/>
@@ -7231,12 +7002,11 @@
                   </a:gs>
                 </a:gsLst>
                 <a:lin ang="5400000" scaled="1"/>
+                <a:tileRect/>
               </a:gradFill>
               <a:ln w="9525">
                 <a:noFill/>
                 <a:round/>
-                <a:headEnd/>
-                <a:tailEnd/>
               </a:ln>
             </p:spPr>
             <p:txBody>
@@ -7250,9 +7020,7 @@
           <p:sp>
             <p:nvSpPr>
               <p:cNvPr id="16441" name="Freeform 57"/>
-              <p:cNvSpPr>
-                <a:spLocks/>
-              </p:cNvSpPr>
+              <p:cNvSpPr/>
               <p:nvPr/>
             </p:nvSpPr>
             <p:spPr bwMode="hidden">
@@ -7261,9 +7029,6 @@
                 <a:ext cx="192" cy="18"/>
               </a:xfrm>
               <a:custGeom>
-                <a:avLst/>
-                <a:gdLst/>
-                <a:ahLst/>
                 <a:cxnLst>
                   <a:cxn ang="0">
                     <a:pos x="114" y="12"/>
@@ -7355,12 +7120,11 @@
                   </a:gs>
                 </a:gsLst>
                 <a:lin ang="5400000" scaled="1"/>
+                <a:tileRect/>
               </a:gradFill>
               <a:ln w="9525">
                 <a:noFill/>
                 <a:round/>
-                <a:headEnd/>
-                <a:tailEnd/>
               </a:ln>
             </p:spPr>
             <p:txBody>
@@ -7374,9 +7138,7 @@
           <p:sp>
             <p:nvSpPr>
               <p:cNvPr id="16442" name="Freeform 58"/>
-              <p:cNvSpPr>
-                <a:spLocks/>
-              </p:cNvSpPr>
+              <p:cNvSpPr/>
               <p:nvPr/>
             </p:nvSpPr>
             <p:spPr bwMode="hidden">
@@ -7385,9 +7147,6 @@
                 <a:ext cx="161" cy="186"/>
               </a:xfrm>
               <a:custGeom>
-                <a:avLst/>
-                <a:gdLst/>
-                <a:ahLst/>
                 <a:cxnLst>
                   <a:cxn ang="0">
                     <a:pos x="11" y="114"/>
@@ -7533,12 +7292,11 @@
                   </a:gs>
                 </a:gsLst>
                 <a:lin ang="5400000" scaled="1"/>
+                <a:tileRect/>
               </a:gradFill>
               <a:ln w="9525">
                 <a:noFill/>
                 <a:round/>
-                <a:headEnd/>
-                <a:tailEnd/>
               </a:ln>
             </p:spPr>
             <p:txBody>
@@ -7552,9 +7310,7 @@
           <p:sp>
             <p:nvSpPr>
               <p:cNvPr id="16443" name="Freeform 59"/>
-              <p:cNvSpPr>
-                <a:spLocks/>
-              </p:cNvSpPr>
+              <p:cNvSpPr/>
               <p:nvPr/>
             </p:nvSpPr>
             <p:spPr bwMode="hidden">
@@ -7563,9 +7319,6 @@
                 <a:ext cx="186" cy="210"/>
               </a:xfrm>
               <a:custGeom>
-                <a:avLst/>
-                <a:gdLst/>
-                <a:ahLst/>
                 <a:cxnLst>
                   <a:cxn ang="0">
                     <a:pos x="0" y="6"/>
@@ -7729,12 +7482,11 @@
                   </a:gs>
                 </a:gsLst>
                 <a:lin ang="5400000" scaled="1"/>
+                <a:tileRect/>
               </a:gradFill>
               <a:ln w="9525">
                 <a:noFill/>
                 <a:round/>
-                <a:headEnd/>
-                <a:tailEnd/>
               </a:ln>
             </p:spPr>
             <p:txBody>
@@ -7759,9 +7511,6 @@
                 <a:ext cx="299" cy="186"/>
               </a:xfrm>
               <a:custGeom>
-                <a:avLst/>
-                <a:gdLst/>
-                <a:ahLst/>
                 <a:cxnLst>
                   <a:cxn ang="0">
                     <a:pos x="150" y="0"/>
@@ -8046,12 +7795,11 @@
                   </a:gs>
                 </a:gsLst>
                 <a:lin ang="5400000" scaled="1"/>
+                <a:tileRect/>
               </a:gradFill>
               <a:ln w="9525">
                 <a:noFill/>
                 <a:round/>
-                <a:headEnd/>
-                <a:tailEnd/>
               </a:ln>
             </p:spPr>
             <p:txBody>
@@ -8065,12 +7813,10 @@
           <p:grpSp>
             <p:nvGrpSpPr>
               <p:cNvPr id="16445" name="Group 61"/>
-              <p:cNvGrpSpPr>
-                <a:grpSpLocks/>
-              </p:cNvGrpSpPr>
+              <p:cNvGrpSpPr/>
               <p:nvPr/>
             </p:nvGrpSpPr>
-            <p:grpSpPr bwMode="auto">
+            <p:grpSpPr>
               <a:xfrm>
                 <a:off x="5381" y="3085"/>
                 <a:ext cx="227" cy="132"/>
@@ -8104,14 +7850,12 @@
                     </a:gs>
                   </a:gsLst>
                   <a:lin ang="5400000" scaled="1"/>
+                  <a:tileRect/>
                 </a:gradFill>
                 <a:ln w="9525">
                   <a:noFill/>
                   <a:round/>
-                  <a:headEnd/>
-                  <a:tailEnd/>
                 </a:ln>
-                <a:effectLst/>
               </p:spPr>
               <p:txBody>
                 <a:bodyPr/>
@@ -8147,14 +7891,12 @@
                     </a:gs>
                   </a:gsLst>
                   <a:lin ang="5400000" scaled="1"/>
+                  <a:tileRect/>
                 </a:gradFill>
                 <a:ln w="9525">
                   <a:noFill/>
                   <a:round/>
-                  <a:headEnd/>
-                  <a:tailEnd/>
                 </a:ln>
-                <a:effectLst/>
               </p:spPr>
               <p:txBody>
                 <a:bodyPr/>
@@ -8190,14 +7932,12 @@
                     </a:gs>
                   </a:gsLst>
                   <a:lin ang="5400000" scaled="1"/>
+                  <a:tileRect/>
                 </a:gradFill>
                 <a:ln w="9525">
                   <a:noFill/>
                   <a:round/>
-                  <a:headEnd/>
-                  <a:tailEnd/>
                 </a:ln>
-                <a:effectLst/>
               </p:spPr>
               <p:txBody>
                 <a:bodyPr/>
@@ -8233,14 +7973,12 @@
                     </a:gs>
                   </a:gsLst>
                   <a:lin ang="5400000" scaled="1"/>
+                  <a:tileRect/>
                 </a:gradFill>
                 <a:ln w="9525">
                   <a:noFill/>
                   <a:round/>
-                  <a:headEnd/>
-                  <a:tailEnd/>
                 </a:ln>
-                <a:effectLst/>
               </p:spPr>
               <p:txBody>
                 <a:bodyPr/>
@@ -8343,10 +8081,8 @@
           <a:p>
             <a:fld id="{DAB735F9-1465-49C8-9812-CE0D68338D28}" type="datetimeFigureOut">
               <a:rPr lang="en-US"/>
-              <a:pPr/>
               <a:t>7/3/2015</a:t>
             </a:fld>
-            <a:endParaRPr lang="en-US"/>
           </a:p>
         </p:txBody>
       </p:sp>
@@ -8404,10 +8140,8 @@
           <a:p>
             <a:fld id="{8E731920-0BDE-46C6-A859-AC509080224A}" type="slidenum">
               <a:rPr lang="en-US"/>
-              <a:pPr/>
               <a:t>‹#›</a:t>
             </a:fld>
-            <a:endParaRPr lang="en-US"/>
           </a:p>
         </p:txBody>
       </p:sp>
@@ -8416,18 +8150,13 @@
   <p:clrMapOvr>
     <a:masterClrMapping/>
   </p:clrMapOvr>
-  <p:timing>
-    <p:tnLst>
-      <p:par>
-        <p:cTn id="1" dur="indefinite" restart="never" nodeType="tmRoot"/>
-      </p:par>
-    </p:tnLst>
-  </p:timing>
+  <p:transition/>
+  <p:timing/>
 </p:sldLayout>
 </file>
 
 <file path=ppt/slideLayouts/slideLayout10.xml><?xml version="1.0" encoding="utf-8"?>
-<p:sldLayout xmlns:a="http://schemas.openxmlformats.org/drawingml/2006/main" xmlns:r="http://schemas.openxmlformats.org/officeDocument/2006/relationships" xmlns:p="http://schemas.openxmlformats.org/presentationml/2006/main" type="vertTx" preserve="1">
+<p:sldLayout xmlns:a="http://schemas.openxmlformats.org/drawingml/2006/main" xmlns:r="http://schemas.openxmlformats.org/officeDocument/2006/relationships" xmlns:p14="http://schemas.microsoft.com/office/powerpoint/2010/main" xmlns:p15="http://schemas.microsoft.com/office/powerpoint/2012/main" xmlns:p="http://schemas.openxmlformats.org/presentationml/2006/main" type="vertTx" preserve="1">
   <p:cSld name="Title and Vertical Text">
     <p:spTree>
       <p:nvGrpSpPr>
@@ -8439,8 +8168,6 @@
         <a:xfrm>
           <a:off x="0" y="0"/>
           <a:ext cx="0" cy="0"/>
-          <a:chOff x="0" y="0"/>
-          <a:chExt cx="0" cy="0"/>
         </a:xfrm>
       </p:grpSpPr>
       <p:sp>
@@ -8537,10 +8264,8 @@
           <a:p>
             <a:fld id="{31D77D96-391A-4375-818D-5522124446A4}" type="datetimeFigureOut">
               <a:rPr lang="en-US"/>
-              <a:pPr/>
               <a:t>7/3/2015</a:t>
             </a:fld>
-            <a:endParaRPr lang="en-US"/>
           </a:p>
         </p:txBody>
       </p:sp>
@@ -8588,10 +8313,8 @@
           <a:p>
             <a:fld id="{1AA9AE5A-0E4F-467E-AF32-A672A8FDA163}" type="slidenum">
               <a:rPr lang="en-US"/>
-              <a:pPr/>
               <a:t>‹#›</a:t>
             </a:fld>
-            <a:endParaRPr lang="en-US"/>
           </a:p>
         </p:txBody>
       </p:sp>
@@ -8600,11 +8323,13 @@
   <p:clrMapOvr>
     <a:masterClrMapping/>
   </p:clrMapOvr>
+  <p:transition/>
+  <p:timing/>
 </p:sldLayout>
 </file>
 
 <file path=ppt/slideLayouts/slideLayout11.xml><?xml version="1.0" encoding="utf-8"?>
-<p:sldLayout xmlns:a="http://schemas.openxmlformats.org/drawingml/2006/main" xmlns:r="http://schemas.openxmlformats.org/officeDocument/2006/relationships" xmlns:p="http://schemas.openxmlformats.org/presentationml/2006/main" type="vertTitleAndTx" preserve="1">
+<p:sldLayout xmlns:a="http://schemas.openxmlformats.org/drawingml/2006/main" xmlns:r="http://schemas.openxmlformats.org/officeDocument/2006/relationships" xmlns:p14="http://schemas.microsoft.com/office/powerpoint/2010/main" xmlns:p15="http://schemas.microsoft.com/office/powerpoint/2012/main" xmlns:p="http://schemas.openxmlformats.org/presentationml/2006/main" type="vertTitleAndTx" preserve="1">
   <p:cSld name="Vertical Title and Text">
     <p:spTree>
       <p:nvGrpSpPr>
@@ -8616,8 +8341,6 @@
         <a:xfrm>
           <a:off x="0" y="0"/>
           <a:ext cx="0" cy="0"/>
-          <a:chOff x="0" y="0"/>
-          <a:chExt cx="0" cy="0"/>
         </a:xfrm>
       </p:grpSpPr>
       <p:sp>
@@ -8724,10 +8447,8 @@
           <a:p>
             <a:fld id="{53D86CB1-7F68-4C87-8C62-F680E379926D}" type="datetimeFigureOut">
               <a:rPr lang="en-US"/>
-              <a:pPr/>
               <a:t>7/3/2015</a:t>
             </a:fld>
-            <a:endParaRPr lang="en-US"/>
           </a:p>
         </p:txBody>
       </p:sp>
@@ -8775,10 +8496,8 @@
           <a:p>
             <a:fld id="{40DC653E-2CE4-456A-94C1-725A3557A1BF}" type="slidenum">
               <a:rPr lang="en-US"/>
-              <a:pPr/>
               <a:t>‹#›</a:t>
             </a:fld>
-            <a:endParaRPr lang="en-US"/>
           </a:p>
         </p:txBody>
       </p:sp>
@@ -8787,11 +8506,13 @@
   <p:clrMapOvr>
     <a:masterClrMapping/>
   </p:clrMapOvr>
+  <p:transition/>
+  <p:timing/>
 </p:sldLayout>
 </file>
 
 <file path=ppt/slideLayouts/slideLayout2.xml><?xml version="1.0" encoding="utf-8"?>
-<p:sldLayout xmlns:a="http://schemas.openxmlformats.org/drawingml/2006/main" xmlns:r="http://schemas.openxmlformats.org/officeDocument/2006/relationships" xmlns:p="http://schemas.openxmlformats.org/presentationml/2006/main" type="obj" preserve="1">
+<p:sldLayout xmlns:a="http://schemas.openxmlformats.org/drawingml/2006/main" xmlns:r="http://schemas.openxmlformats.org/officeDocument/2006/relationships" xmlns:p14="http://schemas.microsoft.com/office/powerpoint/2010/main" xmlns:p15="http://schemas.microsoft.com/office/powerpoint/2012/main" xmlns:p="http://schemas.openxmlformats.org/presentationml/2006/main" type="obj" preserve="1">
   <p:cSld name="Title and Content">
     <p:spTree>
       <p:nvGrpSpPr>
@@ -8803,8 +8524,6 @@
         <a:xfrm>
           <a:off x="0" y="0"/>
           <a:ext cx="0" cy="0"/>
-          <a:chOff x="0" y="0"/>
-          <a:chExt cx="0" cy="0"/>
         </a:xfrm>
       </p:grpSpPr>
       <p:sp>
@@ -8901,10 +8620,8 @@
           <a:p>
             <a:fld id="{92184A04-54A4-472F-8B4D-A875DADF2067}" type="datetimeFigureOut">
               <a:rPr lang="en-US"/>
-              <a:pPr/>
               <a:t>7/3/2015</a:t>
             </a:fld>
-            <a:endParaRPr lang="en-US"/>
           </a:p>
         </p:txBody>
       </p:sp>
@@ -8952,10 +8669,8 @@
           <a:p>
             <a:fld id="{A4880B40-C4F3-419F-88D2-FD9CF6DA8C75}" type="slidenum">
               <a:rPr lang="en-US"/>
-              <a:pPr/>
               <a:t>‹#›</a:t>
             </a:fld>
-            <a:endParaRPr lang="en-US"/>
           </a:p>
         </p:txBody>
       </p:sp>
@@ -8964,11 +8679,13 @@
   <p:clrMapOvr>
     <a:masterClrMapping/>
   </p:clrMapOvr>
+  <p:transition/>
+  <p:timing/>
 </p:sldLayout>
 </file>
 
 <file path=ppt/slideLayouts/slideLayout3.xml><?xml version="1.0" encoding="utf-8"?>
-<p:sldLayout xmlns:a="http://schemas.openxmlformats.org/drawingml/2006/main" xmlns:r="http://schemas.openxmlformats.org/officeDocument/2006/relationships" xmlns:p="http://schemas.openxmlformats.org/presentationml/2006/main" type="secHead" preserve="1">
+<p:sldLayout xmlns:a="http://schemas.openxmlformats.org/drawingml/2006/main" xmlns:r="http://schemas.openxmlformats.org/officeDocument/2006/relationships" xmlns:p14="http://schemas.microsoft.com/office/powerpoint/2010/main" xmlns:p15="http://schemas.microsoft.com/office/powerpoint/2012/main" xmlns:p="http://schemas.openxmlformats.org/presentationml/2006/main" type="secHead" preserve="1">
   <p:cSld name="Section Header">
     <p:spTree>
       <p:nvGrpSpPr>
@@ -8980,8 +8697,6 @@
         <a:xfrm>
           <a:off x="0" y="0"/>
           <a:ext cx="0" cy="0"/>
-          <a:chOff x="0" y="0"/>
-          <a:chExt cx="0" cy="0"/>
         </a:xfrm>
       </p:grpSpPr>
       <p:sp>
@@ -9101,10 +8816,8 @@
           <a:p>
             <a:fld id="{6CC6A98F-5A40-4A42-A5B0-0D7DB493E056}" type="datetimeFigureOut">
               <a:rPr lang="en-US"/>
-              <a:pPr/>
               <a:t>7/3/2015</a:t>
             </a:fld>
-            <a:endParaRPr lang="en-US"/>
           </a:p>
         </p:txBody>
       </p:sp>
@@ -9152,10 +8865,8 @@
           <a:p>
             <a:fld id="{2333D397-79CF-4573-BF78-59E25B2D9C96}" type="slidenum">
               <a:rPr lang="en-US"/>
-              <a:pPr/>
               <a:t>‹#›</a:t>
             </a:fld>
-            <a:endParaRPr lang="en-US"/>
           </a:p>
         </p:txBody>
       </p:sp>
@@ -9164,11 +8875,13 @@
   <p:clrMapOvr>
     <a:masterClrMapping/>
   </p:clrMapOvr>
+  <p:transition/>
+  <p:timing/>
 </p:sldLayout>
 </file>
 
 <file path=ppt/slideLayouts/slideLayout4.xml><?xml version="1.0" encoding="utf-8"?>
-<p:sldLayout xmlns:a="http://schemas.openxmlformats.org/drawingml/2006/main" xmlns:r="http://schemas.openxmlformats.org/officeDocument/2006/relationships" xmlns:p="http://schemas.openxmlformats.org/presentationml/2006/main" type="twoObj" preserve="1">
+<p:sldLayout xmlns:a="http://schemas.openxmlformats.org/drawingml/2006/main" xmlns:r="http://schemas.openxmlformats.org/officeDocument/2006/relationships" xmlns:p14="http://schemas.microsoft.com/office/powerpoint/2010/main" xmlns:p15="http://schemas.microsoft.com/office/powerpoint/2012/main" xmlns:p="http://schemas.openxmlformats.org/presentationml/2006/main" type="twoObj" preserve="1">
   <p:cSld name="Two Content">
     <p:spTree>
       <p:nvGrpSpPr>
@@ -9180,8 +8893,6 @@
         <a:xfrm>
           <a:off x="0" y="0"/>
           <a:ext cx="0" cy="0"/>
-          <a:chOff x="0" y="0"/>
-          <a:chExt cx="0" cy="0"/>
         </a:xfrm>
       </p:grpSpPr>
       <p:sp>
@@ -9395,10 +9106,8 @@
           <a:p>
             <a:fld id="{1BA54017-AAA9-4966-88B6-61C08F322DD4}" type="datetimeFigureOut">
               <a:rPr lang="en-US"/>
-              <a:pPr/>
               <a:t>7/3/2015</a:t>
             </a:fld>
-            <a:endParaRPr lang="en-US"/>
           </a:p>
         </p:txBody>
       </p:sp>
@@ -9446,10 +9155,8 @@
           <a:p>
             <a:fld id="{DAAE48EC-5505-4A06-91B6-DB50510D79B5}" type="slidenum">
               <a:rPr lang="en-US"/>
-              <a:pPr/>
               <a:t>‹#›</a:t>
             </a:fld>
-            <a:endParaRPr lang="en-US"/>
           </a:p>
         </p:txBody>
       </p:sp>
@@ -9458,11 +9165,13 @@
   <p:clrMapOvr>
     <a:masterClrMapping/>
   </p:clrMapOvr>
+  <p:transition/>
+  <p:timing/>
 </p:sldLayout>
 </file>
 
 <file path=ppt/slideLayouts/slideLayout5.xml><?xml version="1.0" encoding="utf-8"?>
-<p:sldLayout xmlns:a="http://schemas.openxmlformats.org/drawingml/2006/main" xmlns:r="http://schemas.openxmlformats.org/officeDocument/2006/relationships" xmlns:p="http://schemas.openxmlformats.org/presentationml/2006/main" type="twoTxTwoObj" preserve="1">
+<p:sldLayout xmlns:a="http://schemas.openxmlformats.org/drawingml/2006/main" xmlns:r="http://schemas.openxmlformats.org/officeDocument/2006/relationships" xmlns:p14="http://schemas.microsoft.com/office/powerpoint/2010/main" xmlns:p15="http://schemas.microsoft.com/office/powerpoint/2012/main" xmlns:p="http://schemas.openxmlformats.org/presentationml/2006/main" type="twoTxTwoObj" preserve="1">
   <p:cSld name="Comparison">
     <p:spTree>
       <p:nvGrpSpPr>
@@ -9474,8 +9183,6 @@
         <a:xfrm>
           <a:off x="0" y="0"/>
           <a:ext cx="0" cy="0"/>
-          <a:chOff x="0" y="0"/>
-          <a:chExt cx="0" cy="0"/>
         </a:xfrm>
       </p:grpSpPr>
       <p:sp>
@@ -9828,10 +9535,8 @@
           <a:p>
             <a:fld id="{C14BFD42-95A8-491B-8FD5-5033584B4632}" type="datetimeFigureOut">
               <a:rPr lang="en-US"/>
-              <a:pPr/>
               <a:t>7/3/2015</a:t>
             </a:fld>
-            <a:endParaRPr lang="en-US"/>
           </a:p>
         </p:txBody>
       </p:sp>
@@ -9879,10 +9584,8 @@
           <a:p>
             <a:fld id="{90849084-8E58-435F-AB9E-D541B48C4836}" type="slidenum">
               <a:rPr lang="en-US"/>
-              <a:pPr/>
               <a:t>‹#›</a:t>
             </a:fld>
-            <a:endParaRPr lang="en-US"/>
           </a:p>
         </p:txBody>
       </p:sp>
@@ -9891,11 +9594,13 @@
   <p:clrMapOvr>
     <a:masterClrMapping/>
   </p:clrMapOvr>
+  <p:transition/>
+  <p:timing/>
 </p:sldLayout>
 </file>
 
 <file path=ppt/slideLayouts/slideLayout6.xml><?xml version="1.0" encoding="utf-8"?>
-<p:sldLayout xmlns:a="http://schemas.openxmlformats.org/drawingml/2006/main" xmlns:r="http://schemas.openxmlformats.org/officeDocument/2006/relationships" xmlns:p="http://schemas.openxmlformats.org/presentationml/2006/main" type="titleOnly" preserve="1">
+<p:sldLayout xmlns:a="http://schemas.openxmlformats.org/drawingml/2006/main" xmlns:r="http://schemas.openxmlformats.org/officeDocument/2006/relationships" xmlns:p14="http://schemas.microsoft.com/office/powerpoint/2010/main" xmlns:p15="http://schemas.microsoft.com/office/powerpoint/2012/main" xmlns:p="http://schemas.openxmlformats.org/presentationml/2006/main" type="titleOnly" preserve="1">
   <p:cSld name="Title Only">
     <p:spTree>
       <p:nvGrpSpPr>
@@ -9907,8 +9612,6 @@
         <a:xfrm>
           <a:off x="0" y="0"/>
           <a:ext cx="0" cy="0"/>
-          <a:chOff x="0" y="0"/>
-          <a:chExt cx="0" cy="0"/>
         </a:xfrm>
       </p:grpSpPr>
       <p:sp>
@@ -9954,10 +9657,8 @@
           <a:p>
             <a:fld id="{A01ED480-B474-4FF1-A8A6-8BA796E9C451}" type="datetimeFigureOut">
               <a:rPr lang="en-US"/>
-              <a:pPr/>
               <a:t>7/3/2015</a:t>
             </a:fld>
-            <a:endParaRPr lang="en-US"/>
           </a:p>
         </p:txBody>
       </p:sp>
@@ -10005,10 +9706,8 @@
           <a:p>
             <a:fld id="{681212CD-3FB2-417E-A700-9C6635A9CDA3}" type="slidenum">
               <a:rPr lang="en-US"/>
-              <a:pPr/>
               <a:t>‹#›</a:t>
             </a:fld>
-            <a:endParaRPr lang="en-US"/>
           </a:p>
         </p:txBody>
       </p:sp>
@@ -10017,11 +9716,13 @@
   <p:clrMapOvr>
     <a:masterClrMapping/>
   </p:clrMapOvr>
+  <p:transition/>
+  <p:timing/>
 </p:sldLayout>
 </file>
 
 <file path=ppt/slideLayouts/slideLayout7.xml><?xml version="1.0" encoding="utf-8"?>
-<p:sldLayout xmlns:a="http://schemas.openxmlformats.org/drawingml/2006/main" xmlns:r="http://schemas.openxmlformats.org/officeDocument/2006/relationships" xmlns:p="http://schemas.openxmlformats.org/presentationml/2006/main" type="blank" preserve="1">
+<p:sldLayout xmlns:a="http://schemas.openxmlformats.org/drawingml/2006/main" xmlns:r="http://schemas.openxmlformats.org/officeDocument/2006/relationships" xmlns:p14="http://schemas.microsoft.com/office/powerpoint/2010/main" xmlns:p15="http://schemas.microsoft.com/office/powerpoint/2012/main" xmlns:p="http://schemas.openxmlformats.org/presentationml/2006/main" type="blank" preserve="1">
   <p:cSld name="Blank">
     <p:spTree>
       <p:nvGrpSpPr>
@@ -10033,8 +9734,6 @@
         <a:xfrm>
           <a:off x="0" y="0"/>
           <a:ext cx="0" cy="0"/>
-          <a:chOff x="0" y="0"/>
-          <a:chExt cx="0" cy="0"/>
         </a:xfrm>
       </p:grpSpPr>
       <p:sp>
@@ -10058,10 +9757,8 @@
           <a:p>
             <a:fld id="{895DBBBC-4629-4D4F-82EF-EF2844C56C4D}" type="datetimeFigureOut">
               <a:rPr lang="en-US"/>
-              <a:pPr/>
               <a:t>7/3/2015</a:t>
             </a:fld>
-            <a:endParaRPr lang="en-US"/>
           </a:p>
         </p:txBody>
       </p:sp>
@@ -10109,10 +9806,8 @@
           <a:p>
             <a:fld id="{24819197-F007-4A2B-9395-55DB50924193}" type="slidenum">
               <a:rPr lang="en-US"/>
-              <a:pPr/>
               <a:t>‹#›</a:t>
             </a:fld>
-            <a:endParaRPr lang="en-US"/>
           </a:p>
         </p:txBody>
       </p:sp>
@@ -10121,11 +9816,13 @@
   <p:clrMapOvr>
     <a:masterClrMapping/>
   </p:clrMapOvr>
+  <p:transition/>
+  <p:timing/>
 </p:sldLayout>
 </file>
 
 <file path=ppt/slideLayouts/slideLayout8.xml><?xml version="1.0" encoding="utf-8"?>
-<p:sldLayout xmlns:a="http://schemas.openxmlformats.org/drawingml/2006/main" xmlns:r="http://schemas.openxmlformats.org/officeDocument/2006/relationships" xmlns:p="http://schemas.openxmlformats.org/presentationml/2006/main" type="objTx" preserve="1">
+<p:sldLayout xmlns:a="http://schemas.openxmlformats.org/drawingml/2006/main" xmlns:r="http://schemas.openxmlformats.org/officeDocument/2006/relationships" xmlns:p14="http://schemas.microsoft.com/office/powerpoint/2010/main" xmlns:p15="http://schemas.microsoft.com/office/powerpoint/2012/main" xmlns:p="http://schemas.openxmlformats.org/presentationml/2006/main" type="objTx" preserve="1">
   <p:cSld name="Content with Caption">
     <p:spTree>
       <p:nvGrpSpPr>
@@ -10137,8 +9834,6 @@
         <a:xfrm>
           <a:off x="0" y="0"/>
           <a:ext cx="0" cy="0"/>
-          <a:chOff x="0" y="0"/>
-          <a:chExt cx="0" cy="0"/>
         </a:xfrm>
       </p:grpSpPr>
       <p:sp>
@@ -10342,10 +10037,8 @@
           <a:p>
             <a:fld id="{2F115FD5-6359-42C4-923E-C0F966879EE2}" type="datetimeFigureOut">
               <a:rPr lang="en-US"/>
-              <a:pPr/>
               <a:t>7/3/2015</a:t>
             </a:fld>
-            <a:endParaRPr lang="en-US"/>
           </a:p>
         </p:txBody>
       </p:sp>
@@ -10393,10 +10086,8 @@
           <a:p>
             <a:fld id="{26EF36FD-4A21-4390-9F90-388F6D0F0C98}" type="slidenum">
               <a:rPr lang="en-US"/>
-              <a:pPr/>
               <a:t>‹#›</a:t>
             </a:fld>
-            <a:endParaRPr lang="en-US"/>
           </a:p>
         </p:txBody>
       </p:sp>
@@ -10405,11 +10096,13 @@
   <p:clrMapOvr>
     <a:masterClrMapping/>
   </p:clrMapOvr>
+  <p:transition/>
+  <p:timing/>
 </p:sldLayout>
 </file>
 
 <file path=ppt/slideLayouts/slideLayout9.xml><?xml version="1.0" encoding="utf-8"?>
-<p:sldLayout xmlns:a="http://schemas.openxmlformats.org/drawingml/2006/main" xmlns:r="http://schemas.openxmlformats.org/officeDocument/2006/relationships" xmlns:p="http://schemas.openxmlformats.org/presentationml/2006/main" type="picTx" preserve="1">
+<p:sldLayout xmlns:a="http://schemas.openxmlformats.org/drawingml/2006/main" xmlns:r="http://schemas.openxmlformats.org/officeDocument/2006/relationships" xmlns:p14="http://schemas.microsoft.com/office/powerpoint/2010/main" xmlns:p15="http://schemas.microsoft.com/office/powerpoint/2012/main" xmlns:p="http://schemas.openxmlformats.org/presentationml/2006/main" type="picTx" preserve="1">
   <p:cSld name="Picture with Caption">
     <p:spTree>
       <p:nvGrpSpPr>
@@ -10421,8 +10114,6 @@
         <a:xfrm>
           <a:off x="0" y="0"/>
           <a:ext cx="0" cy="0"/>
-          <a:chOff x="0" y="0"/>
-          <a:chExt cx="0" cy="0"/>
         </a:xfrm>
       </p:grpSpPr>
       <p:sp>
@@ -10603,10 +10294,8 @@
           <a:p>
             <a:fld id="{760E2472-C22E-4089-9160-E8F32CC63BB8}" type="datetimeFigureOut">
               <a:rPr lang="en-US"/>
-              <a:pPr/>
               <a:t>7/3/2015</a:t>
             </a:fld>
-            <a:endParaRPr lang="en-US"/>
           </a:p>
         </p:txBody>
       </p:sp>
@@ -10654,10 +10343,8 @@
           <a:p>
             <a:fld id="{7E814312-7F1D-46D1-B99C-1D90EA0C3704}" type="slidenum">
               <a:rPr lang="en-US"/>
-              <a:pPr/>
               <a:t>‹#›</a:t>
             </a:fld>
-            <a:endParaRPr lang="en-US"/>
           </a:p>
         </p:txBody>
       </p:sp>
@@ -10666,11 +10353,13 @@
   <p:clrMapOvr>
     <a:masterClrMapping/>
   </p:clrMapOvr>
+  <p:transition/>
+  <p:timing/>
 </p:sldLayout>
 </file>
 
 <file path=ppt/slideMasters/slideMaster1.xml><?xml version="1.0" encoding="utf-8"?>
-<p:sldMaster xmlns:a="http://schemas.openxmlformats.org/drawingml/2006/main" xmlns:r="http://schemas.openxmlformats.org/officeDocument/2006/relationships" xmlns:p="http://schemas.openxmlformats.org/presentationml/2006/main">
+<p:sldMaster xmlns:a="http://schemas.openxmlformats.org/drawingml/2006/main" xmlns:r="http://schemas.openxmlformats.org/officeDocument/2006/relationships" xmlns:p14="http://schemas.microsoft.com/office/powerpoint/2010/main" xmlns:p15="http://schemas.microsoft.com/office/powerpoint/2012/main" xmlns:p="http://schemas.openxmlformats.org/presentationml/2006/main">
   <p:cSld>
     <p:bg>
       <p:bgPr>
@@ -10690,16 +10379,12 @@
         <a:xfrm>
           <a:off x="0" y="0"/>
           <a:ext cx="0" cy="0"/>
-          <a:chOff x="0" y="0"/>
-          <a:chExt cx="0" cy="0"/>
         </a:xfrm>
       </p:grpSpPr>
       <p:sp>
         <p:nvSpPr>
           <p:cNvPr id="15362" name="Freeform 2"/>
-          <p:cNvSpPr>
-            <a:spLocks/>
-          </p:cNvSpPr>
+          <p:cNvSpPr/>
           <p:nvPr/>
         </p:nvSpPr>
         <p:spPr bwMode="hidden">
@@ -10708,9 +10393,6 @@
             <a:ext cx="285750" cy="209550"/>
           </a:xfrm>
           <a:custGeom>
-            <a:avLst/>
-            <a:gdLst/>
-            <a:ahLst/>
             <a:cxnLst>
               <a:cxn ang="0">
                 <a:pos x="0" y="132"/>
@@ -10812,12 +10494,11 @@
               </a:gs>
             </a:gsLst>
             <a:lin ang="18900000" scaled="1"/>
+            <a:tileRect/>
           </a:gradFill>
           <a:ln w="9525">
             <a:noFill/>
             <a:round/>
-            <a:headEnd/>
-            <a:tailEnd/>
           </a:ln>
         </p:spPr>
         <p:txBody>
@@ -10831,12 +10512,10 @@
       <p:grpSp>
         <p:nvGrpSpPr>
           <p:cNvPr id="15363" name="Group 3"/>
-          <p:cNvGrpSpPr>
-            <a:grpSpLocks/>
-          </p:cNvGrpSpPr>
+          <p:cNvGrpSpPr/>
           <p:nvPr/>
         </p:nvGrpSpPr>
-        <p:grpSpPr bwMode="auto">
+        <p:grpSpPr>
           <a:xfrm>
             <a:off x="3175" y="4267200"/>
             <a:ext cx="9140825" cy="2590800"/>
@@ -10847,9 +10526,7 @@
         <p:sp>
           <p:nvSpPr>
             <p:cNvPr id="15364" name="Freeform 4"/>
-            <p:cNvSpPr>
-              <a:spLocks/>
-            </p:cNvSpPr>
+            <p:cNvSpPr/>
             <p:nvPr/>
           </p:nvSpPr>
           <p:spPr bwMode="hidden">
@@ -10858,9 +10535,6 @@
               <a:ext cx="5758" cy="1632"/>
             </a:xfrm>
             <a:custGeom>
-              <a:avLst/>
-              <a:gdLst/>
-              <a:ahLst/>
               <a:cxnLst>
                 <a:cxn ang="0">
                   <a:pos x="5740" y="4316"/>
@@ -10916,12 +10590,11 @@
                 </a:gs>
               </a:gsLst>
               <a:lin ang="5400000" scaled="1"/>
+              <a:tileRect/>
             </a:gradFill>
             <a:ln w="9525">
               <a:noFill/>
               <a:round/>
-              <a:headEnd/>
-              <a:tailEnd/>
             </a:ln>
           </p:spPr>
           <p:txBody>
@@ -10935,12 +10608,10 @@
         <p:grpSp>
           <p:nvGrpSpPr>
             <p:cNvPr id="15365" name="Group 5"/>
-            <p:cNvGrpSpPr>
-              <a:grpSpLocks/>
-            </p:cNvGrpSpPr>
+            <p:cNvGrpSpPr/>
             <p:nvPr userDrawn="1"/>
           </p:nvGrpSpPr>
-          <p:grpSpPr bwMode="auto">
+          <p:grpSpPr>
             <a:xfrm>
               <a:off x="3528" y="3715"/>
               <a:ext cx="792" cy="521"/>
@@ -10980,14 +10651,12 @@
                 <a:path path="shape">
                   <a:fillToRect l="50000" t="50000" r="50000" b="50000"/>
                 </a:path>
+                <a:tileRect/>
               </a:gradFill>
               <a:ln w="9525">
                 <a:noFill/>
                 <a:round/>
-                <a:headEnd/>
-                <a:tailEnd/>
               </a:ln>
-              <a:effectLst/>
             </p:spPr>
             <p:txBody>
               <a:bodyPr/>
@@ -11027,14 +10696,12 @@
                   </a:gs>
                 </a:gsLst>
                 <a:lin ang="5400000" scaled="1"/>
+                <a:tileRect/>
               </a:gradFill>
               <a:ln w="9525">
                 <a:noFill/>
                 <a:round/>
-                <a:headEnd/>
-                <a:tailEnd/>
               </a:ln>
-              <a:effectLst/>
             </p:spPr>
             <p:txBody>
               <a:bodyPr/>
@@ -11074,14 +10741,12 @@
                   </a:gs>
                 </a:gsLst>
                 <a:lin ang="5400000" scaled="1"/>
+                <a:tileRect/>
               </a:gradFill>
               <a:ln w="9525">
                 <a:noFill/>
                 <a:round/>
-                <a:headEnd/>
-                <a:tailEnd/>
               </a:ln>
-              <a:effectLst/>
             </p:spPr>
             <p:txBody>
               <a:bodyPr/>
@@ -11121,14 +10786,12 @@
                   </a:gs>
                 </a:gsLst>
                 <a:lin ang="5400000" scaled="1"/>
+                <a:tileRect/>
               </a:gradFill>
               <a:ln w="9525">
                 <a:noFill/>
                 <a:round/>
-                <a:headEnd/>
-                <a:tailEnd/>
               </a:ln>
-              <a:effectLst/>
             </p:spPr>
             <p:txBody>
               <a:bodyPr/>
@@ -11168,14 +10831,12 @@
                   </a:gs>
                 </a:gsLst>
                 <a:lin ang="5400000" scaled="1"/>
+                <a:tileRect/>
               </a:gradFill>
               <a:ln w="9525">
                 <a:noFill/>
                 <a:round/>
-                <a:headEnd/>
-                <a:tailEnd/>
               </a:ln>
-              <a:effectLst/>
             </p:spPr>
             <p:txBody>
               <a:bodyPr/>
@@ -11188,9 +10849,7 @@
           <p:sp>
             <p:nvSpPr>
               <p:cNvPr id="15371" name="Freeform 11"/>
-              <p:cNvSpPr>
-                <a:spLocks/>
-              </p:cNvSpPr>
+              <p:cNvSpPr/>
               <p:nvPr/>
             </p:nvSpPr>
             <p:spPr bwMode="hidden">
@@ -11199,9 +10858,6 @@
                 <a:ext cx="383" cy="161"/>
               </a:xfrm>
               <a:custGeom>
-                <a:avLst/>
-                <a:gdLst/>
-                <a:ahLst/>
                 <a:cxnLst>
                   <a:cxn ang="0">
                     <a:pos x="376" y="12"/>
@@ -11339,12 +10995,11 @@
                   </a:gs>
                 </a:gsLst>
                 <a:lin ang="5400000" scaled="1"/>
+                <a:tileRect/>
               </a:gradFill>
               <a:ln w="9525">
                 <a:noFill/>
                 <a:round/>
-                <a:headEnd/>
-                <a:tailEnd/>
               </a:ln>
             </p:spPr>
             <p:txBody>
@@ -11358,9 +11013,7 @@
           <p:sp>
             <p:nvSpPr>
               <p:cNvPr id="15372" name="Freeform 12"/>
-              <p:cNvSpPr>
-                <a:spLocks/>
-              </p:cNvSpPr>
+              <p:cNvSpPr/>
               <p:nvPr/>
             </p:nvSpPr>
             <p:spPr bwMode="hidden">
@@ -11369,9 +11022,6 @@
                 <a:ext cx="444" cy="66"/>
               </a:xfrm>
               <a:custGeom>
-                <a:avLst/>
-                <a:gdLst/>
-                <a:ahLst/>
                 <a:cxnLst>
                   <a:cxn ang="0">
                     <a:pos x="257" y="54"/>
@@ -11424,7 +11074,7 @@
                 </a:cxnLst>
                 <a:rect l="0" t="0" r="r" b="b"/>
                 <a:pathLst>
-                  <a:path w="443" h="66">
+                  <a:path w="442" h="66">
                     <a:moveTo>
                       <a:pt x="257" y="54"/>
                     </a:moveTo>
@@ -11491,12 +11141,11 @@
                   </a:gs>
                 </a:gsLst>
                 <a:lin ang="18900000" scaled="1"/>
+                <a:tileRect/>
               </a:gradFill>
               <a:ln w="9525">
                 <a:noFill/>
                 <a:round/>
-                <a:headEnd/>
-                <a:tailEnd/>
               </a:ln>
             </p:spPr>
             <p:txBody>
@@ -11510,9 +11159,7 @@
           <p:sp>
             <p:nvSpPr>
               <p:cNvPr id="15373" name="Freeform 13"/>
-              <p:cNvSpPr>
-                <a:spLocks/>
-              </p:cNvSpPr>
+              <p:cNvSpPr/>
               <p:nvPr/>
             </p:nvSpPr>
             <p:spPr bwMode="hidden">
@@ -11521,9 +11168,6 @@
                 <a:ext cx="89" cy="216"/>
               </a:xfrm>
               <a:custGeom>
-                <a:avLst/>
-                <a:gdLst/>
-                <a:ahLst/>
                 <a:cxnLst>
                   <a:cxn ang="0">
                     <a:pos x="12" y="66"/>
@@ -11643,12 +11287,11 @@
                   </a:gs>
                 </a:gsLst>
                 <a:lin ang="5400000" scaled="1"/>
+                <a:tileRect/>
               </a:gradFill>
               <a:ln w="9525">
                 <a:noFill/>
                 <a:round/>
-                <a:headEnd/>
-                <a:tailEnd/>
               </a:ln>
             </p:spPr>
             <p:txBody>
@@ -11662,9 +11305,7 @@
           <p:sp>
             <p:nvSpPr>
               <p:cNvPr id="15374" name="Freeform 14"/>
-              <p:cNvSpPr>
-                <a:spLocks/>
-              </p:cNvSpPr>
+              <p:cNvSpPr/>
               <p:nvPr/>
             </p:nvSpPr>
             <p:spPr bwMode="hidden">
@@ -11673,9 +11314,6 @@
                 <a:ext cx="750" cy="461"/>
               </a:xfrm>
               <a:custGeom>
-                <a:avLst/>
-                <a:gdLst/>
-                <a:ahLst/>
                 <a:cxnLst>
                   <a:cxn ang="0">
                     <a:pos x="382" y="443"/>
@@ -12037,12 +11675,11 @@
                 <a:path path="rect">
                   <a:fillToRect l="50000" t="50000" r="50000" b="50000"/>
                 </a:path>
+                <a:tileRect/>
               </a:gradFill>
               <a:ln w="9525">
                 <a:noFill/>
                 <a:round/>
-                <a:headEnd/>
-                <a:tailEnd/>
               </a:ln>
             </p:spPr>
             <p:txBody>
@@ -12056,9 +11693,7 @@
           <p:sp>
             <p:nvSpPr>
               <p:cNvPr id="15375" name="Freeform 15"/>
-              <p:cNvSpPr>
-                <a:spLocks/>
-              </p:cNvSpPr>
+              <p:cNvSpPr/>
               <p:nvPr/>
             </p:nvSpPr>
             <p:spPr bwMode="hidden">
@@ -12067,9 +11702,6 @@
                 <a:ext cx="96" cy="30"/>
               </a:xfrm>
               <a:custGeom>
-                <a:avLst/>
-                <a:gdLst/>
-                <a:ahLst/>
                 <a:cxnLst>
                   <a:cxn ang="0">
                     <a:pos x="0" y="0"/>
@@ -12147,12 +11779,11 @@
                   </a:gs>
                 </a:gsLst>
                 <a:lin ang="0" scaled="1"/>
+                <a:tileRect/>
               </a:gradFill>
               <a:ln w="9525">
                 <a:noFill/>
                 <a:round/>
-                <a:headEnd/>
-                <a:tailEnd/>
               </a:ln>
             </p:spPr>
             <p:txBody>
@@ -12193,14 +11824,12 @@
                   </a:gs>
                 </a:gsLst>
                 <a:lin ang="5400000" scaled="1"/>
+                <a:tileRect/>
               </a:gradFill>
               <a:ln w="9525">
                 <a:noFill/>
                 <a:round/>
-                <a:headEnd/>
-                <a:tailEnd/>
               </a:ln>
-              <a:effectLst/>
             </p:spPr>
             <p:txBody>
               <a:bodyPr/>
@@ -12214,12 +11843,10 @@
         <p:grpSp>
           <p:nvGrpSpPr>
             <p:cNvPr id="15377" name="Group 17"/>
-            <p:cNvGrpSpPr>
-              <a:grpSpLocks/>
-            </p:cNvGrpSpPr>
+            <p:cNvGrpSpPr/>
             <p:nvPr userDrawn="1"/>
           </p:nvGrpSpPr>
-          <p:grpSpPr bwMode="auto">
+          <p:grpSpPr>
             <a:xfrm>
               <a:off x="1776" y="3631"/>
               <a:ext cx="1626" cy="683"/>
@@ -12257,14 +11884,12 @@
                   </a:gs>
                 </a:gsLst>
                 <a:lin ang="2700000" scaled="1"/>
+                <a:tileRect/>
               </a:gradFill>
               <a:ln w="9525">
                 <a:noFill/>
                 <a:round/>
-                <a:headEnd/>
-                <a:tailEnd/>
               </a:ln>
-              <a:effectLst/>
             </p:spPr>
             <p:txBody>
               <a:bodyPr/>
@@ -12304,14 +11929,12 @@
                   </a:gs>
                 </a:gsLst>
                 <a:lin ang="2700000" scaled="1"/>
+                <a:tileRect/>
               </a:gradFill>
               <a:ln w="9525">
                 <a:noFill/>
                 <a:round/>
-                <a:headEnd/>
-                <a:tailEnd/>
               </a:ln>
-              <a:effectLst/>
             </p:spPr>
             <p:txBody>
               <a:bodyPr/>
@@ -12351,14 +11974,12 @@
                   </a:gs>
                 </a:gsLst>
                 <a:lin ang="2700000" scaled="1"/>
+                <a:tileRect/>
               </a:gradFill>
               <a:ln w="9525">
                 <a:noFill/>
                 <a:round/>
-                <a:headEnd/>
-                <a:tailEnd/>
               </a:ln>
-              <a:effectLst/>
             </p:spPr>
             <p:txBody>
               <a:bodyPr/>
@@ -12398,14 +12019,12 @@
                   </a:gs>
                 </a:gsLst>
                 <a:lin ang="5400000" scaled="1"/>
+                <a:tileRect/>
               </a:gradFill>
               <a:ln w="9525">
                 <a:noFill/>
                 <a:round/>
-                <a:headEnd/>
-                <a:tailEnd/>
               </a:ln>
-              <a:effectLst/>
             </p:spPr>
             <p:txBody>
               <a:bodyPr/>
@@ -12445,14 +12064,12 @@
                   </a:gs>
                 </a:gsLst>
                 <a:lin ang="5400000" scaled="1"/>
+                <a:tileRect/>
               </a:gradFill>
               <a:ln w="9525">
                 <a:noFill/>
                 <a:round/>
-                <a:headEnd/>
-                <a:tailEnd/>
               </a:ln>
-              <a:effectLst/>
             </p:spPr>
             <p:txBody>
               <a:bodyPr/>
@@ -12492,14 +12109,12 @@
                   </a:gs>
                 </a:gsLst>
                 <a:lin ang="5400000" scaled="1"/>
+                <a:tileRect/>
               </a:gradFill>
               <a:ln w="9525">
                 <a:noFill/>
                 <a:round/>
-                <a:headEnd/>
-                <a:tailEnd/>
               </a:ln>
-              <a:effectLst/>
             </p:spPr>
             <p:txBody>
               <a:bodyPr/>
@@ -12539,14 +12154,12 @@
                   </a:gs>
                 </a:gsLst>
                 <a:lin ang="2700000" scaled="1"/>
+                <a:tileRect/>
               </a:gradFill>
               <a:ln w="9525">
                 <a:noFill/>
                 <a:round/>
-                <a:headEnd/>
-                <a:tailEnd/>
               </a:ln>
-              <a:effectLst/>
             </p:spPr>
             <p:txBody>
               <a:bodyPr/>
@@ -12586,14 +12199,12 @@
                   </a:gs>
                 </a:gsLst>
                 <a:lin ang="0" scaled="1"/>
+                <a:tileRect/>
               </a:gradFill>
               <a:ln w="9525">
                 <a:noFill/>
                 <a:round/>
-                <a:headEnd/>
-                <a:tailEnd/>
               </a:ln>
-              <a:effectLst/>
             </p:spPr>
             <p:txBody>
               <a:bodyPr/>
@@ -12606,9 +12217,7 @@
           <p:sp>
             <p:nvSpPr>
               <p:cNvPr id="15386" name="Freeform 26"/>
-              <p:cNvSpPr>
-                <a:spLocks/>
-              </p:cNvSpPr>
+              <p:cNvSpPr/>
               <p:nvPr/>
             </p:nvSpPr>
             <p:spPr bwMode="hidden">
@@ -12617,9 +12226,6 @@
                 <a:ext cx="449" cy="186"/>
               </a:xfrm>
               <a:custGeom>
-                <a:avLst/>
-                <a:gdLst/>
-                <a:ahLst/>
                 <a:cxnLst>
                   <a:cxn ang="0">
                     <a:pos x="6" y="6"/>
@@ -12781,12 +12387,11 @@
                   </a:gs>
                 </a:gsLst>
                 <a:lin ang="5400000" scaled="1"/>
+                <a:tileRect/>
               </a:gradFill>
               <a:ln w="9525">
                 <a:noFill/>
                 <a:round/>
-                <a:headEnd/>
-                <a:tailEnd/>
               </a:ln>
             </p:spPr>
             <p:txBody>
@@ -12800,9 +12405,7 @@
           <p:sp>
             <p:nvSpPr>
               <p:cNvPr id="15387" name="Freeform 27"/>
-              <p:cNvSpPr>
-                <a:spLocks/>
-              </p:cNvSpPr>
+              <p:cNvSpPr/>
               <p:nvPr/>
             </p:nvSpPr>
             <p:spPr bwMode="hidden">
@@ -12811,9 +12414,6 @@
                 <a:ext cx="892" cy="462"/>
               </a:xfrm>
               <a:custGeom>
-                <a:avLst/>
-                <a:gdLst/>
-                <a:ahLst/>
                 <a:cxnLst>
                   <a:cxn ang="0">
                     <a:pos x="23" y="276"/>
@@ -13149,12 +12749,11 @@
                   </a:gs>
                 </a:gsLst>
                 <a:lin ang="2700000" scaled="1"/>
+                <a:tileRect/>
               </a:gradFill>
               <a:ln w="9525">
                 <a:noFill/>
                 <a:round/>
-                <a:headEnd/>
-                <a:tailEnd/>
               </a:ln>
             </p:spPr>
             <p:txBody>
@@ -13168,9 +12767,7 @@
           <p:sp>
             <p:nvSpPr>
               <p:cNvPr id="15388" name="Freeform 28"/>
-              <p:cNvSpPr>
-                <a:spLocks/>
-              </p:cNvSpPr>
+              <p:cNvSpPr/>
               <p:nvPr/>
             </p:nvSpPr>
             <p:spPr bwMode="hidden">
@@ -13179,9 +12776,6 @@
                 <a:ext cx="407" cy="486"/>
               </a:xfrm>
               <a:custGeom>
-                <a:avLst/>
-                <a:gdLst/>
-                <a:ahLst/>
                 <a:cxnLst>
                   <a:cxn ang="0">
                     <a:pos x="18" y="300"/>
@@ -13373,12 +12967,11 @@
                   </a:gs>
                 </a:gsLst>
                 <a:lin ang="0" scaled="1"/>
+                <a:tileRect/>
               </a:gradFill>
               <a:ln w="9525">
                 <a:noFill/>
                 <a:round/>
-                <a:headEnd/>
-                <a:tailEnd/>
               </a:ln>
             </p:spPr>
             <p:txBody>
@@ -13392,9 +12985,7 @@
           <p:sp>
             <p:nvSpPr>
               <p:cNvPr id="15389" name="Freeform 29"/>
-              <p:cNvSpPr>
-                <a:spLocks/>
-              </p:cNvSpPr>
+              <p:cNvSpPr/>
               <p:nvPr/>
             </p:nvSpPr>
             <p:spPr bwMode="hidden">
@@ -13403,9 +12994,6 @@
                 <a:ext cx="108" cy="252"/>
               </a:xfrm>
               <a:custGeom>
-                <a:avLst/>
-                <a:gdLst/>
-                <a:ahLst/>
                 <a:cxnLst>
                   <a:cxn ang="0">
                     <a:pos x="89" y="84"/>
@@ -13458,7 +13046,7 @@
                 </a:cxnLst>
                 <a:rect l="0" t="0" r="r" b="b"/>
                 <a:pathLst>
-                  <a:path w="107" h="252">
+                  <a:path w="107" h="251">
                     <a:moveTo>
                       <a:pt x="89" y="84"/>
                     </a:moveTo>
@@ -13525,12 +13113,11 @@
                   </a:gs>
                 </a:gsLst>
                 <a:lin ang="5400000" scaled="1"/>
+                <a:tileRect/>
               </a:gradFill>
               <a:ln w="9525">
                 <a:noFill/>
                 <a:round/>
-                <a:headEnd/>
-                <a:tailEnd/>
               </a:ln>
             </p:spPr>
             <p:txBody>
@@ -13544,9 +13131,7 @@
           <p:sp>
             <p:nvSpPr>
               <p:cNvPr id="15390" name="Freeform 30"/>
-              <p:cNvSpPr>
-                <a:spLocks/>
-              </p:cNvSpPr>
+              <p:cNvSpPr/>
               <p:nvPr/>
             </p:nvSpPr>
             <p:spPr bwMode="hidden">
@@ -13555,9 +13140,6 @@
                 <a:ext cx="835" cy="150"/>
               </a:xfrm>
               <a:custGeom>
-                <a:avLst/>
-                <a:gdLst/>
-                <a:ahLst/>
                 <a:cxnLst>
                   <a:cxn ang="0">
                     <a:pos x="518" y="18"/>
@@ -13693,8 +13275,6 @@
               <a:ln w="9525">
                 <a:noFill/>
                 <a:round/>
-                <a:headEnd/>
-                <a:tailEnd/>
               </a:ln>
             </p:spPr>
             <p:txBody>
@@ -13708,9 +13288,7 @@
           <p:sp>
             <p:nvSpPr>
               <p:cNvPr id="15391" name="Freeform 31"/>
-              <p:cNvSpPr>
-                <a:spLocks/>
-              </p:cNvSpPr>
+              <p:cNvSpPr/>
               <p:nvPr/>
             </p:nvSpPr>
             <p:spPr bwMode="hidden">
@@ -13719,9 +13297,6 @@
                 <a:ext cx="171" cy="461"/>
               </a:xfrm>
               <a:custGeom>
-                <a:avLst/>
-                <a:gdLst/>
-                <a:ahLst/>
                 <a:cxnLst>
                   <a:cxn ang="0">
                     <a:pos x="31" y="263"/>
@@ -13857,8 +13432,6 @@
               <a:ln w="9525">
                 <a:noFill/>
                 <a:round/>
-                <a:headEnd/>
-                <a:tailEnd/>
               </a:ln>
             </p:spPr>
             <p:txBody>
@@ -13872,9 +13445,7 @@
           <p:sp>
             <p:nvSpPr>
               <p:cNvPr id="15392" name="Freeform 32"/>
-              <p:cNvSpPr>
-                <a:spLocks/>
-              </p:cNvSpPr>
+              <p:cNvSpPr/>
               <p:nvPr/>
             </p:nvSpPr>
             <p:spPr bwMode="hidden">
@@ -13883,9 +13454,6 @@
                 <a:ext cx="360" cy="563"/>
               </a:xfrm>
               <a:custGeom>
-                <a:avLst/>
-                <a:gdLst/>
-                <a:ahLst/>
                 <a:cxnLst>
                   <a:cxn ang="0">
                     <a:pos x="360" y="365"/>
@@ -14077,12 +13645,11 @@
                   </a:gs>
                 </a:gsLst>
                 <a:lin ang="5400000" scaled="1"/>
+                <a:tileRect/>
               </a:gradFill>
               <a:ln w="9525">
                 <a:noFill/>
                 <a:round/>
-                <a:headEnd/>
-                <a:tailEnd/>
               </a:ln>
             </p:spPr>
             <p:txBody>
@@ -14096,9 +13663,7 @@
           <p:sp>
             <p:nvSpPr>
               <p:cNvPr id="15393" name="Freeform 33"/>
-              <p:cNvSpPr>
-                <a:spLocks/>
-              </p:cNvSpPr>
+              <p:cNvSpPr/>
               <p:nvPr/>
             </p:nvSpPr>
             <p:spPr bwMode="hidden">
@@ -14107,9 +13672,6 @@
                 <a:ext cx="1078" cy="425"/>
               </a:xfrm>
               <a:custGeom>
-                <a:avLst/>
-                <a:gdLst/>
-                <a:ahLst/>
                 <a:cxnLst>
                   <a:cxn ang="0">
                     <a:pos x="1053" y="425"/>
@@ -14295,12 +13857,11 @@
                   </a:gs>
                 </a:gsLst>
                 <a:lin ang="5400000" scaled="1"/>
+                <a:tileRect/>
               </a:gradFill>
               <a:ln w="9525">
                 <a:noFill/>
                 <a:round/>
-                <a:headEnd/>
-                <a:tailEnd/>
               </a:ln>
             </p:spPr>
             <p:txBody>
@@ -14314,9 +13875,7 @@
           <p:sp>
             <p:nvSpPr>
               <p:cNvPr id="15394" name="Freeform 34"/>
-              <p:cNvSpPr>
-                <a:spLocks/>
-              </p:cNvSpPr>
+              <p:cNvSpPr/>
               <p:nvPr/>
             </p:nvSpPr>
             <p:spPr bwMode="hidden">
@@ -14325,9 +13884,6 @@
                 <a:ext cx="98" cy="234"/>
               </a:xfrm>
               <a:custGeom>
-                <a:avLst/>
-                <a:gdLst/>
-                <a:ahLst/>
                 <a:cxnLst>
                   <a:cxn ang="0">
                     <a:pos x="0" y="234"/>
@@ -14435,12 +13991,11 @@
                   </a:gs>
                 </a:gsLst>
                 <a:lin ang="5400000" scaled="1"/>
+                <a:tileRect/>
               </a:gradFill>
               <a:ln w="9525">
                 <a:noFill/>
                 <a:round/>
-                <a:headEnd/>
-                <a:tailEnd/>
               </a:ln>
             </p:spPr>
             <p:txBody>
@@ -14454,9 +14009,7 @@
           <p:sp>
             <p:nvSpPr>
               <p:cNvPr id="15395" name="Freeform 35"/>
-              <p:cNvSpPr>
-                <a:spLocks/>
-              </p:cNvSpPr>
+              <p:cNvSpPr/>
               <p:nvPr/>
             </p:nvSpPr>
             <p:spPr bwMode="hidden">
@@ -14465,9 +14018,6 @@
                 <a:ext cx="481" cy="641"/>
               </a:xfrm>
               <a:custGeom>
-                <a:avLst/>
-                <a:gdLst/>
-                <a:ahLst/>
                 <a:cxnLst>
                   <a:cxn ang="0">
                     <a:pos x="18" y="443"/>
@@ -14651,8 +14201,6 @@
               <a:ln w="9525">
                 <a:noFill/>
                 <a:round/>
-                <a:headEnd/>
-                <a:tailEnd/>
               </a:ln>
             </p:spPr>
             <p:txBody>
@@ -14667,12 +14215,10 @@
         <p:grpSp>
           <p:nvGrpSpPr>
             <p:cNvPr id="15396" name="Group 36"/>
-            <p:cNvGrpSpPr>
-              <a:grpSpLocks/>
-            </p:cNvGrpSpPr>
+            <p:cNvGrpSpPr/>
             <p:nvPr userDrawn="1"/>
           </p:nvGrpSpPr>
-          <p:grpSpPr bwMode="auto">
+          <p:grpSpPr>
             <a:xfrm>
               <a:off x="4128" y="3360"/>
               <a:ext cx="1351" cy="821"/>
@@ -14694,9 +14240,6 @@
                 <a:ext cx="1201" cy="731"/>
               </a:xfrm>
               <a:custGeom>
-                <a:avLst/>
-                <a:gdLst/>
-                <a:ahLst/>
                 <a:cxnLst>
                   <a:cxn ang="0">
                     <a:pos x="484" y="6"/>
@@ -15054,12 +14597,11 @@
                   </a:gs>
                 </a:gsLst>
                 <a:lin ang="5400000" scaled="1"/>
+                <a:tileRect/>
               </a:gradFill>
               <a:ln w="9525">
                 <a:noFill/>
                 <a:round/>
-                <a:headEnd/>
-                <a:tailEnd/>
               </a:ln>
             </p:spPr>
             <p:txBody>
@@ -15073,9 +14615,7 @@
           <p:sp>
             <p:nvSpPr>
               <p:cNvPr id="15398" name="Freeform 38"/>
-              <p:cNvSpPr>
-                <a:spLocks/>
-              </p:cNvSpPr>
+              <p:cNvSpPr/>
               <p:nvPr/>
             </p:nvSpPr>
             <p:spPr bwMode="hidden">
@@ -15084,9 +14624,6 @@
                 <a:ext cx="544" cy="737"/>
               </a:xfrm>
               <a:custGeom>
-                <a:avLst/>
-                <a:gdLst/>
-                <a:ahLst/>
                 <a:cxnLst>
                   <a:cxn ang="0">
                     <a:pos x="24" y="402"/>
@@ -15326,12 +14863,11 @@
                   </a:gs>
                 </a:gsLst>
                 <a:lin ang="5400000" scaled="1"/>
+                <a:tileRect/>
               </a:gradFill>
               <a:ln w="9525">
                 <a:noFill/>
                 <a:round/>
-                <a:headEnd/>
-                <a:tailEnd/>
               </a:ln>
             </p:spPr>
             <p:txBody>
@@ -15345,9 +14881,7 @@
           <p:sp>
             <p:nvSpPr>
               <p:cNvPr id="15399" name="Freeform 39"/>
-              <p:cNvSpPr>
-                <a:spLocks/>
-              </p:cNvSpPr>
+              <p:cNvSpPr/>
               <p:nvPr/>
             </p:nvSpPr>
             <p:spPr bwMode="hidden">
@@ -15356,9 +14890,6 @@
                 <a:ext cx="609" cy="252"/>
               </a:xfrm>
               <a:custGeom>
-                <a:avLst/>
-                <a:gdLst/>
-                <a:ahLst/>
                 <a:cxnLst>
                   <a:cxn ang="0">
                     <a:pos x="12" y="12"/>
@@ -15435,7 +14966,7 @@
                 </a:cxnLst>
                 <a:rect l="0" t="0" r="r" b="b"/>
                 <a:pathLst>
-                  <a:path w="609" h="252">
+                  <a:path w="609" h="251">
                     <a:moveTo>
                       <a:pt x="12" y="12"/>
                     </a:moveTo>
@@ -15526,12 +15057,11 @@
                   </a:gs>
                 </a:gsLst>
                 <a:lin ang="5400000" scaled="1"/>
+                <a:tileRect/>
               </a:gradFill>
               <a:ln w="9525">
                 <a:noFill/>
                 <a:round/>
-                <a:headEnd/>
-                <a:tailEnd/>
               </a:ln>
             </p:spPr>
             <p:txBody>
@@ -15545,9 +15075,7 @@
           <p:sp>
             <p:nvSpPr>
               <p:cNvPr id="15400" name="Freeform 40"/>
-              <p:cNvSpPr>
-                <a:spLocks/>
-              </p:cNvSpPr>
+              <p:cNvSpPr/>
               <p:nvPr/>
             </p:nvSpPr>
             <p:spPr bwMode="hidden">
@@ -15556,9 +15084,6 @@
                 <a:ext cx="72" cy="54"/>
               </a:xfrm>
               <a:custGeom>
-                <a:avLst/>
-                <a:gdLst/>
-                <a:ahLst/>
                 <a:cxnLst>
                   <a:cxn ang="0">
                     <a:pos x="72" y="0"/>
@@ -15636,12 +15161,11 @@
                   </a:gs>
                 </a:gsLst>
                 <a:lin ang="5400000" scaled="1"/>
+                <a:tileRect/>
               </a:gradFill>
               <a:ln w="9525">
                 <a:noFill/>
                 <a:round/>
-                <a:headEnd/>
-                <a:tailEnd/>
               </a:ln>
             </p:spPr>
             <p:txBody>
@@ -15655,9 +15179,7 @@
           <p:sp>
             <p:nvSpPr>
               <p:cNvPr id="15401" name="Freeform 41"/>
-              <p:cNvSpPr>
-                <a:spLocks/>
-              </p:cNvSpPr>
+              <p:cNvSpPr/>
               <p:nvPr/>
             </p:nvSpPr>
             <p:spPr bwMode="hidden">
@@ -15666,9 +15188,6 @@
                 <a:ext cx="705" cy="108"/>
               </a:xfrm>
               <a:custGeom>
-                <a:avLst/>
-                <a:gdLst/>
-                <a:ahLst/>
                 <a:cxnLst>
                   <a:cxn ang="0">
                     <a:pos x="299" y="90"/>
@@ -15800,12 +15319,11 @@
                   </a:gs>
                 </a:gsLst>
                 <a:lin ang="5400000" scaled="1"/>
+                <a:tileRect/>
               </a:gradFill>
               <a:ln w="9525">
                 <a:noFill/>
                 <a:round/>
-                <a:headEnd/>
-                <a:tailEnd/>
               </a:ln>
             </p:spPr>
             <p:txBody>
@@ -15819,9 +15337,7 @@
           <p:sp>
             <p:nvSpPr>
               <p:cNvPr id="15402" name="Freeform 42"/>
-              <p:cNvSpPr>
-                <a:spLocks/>
-              </p:cNvSpPr>
+              <p:cNvSpPr/>
               <p:nvPr/>
             </p:nvSpPr>
             <p:spPr bwMode="hidden">
@@ -15830,9 +15346,6 @@
                 <a:ext cx="143" cy="341"/>
               </a:xfrm>
               <a:custGeom>
-                <a:avLst/>
-                <a:gdLst/>
-                <a:ahLst/>
                 <a:cxnLst>
                   <a:cxn ang="0">
                     <a:pos x="119" y="114"/>
@@ -15952,12 +15465,11 @@
                   </a:gs>
                 </a:gsLst>
                 <a:lin ang="5400000" scaled="1"/>
+                <a:tileRect/>
               </a:gradFill>
               <a:ln w="9525">
                 <a:noFill/>
                 <a:round/>
-                <a:headEnd/>
-                <a:tailEnd/>
               </a:ln>
             </p:spPr>
             <p:txBody>
@@ -15971,9 +15483,7 @@
           <p:sp>
             <p:nvSpPr>
               <p:cNvPr id="15403" name="Freeform 43"/>
-              <p:cNvSpPr>
-                <a:spLocks/>
-              </p:cNvSpPr>
+              <p:cNvSpPr/>
               <p:nvPr/>
             </p:nvSpPr>
             <p:spPr bwMode="hidden">
@@ -15982,9 +15492,6 @@
                 <a:ext cx="83" cy="90"/>
               </a:xfrm>
               <a:custGeom>
-                <a:avLst/>
-                <a:gdLst/>
-                <a:ahLst/>
                 <a:cxnLst>
                   <a:cxn ang="0">
                     <a:pos x="59" y="90"/>
@@ -16062,12 +15569,11 @@
                   </a:gs>
                 </a:gsLst>
                 <a:lin ang="5400000" scaled="1"/>
+                <a:tileRect/>
               </a:gradFill>
               <a:ln w="9525">
                 <a:noFill/>
                 <a:round/>
-                <a:headEnd/>
-                <a:tailEnd/>
               </a:ln>
             </p:spPr>
             <p:txBody>
@@ -16081,9 +15587,7 @@
           <p:sp>
             <p:nvSpPr>
               <p:cNvPr id="15404" name="Freeform 44"/>
-              <p:cNvSpPr>
-                <a:spLocks/>
-              </p:cNvSpPr>
+              <p:cNvSpPr/>
               <p:nvPr/>
             </p:nvSpPr>
             <p:spPr bwMode="hidden">
@@ -16092,9 +15596,6 @@
                 <a:ext cx="717" cy="431"/>
               </a:xfrm>
               <a:custGeom>
-                <a:avLst/>
-                <a:gdLst/>
-                <a:ahLst/>
                 <a:cxnLst>
                   <a:cxn ang="0">
                     <a:pos x="693" y="216"/>
@@ -16488,8 +15989,6 @@
               <a:ln w="9525">
                 <a:noFill/>
                 <a:round/>
-                <a:headEnd/>
-                <a:tailEnd/>
               </a:ln>
             </p:spPr>
             <p:txBody>
@@ -16503,9 +16002,7 @@
           <p:sp>
             <p:nvSpPr>
               <p:cNvPr id="15405" name="Freeform 45"/>
-              <p:cNvSpPr>
-                <a:spLocks/>
-              </p:cNvSpPr>
+              <p:cNvSpPr/>
               <p:nvPr/>
             </p:nvSpPr>
             <p:spPr bwMode="hidden">
@@ -16514,9 +16011,6 @@
                 <a:ext cx="909" cy="533"/>
               </a:xfrm>
               <a:custGeom>
-                <a:avLst/>
-                <a:gdLst/>
-                <a:ahLst/>
                 <a:cxnLst>
                   <a:cxn ang="0">
                     <a:pos x="616" y="0"/>
@@ -16888,12 +16382,11 @@
                   </a:gs>
                 </a:gsLst>
                 <a:lin ang="0" scaled="1"/>
+                <a:tileRect/>
               </a:gradFill>
               <a:ln w="9525">
                 <a:noFill/>
                 <a:round/>
-                <a:headEnd/>
-                <a:tailEnd/>
               </a:ln>
             </p:spPr>
             <p:txBody>
@@ -16907,9 +16400,7 @@
           <p:sp>
             <p:nvSpPr>
               <p:cNvPr id="15406" name="Freeform 46"/>
-              <p:cNvSpPr>
-                <a:spLocks/>
-              </p:cNvSpPr>
+              <p:cNvSpPr/>
               <p:nvPr/>
             </p:nvSpPr>
             <p:spPr bwMode="hidden">
@@ -16918,9 +16409,6 @@
                 <a:ext cx="365" cy="66"/>
               </a:xfrm>
               <a:custGeom>
-                <a:avLst/>
-                <a:gdLst/>
-                <a:ahLst/>
                 <a:cxnLst>
                   <a:cxn ang="0">
                     <a:pos x="240" y="18"/>
@@ -17034,12 +16522,11 @@
                   </a:gs>
                 </a:gsLst>
                 <a:lin ang="5400000" scaled="1"/>
+                <a:tileRect/>
               </a:gradFill>
               <a:ln w="9525">
                 <a:noFill/>
                 <a:round/>
-                <a:headEnd/>
-                <a:tailEnd/>
               </a:ln>
             </p:spPr>
             <p:txBody>
@@ -17053,9 +16540,7 @@
           <p:sp>
             <p:nvSpPr>
               <p:cNvPr id="15407" name="Freeform 47"/>
-              <p:cNvSpPr>
-                <a:spLocks/>
-              </p:cNvSpPr>
+              <p:cNvSpPr/>
               <p:nvPr/>
             </p:nvSpPr>
             <p:spPr bwMode="hidden">
@@ -17064,9 +16549,6 @@
                 <a:ext cx="66" cy="48"/>
               </a:xfrm>
               <a:custGeom>
-                <a:avLst/>
-                <a:gdLst/>
-                <a:ahLst/>
                 <a:cxnLst>
                   <a:cxn ang="0">
                     <a:pos x="66" y="18"/>
@@ -17138,12 +16620,11 @@
                   </a:gs>
                 </a:gsLst>
                 <a:lin ang="5400000" scaled="1"/>
+                <a:tileRect/>
               </a:gradFill>
               <a:ln w="9525">
                 <a:noFill/>
                 <a:round/>
-                <a:headEnd/>
-                <a:tailEnd/>
               </a:ln>
             </p:spPr>
             <p:txBody>
@@ -17184,14 +16665,12 @@
                   </a:gs>
                 </a:gsLst>
                 <a:lin ang="0" scaled="1"/>
+                <a:tileRect/>
               </a:gradFill>
               <a:ln w="9525">
                 <a:noFill/>
                 <a:round/>
-                <a:headEnd/>
-                <a:tailEnd/>
               </a:ln>
-              <a:effectLst/>
             </p:spPr>
             <p:txBody>
               <a:bodyPr/>
@@ -17231,14 +16710,12 @@
                   </a:gs>
                 </a:gsLst>
                 <a:lin ang="5400000" scaled="1"/>
+                <a:tileRect/>
               </a:gradFill>
               <a:ln w="9525">
                 <a:noFill/>
                 <a:round/>
-                <a:headEnd/>
-                <a:tailEnd/>
               </a:ln>
-              <a:effectLst/>
             </p:spPr>
             <p:txBody>
               <a:bodyPr/>
@@ -17278,14 +16755,12 @@
                   </a:gs>
                 </a:gsLst>
                 <a:lin ang="5400000" scaled="1"/>
+                <a:tileRect/>
               </a:gradFill>
               <a:ln w="9525">
                 <a:noFill/>
                 <a:round/>
-                <a:headEnd/>
-                <a:tailEnd/>
               </a:ln>
-              <a:effectLst/>
             </p:spPr>
             <p:txBody>
               <a:bodyPr/>
@@ -17325,14 +16800,12 @@
                   </a:gs>
                 </a:gsLst>
                 <a:lin ang="5400000" scaled="1"/>
+                <a:tileRect/>
               </a:gradFill>
               <a:ln w="9525">
                 <a:noFill/>
                 <a:round/>
-                <a:headEnd/>
-                <a:tailEnd/>
               </a:ln>
-              <a:effectLst/>
             </p:spPr>
             <p:txBody>
               <a:bodyPr/>
@@ -17372,14 +16845,12 @@
                   </a:gs>
                 </a:gsLst>
                 <a:lin ang="5400000" scaled="1"/>
+                <a:tileRect/>
               </a:gradFill>
               <a:ln w="9525">
                 <a:noFill/>
                 <a:round/>
-                <a:headEnd/>
-                <a:tailEnd/>
               </a:ln>
-              <a:effectLst/>
             </p:spPr>
             <p:txBody>
               <a:bodyPr/>
@@ -17419,14 +16890,12 @@
                   </a:gs>
                 </a:gsLst>
                 <a:lin ang="5400000" scaled="1"/>
+                <a:tileRect/>
               </a:gradFill>
               <a:ln w="9525">
                 <a:noFill/>
                 <a:round/>
-                <a:headEnd/>
-                <a:tailEnd/>
               </a:ln>
-              <a:effectLst/>
             </p:spPr>
             <p:txBody>
               <a:bodyPr/>
@@ -17440,12 +16909,10 @@
         <p:grpSp>
           <p:nvGrpSpPr>
             <p:cNvPr id="15414" name="Group 54"/>
-            <p:cNvGrpSpPr>
-              <a:grpSpLocks/>
-            </p:cNvGrpSpPr>
+            <p:cNvGrpSpPr/>
             <p:nvPr userDrawn="1"/>
           </p:nvGrpSpPr>
-          <p:grpSpPr bwMode="auto">
+          <p:grpSpPr>
             <a:xfrm>
               <a:off x="5280" y="3024"/>
               <a:ext cx="425" cy="258"/>
@@ -17456,9 +16923,7 @@
           <p:sp>
             <p:nvSpPr>
               <p:cNvPr id="15415" name="Freeform 55"/>
-              <p:cNvSpPr>
-                <a:spLocks/>
-              </p:cNvSpPr>
+              <p:cNvSpPr/>
               <p:nvPr/>
             </p:nvSpPr>
             <p:spPr bwMode="hidden">
@@ -17467,9 +16932,6 @@
                 <a:ext cx="383" cy="96"/>
               </a:xfrm>
               <a:custGeom>
-                <a:avLst/>
-                <a:gdLst/>
-                <a:ahLst/>
                 <a:cxnLst>
                   <a:cxn ang="0">
                     <a:pos x="209" y="96"/>
@@ -17609,12 +17071,11 @@
                   </a:gs>
                 </a:gsLst>
                 <a:lin ang="5400000" scaled="1"/>
+                <a:tileRect/>
               </a:gradFill>
               <a:ln w="9525">
                 <a:noFill/>
                 <a:round/>
-                <a:headEnd/>
-                <a:tailEnd/>
               </a:ln>
             </p:spPr>
             <p:txBody>
@@ -17628,9 +17089,7 @@
           <p:sp>
             <p:nvSpPr>
               <p:cNvPr id="15416" name="Freeform 56"/>
-              <p:cNvSpPr>
-                <a:spLocks/>
-              </p:cNvSpPr>
+              <p:cNvSpPr/>
               <p:nvPr/>
             </p:nvSpPr>
             <p:spPr bwMode="hidden">
@@ -17639,9 +17098,6 @@
                 <a:ext cx="258" cy="54"/>
               </a:xfrm>
               <a:custGeom>
-                <a:avLst/>
-                <a:gdLst/>
-                <a:ahLst/>
                 <a:cxnLst>
                   <a:cxn ang="0">
                     <a:pos x="174" y="0"/>
@@ -17757,12 +17213,11 @@
                   </a:gs>
                 </a:gsLst>
                 <a:lin ang="5400000" scaled="1"/>
+                <a:tileRect/>
               </a:gradFill>
               <a:ln w="9525">
                 <a:noFill/>
                 <a:round/>
-                <a:headEnd/>
-                <a:tailEnd/>
               </a:ln>
             </p:spPr>
             <p:txBody>
@@ -17776,9 +17231,7 @@
           <p:sp>
             <p:nvSpPr>
               <p:cNvPr id="15417" name="Freeform 57"/>
-              <p:cNvSpPr>
-                <a:spLocks/>
-              </p:cNvSpPr>
+              <p:cNvSpPr/>
               <p:nvPr/>
             </p:nvSpPr>
             <p:spPr bwMode="hidden">
@@ -17787,9 +17240,6 @@
                 <a:ext cx="60" cy="156"/>
               </a:xfrm>
               <a:custGeom>
-                <a:avLst/>
-                <a:gdLst/>
-                <a:ahLst/>
                 <a:cxnLst>
                   <a:cxn ang="0">
                     <a:pos x="54" y="90"/>
@@ -17905,12 +17355,11 @@
                   </a:gs>
                 </a:gsLst>
                 <a:lin ang="5400000" scaled="1"/>
+                <a:tileRect/>
               </a:gradFill>
               <a:ln w="9525">
                 <a:noFill/>
                 <a:round/>
-                <a:headEnd/>
-                <a:tailEnd/>
               </a:ln>
             </p:spPr>
             <p:txBody>
@@ -17924,9 +17373,7 @@
           <p:sp>
             <p:nvSpPr>
               <p:cNvPr id="15418" name="Freeform 58"/>
-              <p:cNvSpPr>
-                <a:spLocks/>
-              </p:cNvSpPr>
+              <p:cNvSpPr/>
               <p:nvPr/>
             </p:nvSpPr>
             <p:spPr bwMode="hidden">
@@ -17935,9 +17382,6 @@
                 <a:ext cx="192" cy="18"/>
               </a:xfrm>
               <a:custGeom>
-                <a:avLst/>
-                <a:gdLst/>
-                <a:ahLst/>
                 <a:cxnLst>
                   <a:cxn ang="0">
                     <a:pos x="114" y="12"/>
@@ -18029,12 +17473,11 @@
                   </a:gs>
                 </a:gsLst>
                 <a:lin ang="5400000" scaled="1"/>
+                <a:tileRect/>
               </a:gradFill>
               <a:ln w="9525">
                 <a:noFill/>
                 <a:round/>
-                <a:headEnd/>
-                <a:tailEnd/>
               </a:ln>
             </p:spPr>
             <p:txBody>
@@ -18048,9 +17491,7 @@
           <p:sp>
             <p:nvSpPr>
               <p:cNvPr id="15419" name="Freeform 59"/>
-              <p:cNvSpPr>
-                <a:spLocks/>
-              </p:cNvSpPr>
+              <p:cNvSpPr/>
               <p:nvPr/>
             </p:nvSpPr>
             <p:spPr bwMode="hidden">
@@ -18059,9 +17500,6 @@
                 <a:ext cx="161" cy="186"/>
               </a:xfrm>
               <a:custGeom>
-                <a:avLst/>
-                <a:gdLst/>
-                <a:ahLst/>
                 <a:cxnLst>
                   <a:cxn ang="0">
                     <a:pos x="11" y="114"/>
@@ -18207,12 +17645,11 @@
                   </a:gs>
                 </a:gsLst>
                 <a:lin ang="5400000" scaled="1"/>
+                <a:tileRect/>
               </a:gradFill>
               <a:ln w="9525">
                 <a:noFill/>
                 <a:round/>
-                <a:headEnd/>
-                <a:tailEnd/>
               </a:ln>
             </p:spPr>
             <p:txBody>
@@ -18226,9 +17663,7 @@
           <p:sp>
             <p:nvSpPr>
               <p:cNvPr id="15420" name="Freeform 60"/>
-              <p:cNvSpPr>
-                <a:spLocks/>
-              </p:cNvSpPr>
+              <p:cNvSpPr/>
               <p:nvPr/>
             </p:nvSpPr>
             <p:spPr bwMode="hidden">
@@ -18237,9 +17672,6 @@
                 <a:ext cx="186" cy="210"/>
               </a:xfrm>
               <a:custGeom>
-                <a:avLst/>
-                <a:gdLst/>
-                <a:ahLst/>
                 <a:cxnLst>
                   <a:cxn ang="0">
                     <a:pos x="0" y="6"/>
@@ -18403,12 +17835,11 @@
                   </a:gs>
                 </a:gsLst>
                 <a:lin ang="5400000" scaled="1"/>
+                <a:tileRect/>
               </a:gradFill>
               <a:ln w="9525">
                 <a:noFill/>
                 <a:round/>
-                <a:headEnd/>
-                <a:tailEnd/>
               </a:ln>
             </p:spPr>
             <p:txBody>
@@ -18433,9 +17864,6 @@
                 <a:ext cx="299" cy="186"/>
               </a:xfrm>
               <a:custGeom>
-                <a:avLst/>
-                <a:gdLst/>
-                <a:ahLst/>
                 <a:cxnLst>
                   <a:cxn ang="0">
                     <a:pos x="150" y="0"/>
@@ -18720,12 +18148,11 @@
                   </a:gs>
                 </a:gsLst>
                 <a:lin ang="5400000" scaled="1"/>
+                <a:tileRect/>
               </a:gradFill>
               <a:ln w="9525">
                 <a:noFill/>
                 <a:round/>
-                <a:headEnd/>
-                <a:tailEnd/>
               </a:ln>
             </p:spPr>
             <p:txBody>
@@ -18739,12 +18166,10 @@
           <p:grpSp>
             <p:nvGrpSpPr>
               <p:cNvPr id="15422" name="Group 62"/>
-              <p:cNvGrpSpPr>
-                <a:grpSpLocks/>
-              </p:cNvGrpSpPr>
+              <p:cNvGrpSpPr/>
               <p:nvPr/>
             </p:nvGrpSpPr>
-            <p:grpSpPr bwMode="auto">
+            <p:grpSpPr>
               <a:xfrm>
                 <a:off x="5381" y="3085"/>
                 <a:ext cx="227" cy="132"/>
@@ -18778,14 +18203,12 @@
                     </a:gs>
                   </a:gsLst>
                   <a:lin ang="5400000" scaled="1"/>
+                  <a:tileRect/>
                 </a:gradFill>
                 <a:ln w="9525">
                   <a:noFill/>
                   <a:round/>
-                  <a:headEnd/>
-                  <a:tailEnd/>
                 </a:ln>
-                <a:effectLst/>
               </p:spPr>
               <p:txBody>
                 <a:bodyPr/>
@@ -18821,14 +18244,12 @@
                     </a:gs>
                   </a:gsLst>
                   <a:lin ang="5400000" scaled="1"/>
+                  <a:tileRect/>
                 </a:gradFill>
                 <a:ln w="9525">
                   <a:noFill/>
                   <a:round/>
-                  <a:headEnd/>
-                  <a:tailEnd/>
                 </a:ln>
-                <a:effectLst/>
               </p:spPr>
               <p:txBody>
                 <a:bodyPr/>
@@ -18864,14 +18285,12 @@
                     </a:gs>
                   </a:gsLst>
                   <a:lin ang="5400000" scaled="1"/>
+                  <a:tileRect/>
                 </a:gradFill>
                 <a:ln w="9525">
                   <a:noFill/>
                   <a:round/>
-                  <a:headEnd/>
-                  <a:tailEnd/>
                 </a:ln>
-                <a:effectLst/>
               </p:spPr>
               <p:txBody>
                 <a:bodyPr/>
@@ -18907,14 +18326,12 @@
                     </a:gs>
                   </a:gsLst>
                   <a:lin ang="5400000" scaled="1"/>
+                  <a:tileRect/>
                 </a:gradFill>
                 <a:ln w="9525">
                   <a:noFill/>
                   <a:round/>
-                  <a:headEnd/>
-                  <a:tailEnd/>
                 </a:ln>
-                <a:effectLst/>
               </p:spPr>
               <p:txBody>
                 <a:bodyPr/>
@@ -18949,13 +18366,10 @@
           <a:ln w="9525">
             <a:noFill/>
             <a:miter lim="800000"/>
-            <a:headEnd/>
-            <a:tailEnd/>
           </a:ln>
-          <a:effectLst/>
         </p:spPr>
         <p:txBody>
-          <a:bodyPr vert="horz" wrap="square" lIns="91440" tIns="45720" rIns="91440" bIns="45720" numCol="1" anchor="ctr" anchorCtr="1" compatLnSpc="1">
+          <a:bodyPr vert="horz" wrap="square" lIns="91440" tIns="45720" rIns="91440" bIns="45720" anchor="ctr" anchorCtr="1" compatLnSpc="1">
             <a:prstTxWarp prst="textNoShape">
               <a:avLst/>
             </a:prstTxWarp>
@@ -18992,13 +18406,10 @@
           <a:ln w="9525">
             <a:noFill/>
             <a:miter lim="800000"/>
-            <a:headEnd/>
-            <a:tailEnd/>
           </a:ln>
-          <a:effectLst/>
         </p:spPr>
         <p:txBody>
-          <a:bodyPr vert="horz" wrap="square" lIns="91440" tIns="45720" rIns="91440" bIns="45720" numCol="1" anchor="t" anchorCtr="0" compatLnSpc="1">
+          <a:bodyPr vert="horz" wrap="square" lIns="91440" tIns="45720" rIns="91440" bIns="45720" anchor="t" anchorCtr="0" compatLnSpc="1">
             <a:prstTxWarp prst="textNoShape">
               <a:avLst/>
             </a:prstTxWarp>
@@ -19063,13 +18474,10 @@
           <a:ln w="9525">
             <a:noFill/>
             <a:miter lim="800000"/>
-            <a:headEnd/>
-            <a:tailEnd/>
           </a:ln>
-          <a:effectLst/>
         </p:spPr>
         <p:txBody>
-          <a:bodyPr vert="horz" wrap="square" lIns="91440" tIns="45720" rIns="91440" bIns="45720" numCol="1" anchor="b" anchorCtr="0" compatLnSpc="1">
+          <a:bodyPr vert="horz" wrap="square" lIns="91440" tIns="45720" rIns="91440" bIns="45720" anchor="b" anchorCtr="0" compatLnSpc="1">
             <a:prstTxWarp prst="textNoShape">
               <a:avLst/>
             </a:prstTxWarp>
@@ -19088,10 +18496,8 @@
           <a:p>
             <a:fld id="{75829D23-D5C5-4532-A903-E7A1A930AAC6}" type="datetimeFigureOut">
               <a:rPr lang="en-US"/>
-              <a:pPr/>
               <a:t>7/3/2015</a:t>
             </a:fld>
-            <a:endParaRPr lang="en-US"/>
           </a:p>
         </p:txBody>
       </p:sp>
@@ -19117,13 +18523,10 @@
           <a:ln w="9525">
             <a:noFill/>
             <a:miter lim="800000"/>
-            <a:headEnd/>
-            <a:tailEnd/>
           </a:ln>
-          <a:effectLst/>
         </p:spPr>
         <p:txBody>
-          <a:bodyPr vert="horz" wrap="square" lIns="91440" tIns="45720" rIns="91440" bIns="45720" numCol="1" anchor="b" anchorCtr="0" compatLnSpc="1">
+          <a:bodyPr vert="horz" wrap="square" lIns="91440" tIns="45720" rIns="91440" bIns="45720" anchor="b" anchorCtr="0" compatLnSpc="1">
             <a:prstTxWarp prst="textNoShape">
               <a:avLst/>
             </a:prstTxWarp>
@@ -19166,13 +18569,10 @@
           <a:ln w="9525">
             <a:noFill/>
             <a:miter lim="800000"/>
-            <a:headEnd/>
-            <a:tailEnd/>
           </a:ln>
-          <a:effectLst/>
         </p:spPr>
         <p:txBody>
-          <a:bodyPr vert="horz" wrap="square" lIns="91440" tIns="45720" rIns="91440" bIns="45720" numCol="1" anchor="b" anchorCtr="0" compatLnSpc="1">
+          <a:bodyPr vert="horz" wrap="square" lIns="91440" tIns="45720" rIns="91440" bIns="45720" anchor="b" anchorCtr="0" compatLnSpc="1">
             <a:prstTxWarp prst="textNoShape">
               <a:avLst/>
             </a:prstTxWarp>
@@ -19191,10 +18591,8 @@
           <a:p>
             <a:fld id="{5B5D8AA1-506C-44E5-AA0C-EE41E52E30D3}" type="slidenum">
               <a:rPr lang="en-US"/>
-              <a:pPr/>
               <a:t>‹#›</a:t>
             </a:fld>
-            <a:endParaRPr lang="en-US"/>
           </a:p>
         </p:txBody>
       </p:sp>
@@ -19214,13 +18612,8 @@
     <p:sldLayoutId id="2147483659" r:id="rId10"/>
     <p:sldLayoutId id="2147483660" r:id="rId11"/>
   </p:sldLayoutIdLst>
-  <p:timing>
-    <p:tnLst>
-      <p:par>
-        <p:cTn id="1" dur="indefinite" restart="never" nodeType="tmRoot"/>
-      </p:par>
-    </p:tnLst>
-  </p:timing>
+  <p:transition/>
+  <p:timing/>
   <p:txStyles>
     <p:titleStyle>
       <a:lvl1pPr algn="ctr" rtl="0" fontAlgn="base">
@@ -19260,7 +18653,7 @@
               <a:srgbClr val="000000"/>
             </a:outerShdw>
           </a:effectLst>
-          <a:latin typeface="Arial" charset="0"/>
+          <a:latin typeface="Arial"/>
         </a:defRPr>
       </a:lvl2pPr>
       <a:lvl3pPr algn="ctr" rtl="0" fontAlgn="base">
@@ -19279,7 +18672,7 @@
               <a:srgbClr val="000000"/>
             </a:outerShdw>
           </a:effectLst>
-          <a:latin typeface="Arial" charset="0"/>
+          <a:latin typeface="Arial"/>
         </a:defRPr>
       </a:lvl3pPr>
       <a:lvl4pPr algn="ctr" rtl="0" fontAlgn="base">
@@ -19298,7 +18691,7 @@
               <a:srgbClr val="000000"/>
             </a:outerShdw>
           </a:effectLst>
-          <a:latin typeface="Arial" charset="0"/>
+          <a:latin typeface="Arial"/>
         </a:defRPr>
       </a:lvl4pPr>
       <a:lvl5pPr algn="ctr" rtl="0" fontAlgn="base">
@@ -19317,7 +18710,7 @@
               <a:srgbClr val="000000"/>
             </a:outerShdw>
           </a:effectLst>
-          <a:latin typeface="Arial" charset="0"/>
+          <a:latin typeface="Arial"/>
         </a:defRPr>
       </a:lvl5pPr>
       <a:lvl6pPr marL="457200" algn="ctr" rtl="0" fontAlgn="base">
@@ -19336,7 +18729,7 @@
               <a:srgbClr val="000000"/>
             </a:outerShdw>
           </a:effectLst>
-          <a:latin typeface="Arial" charset="0"/>
+          <a:latin typeface="Arial"/>
         </a:defRPr>
       </a:lvl6pPr>
       <a:lvl7pPr marL="914400" algn="ctr" rtl="0" fontAlgn="base">
@@ -19355,7 +18748,7 @@
               <a:srgbClr val="000000"/>
             </a:outerShdw>
           </a:effectLst>
-          <a:latin typeface="Arial" charset="0"/>
+          <a:latin typeface="Arial"/>
         </a:defRPr>
       </a:lvl7pPr>
       <a:lvl8pPr marL="1371600" algn="ctr" rtl="0" fontAlgn="base">
@@ -19374,7 +18767,7 @@
               <a:srgbClr val="000000"/>
             </a:outerShdw>
           </a:effectLst>
-          <a:latin typeface="Arial" charset="0"/>
+          <a:latin typeface="Arial"/>
         </a:defRPr>
       </a:lvl8pPr>
       <a:lvl9pPr marL="1828800" algn="ctr" rtl="0" fontAlgn="base">
@@ -19393,7 +18786,7 @@
               <a:srgbClr val="000000"/>
             </a:outerShdw>
           </a:effectLst>
-          <a:latin typeface="Arial" charset="0"/>
+          <a:latin typeface="Arial"/>
         </a:defRPr>
       </a:lvl9pPr>
     </p:titleStyle>
@@ -19714,8 +19107,13 @@
 </file>
 
 <file path=ppt/slides/slide1.xml><?xml version="1.0" encoding="utf-8"?>
-<p:sld xmlns:a="http://schemas.openxmlformats.org/drawingml/2006/main" xmlns:r="http://schemas.openxmlformats.org/officeDocument/2006/relationships" xmlns:p="http://schemas.openxmlformats.org/presentationml/2006/main">
+<p:sld xmlns:a="http://schemas.openxmlformats.org/drawingml/2006/main" xmlns:r="http://schemas.openxmlformats.org/officeDocument/2006/relationships" xmlns:p14="http://schemas.microsoft.com/office/powerpoint/2010/main" xmlns:p15="http://schemas.microsoft.com/office/powerpoint/2012/main" xmlns:p="http://schemas.openxmlformats.org/presentationml/2006/main">
   <p:cSld>
+    <p:bg>
+      <p:bgPr>
+        <a:noFill/>
+      </p:bgPr>
+    </p:bg>
     <p:spTree>
       <p:nvGrpSpPr>
         <p:cNvPr id="1" name=""/>
@@ -19726,8 +19124,6 @@
         <a:xfrm>
           <a:off x="0" y="0"/>
           <a:ext cx="0" cy="0"/>
-          <a:chOff x="0" y="0"/>
-          <a:chExt cx="0" cy="0"/>
         </a:xfrm>
       </p:grpSpPr>
       <p:sp>
@@ -19802,7 +19198,6 @@
         </p:nvPicPr>
         <p:blipFill>
           <a:blip r:embed="rId2"/>
-          <a:srcRect/>
           <a:stretch>
             <a:fillRect/>
           </a:stretch>
@@ -19819,8 +19214,6 @@
           <a:ln w="9525">
             <a:noFill/>
             <a:miter lim="800000"/>
-            <a:headEnd/>
-            <a:tailEnd/>
           </a:ln>
         </p:spPr>
       </p:pic>
@@ -19829,11 +19222,23 @@
   <p:clrMapOvr>
     <a:masterClrMapping/>
   </p:clrMapOvr>
+  <p:transition/>
+  <p:timing/>
 </p:sld>
 </file>
 
+<file path=ppt/tags/tag1.xml><?xml version="1.0" encoding="utf-8"?>
+<p:tagLst xmlns:p="http://schemas.openxmlformats.org/presentationml/2006/main">
+  <p:tag name="AS_NET" val="4.0.30319.34209"/>
+  <p:tag name="AS_OS" val="Microsoft Windows NT 6.2.9200.0"/>
+  <p:tag name="AS_RELEASE_DATE" val="2015.08.28"/>
+  <p:tag name="AS_TITLE" val="Aspose.Slides for .NET 4.0"/>
+  <p:tag name="AS_VERSION" val="15.7.0.0"/>
+</p:tagLst>
+</file>
+
 <file path=ppt/theme/theme1.xml><?xml version="1.0" encoding="utf-8"?>
-<a:theme xmlns:a="http://schemas.openxmlformats.org/drawingml/2006/main" name="Ripple">
+<a:theme xmlns:r="http://schemas.openxmlformats.org/officeDocument/2006/relationships" xmlns:a="http://schemas.openxmlformats.org/drawingml/2006/main" name="Ripple">
   <a:themeElements>
     <a:clrScheme name="Ripple 3">
       <a:dk1>
@@ -19876,13 +19281,13 @@
     <a:fontScheme name="Ripple">
       <a:majorFont>
         <a:latin typeface="Arial"/>
-        <a:ea typeface=""/>
-        <a:cs typeface=""/>
+        <a:ea typeface="Arial"/>
+        <a:cs typeface="Arial"/>
       </a:majorFont>
       <a:minorFont>
         <a:latin typeface="Arial"/>
-        <a:ea typeface=""/>
-        <a:cs typeface=""/>
+        <a:ea typeface="Arial"/>
+        <a:cs typeface="Arial"/>
       </a:minorFont>
     </a:fontScheme>
     <a:fmtScheme name="Office">
@@ -19912,6 +19317,7 @@
             </a:gs>
           </a:gsLst>
           <a:lin ang="16200000" scaled="1"/>
+          <a:tileRect/>
         </a:gradFill>
         <a:gradFill rotWithShape="1">
           <a:gsLst>
@@ -19935,6 +19341,7 @@
             </a:gs>
           </a:gsLst>
           <a:lin ang="16200000" scaled="0"/>
+          <a:tileRect/>
         </a:gradFill>
       </a:fillStyleLst>
       <a:lnStyleLst>
@@ -20029,6 +19436,7 @@
           <a:path path="circle">
             <a:fillToRect l="50000" t="-80000" r="50000" b="180000"/>
           </a:path>
+          <a:tileRect/>
         </a:gradFill>
         <a:gradFill rotWithShape="1">
           <a:gsLst>
@@ -20048,6 +19456,7 @@
           <a:path path="circle">
             <a:fillToRect l="50000" t="50000" r="50000" b="50000"/>
           </a:path>
+          <a:tileRect/>
         </a:gradFill>
       </a:bgFillStyleLst>
     </a:fmtScheme>

</xml_diff>